<commit_message>
update BookVendor, return list
</commit_message>
<xml_diff>
--- a/.slides/02-stubs-and-mocks.pptx
+++ b/.slides/02-stubs-and-mocks.pptx
@@ -1061,7 +1061,7 @@
           </a:ln>
           <a:extLst>
             <a:ext uri="{909E8E84-426E-40dd-AFC4-6F175D3DCCD1}">
-              <a14:hiddenFill xmlns="" xmlns:a14="http://schemas.microsoft.com/office/drawing/2010/main">
+              <a14:hiddenFill xmlns:a14="http://schemas.microsoft.com/office/drawing/2010/main" xmlns="">
                 <a:noFill/>
               </a14:hiddenFill>
             </a:ext>
@@ -1105,7 +1105,7 @@
           </a:ln>
           <a:extLst>
             <a:ext uri="{909E8E84-426E-40dd-AFC4-6F175D3DCCD1}">
-              <a14:hiddenFill xmlns="" xmlns:a14="http://schemas.microsoft.com/office/drawing/2010/main">
+              <a14:hiddenFill xmlns:a14="http://schemas.microsoft.com/office/drawing/2010/main" xmlns="">
                 <a:noFill/>
               </a14:hiddenFill>
             </a:ext>
@@ -1154,14 +1154,14 @@
           </a:ln>
           <a:extLst>
             <a:ext uri="{909E8E84-426E-40dd-AFC4-6F175D3DCCD1}">
-              <a14:hiddenFill xmlns="" xmlns:a14="http://schemas.microsoft.com/office/drawing/2010/main">
+              <a14:hiddenFill xmlns:a14="http://schemas.microsoft.com/office/drawing/2010/main" xmlns="">
                 <a:solidFill>
                   <a:srgbClr val="FFFFFF"/>
                 </a:solidFill>
               </a14:hiddenFill>
             </a:ext>
             <a:ext uri="{91240B29-F687-4f45-9708-019B960494DF}">
-              <a14:hiddenLine xmlns="" xmlns:a14="http://schemas.microsoft.com/office/drawing/2010/main" w="9525">
+              <a14:hiddenLine xmlns:a14="http://schemas.microsoft.com/office/drawing/2010/main" xmlns="" w="9525">
                 <a:solidFill>
                   <a:srgbClr val="000000"/>
                 </a:solidFill>
@@ -1506,7 +1506,7 @@
           </a:ln>
           <a:extLst>
             <a:ext uri="{909E8E84-426E-40dd-AFC4-6F175D3DCCD1}">
-              <a14:hiddenFill xmlns="" xmlns:a14="http://schemas.microsoft.com/office/drawing/2010/main">
+              <a14:hiddenFill xmlns:a14="http://schemas.microsoft.com/office/drawing/2010/main" xmlns="">
                 <a:noFill/>
               </a14:hiddenFill>
             </a:ext>
@@ -1555,14 +1555,14 @@
           </a:ln>
           <a:extLst>
             <a:ext uri="{909E8E84-426E-40dd-AFC4-6F175D3DCCD1}">
-              <a14:hiddenFill xmlns="" xmlns:a14="http://schemas.microsoft.com/office/drawing/2010/main">
+              <a14:hiddenFill xmlns:a14="http://schemas.microsoft.com/office/drawing/2010/main" xmlns="">
                 <a:solidFill>
                   <a:srgbClr val="FFFFFF"/>
                 </a:solidFill>
               </a14:hiddenFill>
             </a:ext>
             <a:ext uri="{91240B29-F687-4f45-9708-019B960494DF}">
-              <a14:hiddenLine xmlns="" xmlns:a14="http://schemas.microsoft.com/office/drawing/2010/main" w="9525">
+              <a14:hiddenLine xmlns:a14="http://schemas.microsoft.com/office/drawing/2010/main" xmlns="" w="9525">
                 <a:solidFill>
                   <a:srgbClr val="000000"/>
                 </a:solidFill>
@@ -1789,7 +1789,7 @@
           </a:ln>
           <a:extLst>
             <a:ext uri="{909E8E84-426E-40dd-AFC4-6F175D3DCCD1}">
-              <a14:hiddenFill xmlns="" xmlns:a14="http://schemas.microsoft.com/office/drawing/2010/main">
+              <a14:hiddenFill xmlns:a14="http://schemas.microsoft.com/office/drawing/2010/main" xmlns="">
                 <a:noFill/>
               </a14:hiddenFill>
             </a:ext>
@@ -1833,7 +1833,7 @@
           </a:ln>
           <a:extLst>
             <a:ext uri="{909E8E84-426E-40dd-AFC4-6F175D3DCCD1}">
-              <a14:hiddenFill xmlns="" xmlns:a14="http://schemas.microsoft.com/office/drawing/2010/main">
+              <a14:hiddenFill xmlns:a14="http://schemas.microsoft.com/office/drawing/2010/main" xmlns="">
                 <a:noFill/>
               </a14:hiddenFill>
             </a:ext>
@@ -1882,14 +1882,14 @@
           </a:ln>
           <a:extLst>
             <a:ext uri="{909E8E84-426E-40dd-AFC4-6F175D3DCCD1}">
-              <a14:hiddenFill xmlns="" xmlns:a14="http://schemas.microsoft.com/office/drawing/2010/main">
+              <a14:hiddenFill xmlns:a14="http://schemas.microsoft.com/office/drawing/2010/main" xmlns="">
                 <a:solidFill>
                   <a:srgbClr val="FFFFFF"/>
                 </a:solidFill>
               </a14:hiddenFill>
             </a:ext>
             <a:ext uri="{91240B29-F687-4f45-9708-019B960494DF}">
-              <a14:hiddenLine xmlns="" xmlns:a14="http://schemas.microsoft.com/office/drawing/2010/main" w="9525">
+              <a14:hiddenLine xmlns:a14="http://schemas.microsoft.com/office/drawing/2010/main" xmlns="" w="9525">
                 <a:solidFill>
                   <a:srgbClr val="000000"/>
                 </a:solidFill>
@@ -2163,7 +2163,7 @@
           </a:ln>
           <a:extLst>
             <a:ext uri="{909E8E84-426E-40dd-AFC4-6F175D3DCCD1}">
-              <a14:hiddenFill xmlns="" xmlns:a14="http://schemas.microsoft.com/office/drawing/2010/main">
+              <a14:hiddenFill xmlns:a14="http://schemas.microsoft.com/office/drawing/2010/main" xmlns="">
                 <a:noFill/>
               </a14:hiddenFill>
             </a:ext>
@@ -2368,7 +2368,7 @@
           </a:ln>
           <a:extLst>
             <a:ext uri="{909E8E84-426E-40dd-AFC4-6F175D3DCCD1}">
-              <a14:hiddenFill xmlns="" xmlns:a14="http://schemas.microsoft.com/office/drawing/2010/main">
+              <a14:hiddenFill xmlns:a14="http://schemas.microsoft.com/office/drawing/2010/main" xmlns="">
                 <a:noFill/>
               </a14:hiddenFill>
             </a:ext>
@@ -2578,7 +2578,7 @@
           </a:ln>
           <a:extLst>
             <a:ext uri="{909E8E84-426E-40dd-AFC4-6F175D3DCCD1}">
-              <a14:hiddenFill xmlns="" xmlns:a14="http://schemas.microsoft.com/office/drawing/2010/main">
+              <a14:hiddenFill xmlns:a14="http://schemas.microsoft.com/office/drawing/2010/main" xmlns="">
                 <a:noFill/>
               </a14:hiddenFill>
             </a:ext>
@@ -2829,7 +2829,7 @@
           </a:ln>
           <a:extLst>
             <a:ext uri="{909E8E84-426E-40dd-AFC4-6F175D3DCCD1}">
-              <a14:hiddenFill xmlns="" xmlns:a14="http://schemas.microsoft.com/office/drawing/2010/main">
+              <a14:hiddenFill xmlns:a14="http://schemas.microsoft.com/office/drawing/2010/main" xmlns="">
                 <a:noFill/>
               </a14:hiddenFill>
             </a:ext>
@@ -2878,14 +2878,14 @@
           </a:ln>
           <a:extLst>
             <a:ext uri="{909E8E84-426E-40dd-AFC4-6F175D3DCCD1}">
-              <a14:hiddenFill xmlns="" xmlns:a14="http://schemas.microsoft.com/office/drawing/2010/main">
+              <a14:hiddenFill xmlns:a14="http://schemas.microsoft.com/office/drawing/2010/main" xmlns="">
                 <a:solidFill>
                   <a:srgbClr val="FFFFFF"/>
                 </a:solidFill>
               </a14:hiddenFill>
             </a:ext>
             <a:ext uri="{91240B29-F687-4f45-9708-019B960494DF}">
-              <a14:hiddenLine xmlns="" xmlns:a14="http://schemas.microsoft.com/office/drawing/2010/main" w="9525">
+              <a14:hiddenLine xmlns:a14="http://schemas.microsoft.com/office/drawing/2010/main" xmlns="" w="9525">
                 <a:solidFill>
                   <a:srgbClr val="000000"/>
                 </a:solidFill>
@@ -3147,7 +3147,7 @@
           </a:ln>
           <a:extLst>
             <a:ext uri="{909E8E84-426E-40dd-AFC4-6F175D3DCCD1}">
-              <a14:hiddenFill xmlns="" xmlns:a14="http://schemas.microsoft.com/office/drawing/2010/main">
+              <a14:hiddenFill xmlns:a14="http://schemas.microsoft.com/office/drawing/2010/main" xmlns="">
                 <a:noFill/>
               </a14:hiddenFill>
             </a:ext>
@@ -3196,14 +3196,14 @@
           </a:ln>
           <a:extLst>
             <a:ext uri="{909E8E84-426E-40dd-AFC4-6F175D3DCCD1}">
-              <a14:hiddenFill xmlns="" xmlns:a14="http://schemas.microsoft.com/office/drawing/2010/main">
+              <a14:hiddenFill xmlns:a14="http://schemas.microsoft.com/office/drawing/2010/main" xmlns="">
                 <a:solidFill>
                   <a:srgbClr val="FFFFFF"/>
                 </a:solidFill>
               </a14:hiddenFill>
             </a:ext>
             <a:ext uri="{91240B29-F687-4f45-9708-019B960494DF}">
-              <a14:hiddenLine xmlns="" xmlns:a14="http://schemas.microsoft.com/office/drawing/2010/main" w="9525">
+              <a14:hiddenLine xmlns:a14="http://schemas.microsoft.com/office/drawing/2010/main" xmlns="" w="9525">
                 <a:solidFill>
                   <a:srgbClr val="000000"/>
                 </a:solidFill>
@@ -3848,7 +3848,7 @@
           </a:ln>
           <a:extLst>
             <a:ext uri="{909E8E84-426E-40dd-AFC4-6F175D3DCCD1}">
-              <a14:hiddenFill xmlns="" xmlns:a14="http://schemas.microsoft.com/office/drawing/2010/main">
+              <a14:hiddenFill xmlns:a14="http://schemas.microsoft.com/office/drawing/2010/main" xmlns="">
                 <a:noFill/>
               </a14:hiddenFill>
             </a:ext>
@@ -4041,7 +4041,7 @@
           </a:ln>
           <a:extLst>
             <a:ext uri="{909E8E84-426E-40dd-AFC4-6F175D3DCCD1}">
-              <a14:hiddenFill xmlns="" xmlns:a14="http://schemas.microsoft.com/office/drawing/2010/main">
+              <a14:hiddenFill xmlns:a14="http://schemas.microsoft.com/office/drawing/2010/main" xmlns="">
                 <a:noFill/>
               </a14:hiddenFill>
             </a:ext>
@@ -4082,7 +4082,7 @@
           </a:ln>
           <a:extLst>
             <a:ext uri="{909E8E84-426E-40dd-AFC4-6F175D3DCCD1}">
-              <a14:hiddenFill xmlns="" xmlns:a14="http://schemas.microsoft.com/office/drawing/2010/main">
+              <a14:hiddenFill xmlns:a14="http://schemas.microsoft.com/office/drawing/2010/main" xmlns="">
                 <a:noFill/>
               </a14:hiddenFill>
             </a:ext>
@@ -4293,7 +4293,7 @@
           </a:ln>
           <a:extLst>
             <a:ext uri="{909E8E84-426E-40dd-AFC4-6F175D3DCCD1}">
-              <a14:hiddenFill xmlns="" xmlns:a14="http://schemas.microsoft.com/office/drawing/2010/main">
+              <a14:hiddenFill xmlns:a14="http://schemas.microsoft.com/office/drawing/2010/main" xmlns="">
                 <a:noFill/>
               </a14:hiddenFill>
             </a:ext>
@@ -4342,14 +4342,14 @@
           </a:ln>
           <a:extLst>
             <a:ext uri="{909E8E84-426E-40dd-AFC4-6F175D3DCCD1}">
-              <a14:hiddenFill xmlns="" xmlns:a14="http://schemas.microsoft.com/office/drawing/2010/main">
+              <a14:hiddenFill xmlns:a14="http://schemas.microsoft.com/office/drawing/2010/main" xmlns="">
                 <a:solidFill>
                   <a:srgbClr val="FFFFFF"/>
                 </a:solidFill>
               </a14:hiddenFill>
             </a:ext>
             <a:ext uri="{91240B29-F687-4f45-9708-019B960494DF}">
-              <a14:hiddenLine xmlns="" xmlns:a14="http://schemas.microsoft.com/office/drawing/2010/main" w="9525">
+              <a14:hiddenLine xmlns:a14="http://schemas.microsoft.com/office/drawing/2010/main" xmlns="" w="9525">
                 <a:solidFill>
                   <a:srgbClr val="000000"/>
                 </a:solidFill>
@@ -4580,7 +4580,7 @@
           </a:ln>
           <a:extLst>
             <a:ext uri="{909E8E84-426E-40dd-AFC4-6F175D3DCCD1}">
-              <a14:hiddenFill xmlns="" xmlns:a14="http://schemas.microsoft.com/office/drawing/2010/main">
+              <a14:hiddenFill xmlns:a14="http://schemas.microsoft.com/office/drawing/2010/main" xmlns="">
                 <a:noFill/>
               </a14:hiddenFill>
             </a:ext>
@@ -4624,7 +4624,7 @@
           </a:ln>
           <a:extLst>
             <a:ext uri="{909E8E84-426E-40dd-AFC4-6F175D3DCCD1}">
-              <a14:hiddenFill xmlns="" xmlns:a14="http://schemas.microsoft.com/office/drawing/2010/main">
+              <a14:hiddenFill xmlns:a14="http://schemas.microsoft.com/office/drawing/2010/main" xmlns="">
                 <a:noFill/>
               </a14:hiddenFill>
             </a:ext>
@@ -4673,14 +4673,14 @@
           </a:ln>
           <a:extLst>
             <a:ext uri="{909E8E84-426E-40dd-AFC4-6F175D3DCCD1}">
-              <a14:hiddenFill xmlns="" xmlns:a14="http://schemas.microsoft.com/office/drawing/2010/main">
+              <a14:hiddenFill xmlns:a14="http://schemas.microsoft.com/office/drawing/2010/main" xmlns="">
                 <a:solidFill>
                   <a:srgbClr val="FFFFFF"/>
                 </a:solidFill>
               </a14:hiddenFill>
             </a:ext>
             <a:ext uri="{91240B29-F687-4f45-9708-019B960494DF}">
-              <a14:hiddenLine xmlns="" xmlns:a14="http://schemas.microsoft.com/office/drawing/2010/main" w="9525">
+              <a14:hiddenLine xmlns:a14="http://schemas.microsoft.com/office/drawing/2010/main" xmlns="" w="9525">
                 <a:solidFill>
                   <a:srgbClr val="000000"/>
                 </a:solidFill>
@@ -4954,7 +4954,7 @@
           </a:ln>
           <a:extLst>
             <a:ext uri="{909E8E84-426E-40dd-AFC4-6F175D3DCCD1}">
-              <a14:hiddenFill xmlns="" xmlns:a14="http://schemas.microsoft.com/office/drawing/2010/main">
+              <a14:hiddenFill xmlns:a14="http://schemas.microsoft.com/office/drawing/2010/main" xmlns="">
                 <a:noFill/>
               </a14:hiddenFill>
             </a:ext>
@@ -5168,7 +5168,7 @@
           </a:ln>
           <a:extLst>
             <a:ext uri="{909E8E84-426E-40dd-AFC4-6F175D3DCCD1}">
-              <a14:hiddenFill xmlns="" xmlns:a14="http://schemas.microsoft.com/office/drawing/2010/main">
+              <a14:hiddenFill xmlns:a14="http://schemas.microsoft.com/office/drawing/2010/main" xmlns="">
                 <a:noFill/>
               </a14:hiddenFill>
             </a:ext>
@@ -5387,7 +5387,7 @@
           </a:ln>
           <a:extLst>
             <a:ext uri="{909E8E84-426E-40dd-AFC4-6F175D3DCCD1}">
-              <a14:hiddenFill xmlns="" xmlns:a14="http://schemas.microsoft.com/office/drawing/2010/main">
+              <a14:hiddenFill xmlns:a14="http://schemas.microsoft.com/office/drawing/2010/main" xmlns="">
                 <a:noFill/>
               </a14:hiddenFill>
             </a:ext>
@@ -5638,7 +5638,7 @@
           </a:ln>
           <a:extLst>
             <a:ext uri="{909E8E84-426E-40dd-AFC4-6F175D3DCCD1}">
-              <a14:hiddenFill xmlns="" xmlns:a14="http://schemas.microsoft.com/office/drawing/2010/main">
+              <a14:hiddenFill xmlns:a14="http://schemas.microsoft.com/office/drawing/2010/main" xmlns="">
                 <a:noFill/>
               </a14:hiddenFill>
             </a:ext>
@@ -5687,14 +5687,14 @@
           </a:ln>
           <a:extLst>
             <a:ext uri="{909E8E84-426E-40dd-AFC4-6F175D3DCCD1}">
-              <a14:hiddenFill xmlns="" xmlns:a14="http://schemas.microsoft.com/office/drawing/2010/main">
+              <a14:hiddenFill xmlns:a14="http://schemas.microsoft.com/office/drawing/2010/main" xmlns="">
                 <a:solidFill>
                   <a:srgbClr val="FFFFFF"/>
                 </a:solidFill>
               </a14:hiddenFill>
             </a:ext>
             <a:ext uri="{91240B29-F687-4f45-9708-019B960494DF}">
-              <a14:hiddenLine xmlns="" xmlns:a14="http://schemas.microsoft.com/office/drawing/2010/main" w="9525">
+              <a14:hiddenLine xmlns:a14="http://schemas.microsoft.com/office/drawing/2010/main" xmlns="" w="9525">
                 <a:solidFill>
                   <a:srgbClr val="000000"/>
                 </a:solidFill>
@@ -5956,7 +5956,7 @@
           </a:ln>
           <a:extLst>
             <a:ext uri="{909E8E84-426E-40dd-AFC4-6F175D3DCCD1}">
-              <a14:hiddenFill xmlns="" xmlns:a14="http://schemas.microsoft.com/office/drawing/2010/main">
+              <a14:hiddenFill xmlns:a14="http://schemas.microsoft.com/office/drawing/2010/main" xmlns="">
                 <a:noFill/>
               </a14:hiddenFill>
             </a:ext>
@@ -6005,14 +6005,14 @@
           </a:ln>
           <a:extLst>
             <a:ext uri="{909E8E84-426E-40dd-AFC4-6F175D3DCCD1}">
-              <a14:hiddenFill xmlns="" xmlns:a14="http://schemas.microsoft.com/office/drawing/2010/main">
+              <a14:hiddenFill xmlns:a14="http://schemas.microsoft.com/office/drawing/2010/main" xmlns="">
                 <a:solidFill>
                   <a:srgbClr val="FFFFFF"/>
                 </a:solidFill>
               </a14:hiddenFill>
             </a:ext>
             <a:ext uri="{91240B29-F687-4f45-9708-019B960494DF}">
-              <a14:hiddenLine xmlns="" xmlns:a14="http://schemas.microsoft.com/office/drawing/2010/main" w="9525">
+              <a14:hiddenLine xmlns:a14="http://schemas.microsoft.com/office/drawing/2010/main" xmlns="" w="9525">
                 <a:solidFill>
                   <a:srgbClr val="000000"/>
                 </a:solidFill>
@@ -6482,7 +6482,7 @@
           </a:ln>
           <a:extLst>
             <a:ext uri="{909E8E84-426E-40dd-AFC4-6F175D3DCCD1}">
-              <a14:hiddenFill xmlns="" xmlns:a14="http://schemas.microsoft.com/office/drawing/2010/main">
+              <a14:hiddenFill xmlns:a14="http://schemas.microsoft.com/office/drawing/2010/main" xmlns="">
                 <a:noFill/>
               </a14:hiddenFill>
             </a:ext>
@@ -6861,7 +6861,7 @@
           </a:ln>
           <a:extLst>
             <a:ext uri="{909E8E84-426E-40dd-AFC4-6F175D3DCCD1}">
-              <a14:hiddenFill xmlns="" xmlns:a14="http://schemas.microsoft.com/office/drawing/2010/main">
+              <a14:hiddenFill xmlns:a14="http://schemas.microsoft.com/office/drawing/2010/main" xmlns="">
                 <a:noFill/>
               </a14:hiddenFill>
             </a:ext>
@@ -6902,7 +6902,7 @@
           </a:ln>
           <a:extLst>
             <a:ext uri="{909E8E84-426E-40dd-AFC4-6F175D3DCCD1}">
-              <a14:hiddenFill xmlns="" xmlns:a14="http://schemas.microsoft.com/office/drawing/2010/main">
+              <a14:hiddenFill xmlns:a14="http://schemas.microsoft.com/office/drawing/2010/main" xmlns="">
                 <a:noFill/>
               </a14:hiddenFill>
             </a:ext>
@@ -7113,7 +7113,7 @@
           </a:ln>
           <a:extLst>
             <a:ext uri="{909E8E84-426E-40dd-AFC4-6F175D3DCCD1}">
-              <a14:hiddenFill xmlns="" xmlns:a14="http://schemas.microsoft.com/office/drawing/2010/main">
+              <a14:hiddenFill xmlns:a14="http://schemas.microsoft.com/office/drawing/2010/main" xmlns="">
                 <a:noFill/>
               </a14:hiddenFill>
             </a:ext>
@@ -7162,14 +7162,14 @@
           </a:ln>
           <a:extLst>
             <a:ext uri="{909E8E84-426E-40dd-AFC4-6F175D3DCCD1}">
-              <a14:hiddenFill xmlns="" xmlns:a14="http://schemas.microsoft.com/office/drawing/2010/main">
+              <a14:hiddenFill xmlns:a14="http://schemas.microsoft.com/office/drawing/2010/main" xmlns="">
                 <a:solidFill>
                   <a:srgbClr val="FFFFFF"/>
                 </a:solidFill>
               </a14:hiddenFill>
             </a:ext>
             <a:ext uri="{91240B29-F687-4f45-9708-019B960494DF}">
-              <a14:hiddenLine xmlns="" xmlns:a14="http://schemas.microsoft.com/office/drawing/2010/main" w="9525">
+              <a14:hiddenLine xmlns:a14="http://schemas.microsoft.com/office/drawing/2010/main" xmlns="" w="9525">
                 <a:solidFill>
                   <a:srgbClr val="000000"/>
                 </a:solidFill>
@@ -7400,7 +7400,7 @@
           </a:ln>
           <a:extLst>
             <a:ext uri="{909E8E84-426E-40dd-AFC4-6F175D3DCCD1}">
-              <a14:hiddenFill xmlns="" xmlns:a14="http://schemas.microsoft.com/office/drawing/2010/main">
+              <a14:hiddenFill xmlns:a14="http://schemas.microsoft.com/office/drawing/2010/main" xmlns="">
                 <a:noFill/>
               </a14:hiddenFill>
             </a:ext>
@@ -7651,7 +7651,7 @@
           </a:ln>
           <a:extLst>
             <a:ext uri="{909E8E84-426E-40dd-AFC4-6F175D3DCCD1}">
-              <a14:hiddenFill xmlns="" xmlns:a14="http://schemas.microsoft.com/office/drawing/2010/main">
+              <a14:hiddenFill xmlns:a14="http://schemas.microsoft.com/office/drawing/2010/main" xmlns="">
                 <a:noFill/>
               </a14:hiddenFill>
             </a:ext>
@@ -7700,14 +7700,14 @@
           </a:ln>
           <a:extLst>
             <a:ext uri="{909E8E84-426E-40dd-AFC4-6F175D3DCCD1}">
-              <a14:hiddenFill xmlns="" xmlns:a14="http://schemas.microsoft.com/office/drawing/2010/main">
+              <a14:hiddenFill xmlns:a14="http://schemas.microsoft.com/office/drawing/2010/main" xmlns="">
                 <a:solidFill>
                   <a:srgbClr val="FFFFFF"/>
                 </a:solidFill>
               </a14:hiddenFill>
             </a:ext>
             <a:ext uri="{91240B29-F687-4f45-9708-019B960494DF}">
-              <a14:hiddenLine xmlns="" xmlns:a14="http://schemas.microsoft.com/office/drawing/2010/main" w="9525">
+              <a14:hiddenLine xmlns:a14="http://schemas.microsoft.com/office/drawing/2010/main" xmlns="" w="9525">
                 <a:solidFill>
                   <a:srgbClr val="000000"/>
                 </a:solidFill>
@@ -7969,7 +7969,7 @@
           </a:ln>
           <a:extLst>
             <a:ext uri="{909E8E84-426E-40dd-AFC4-6F175D3DCCD1}">
-              <a14:hiddenFill xmlns="" xmlns:a14="http://schemas.microsoft.com/office/drawing/2010/main">
+              <a14:hiddenFill xmlns:a14="http://schemas.microsoft.com/office/drawing/2010/main" xmlns="">
                 <a:noFill/>
               </a14:hiddenFill>
             </a:ext>
@@ -8018,14 +8018,14 @@
           </a:ln>
           <a:extLst>
             <a:ext uri="{909E8E84-426E-40dd-AFC4-6F175D3DCCD1}">
-              <a14:hiddenFill xmlns="" xmlns:a14="http://schemas.microsoft.com/office/drawing/2010/main">
+              <a14:hiddenFill xmlns:a14="http://schemas.microsoft.com/office/drawing/2010/main" xmlns="">
                 <a:solidFill>
                   <a:srgbClr val="FFFFFF"/>
                 </a:solidFill>
               </a14:hiddenFill>
             </a:ext>
             <a:ext uri="{91240B29-F687-4f45-9708-019B960494DF}">
-              <a14:hiddenLine xmlns="" xmlns:a14="http://schemas.microsoft.com/office/drawing/2010/main" w="9525">
+              <a14:hiddenLine xmlns:a14="http://schemas.microsoft.com/office/drawing/2010/main" xmlns="" w="9525">
                 <a:solidFill>
                   <a:srgbClr val="000000"/>
                 </a:solidFill>
@@ -8661,7 +8661,7 @@
           </a:ln>
           <a:extLst>
             <a:ext uri="{909E8E84-426E-40dd-AFC4-6F175D3DCCD1}">
-              <a14:hiddenFill xmlns="" xmlns:a14="http://schemas.microsoft.com/office/drawing/2010/main">
+              <a14:hiddenFill xmlns:a14="http://schemas.microsoft.com/office/drawing/2010/main" xmlns="">
                 <a:noFill/>
               </a14:hiddenFill>
             </a:ext>
@@ -8702,7 +8702,7 @@
           </a:ln>
           <a:extLst>
             <a:ext uri="{909E8E84-426E-40dd-AFC4-6F175D3DCCD1}">
-              <a14:hiddenFill xmlns="" xmlns:a14="http://schemas.microsoft.com/office/drawing/2010/main">
+              <a14:hiddenFill xmlns:a14="http://schemas.microsoft.com/office/drawing/2010/main" xmlns="">
                 <a:noFill/>
               </a14:hiddenFill>
             </a:ext>
@@ -8848,14 +8848,14 @@
               <ma14:placeholderFlag xmlns:ma14="http://schemas.microsoft.com/office/mac/drawingml/2011/main" val="1"/>
             </a:ext>
             <a:ext uri="{909E8E84-426E-40dd-AFC4-6F175D3DCCD1}">
-              <a14:hiddenFill xmlns="" xmlns:a14="http://schemas.microsoft.com/office/drawing/2010/main">
+              <a14:hiddenFill xmlns:a14="http://schemas.microsoft.com/office/drawing/2010/main" xmlns="">
                 <a:solidFill>
                   <a:srgbClr val="FFFFFF"/>
                 </a:solidFill>
               </a14:hiddenFill>
             </a:ext>
             <a:ext uri="{91240B29-F687-4f45-9708-019B960494DF}">
-              <a14:hiddenLine xmlns="" xmlns:a14="http://schemas.microsoft.com/office/drawing/2010/main" w="12700">
+              <a14:hiddenLine xmlns:a14="http://schemas.microsoft.com/office/drawing/2010/main" xmlns="" w="12700">
                 <a:solidFill>
                   <a:schemeClr val="tx1"/>
                 </a:solidFill>
@@ -8865,7 +8865,7 @@
               </a14:hiddenLine>
             </a:ext>
             <a:ext uri="{AF507438-7753-43e0-B8FC-AC1667EBCBE1}">
-              <a14:hiddenEffects xmlns="" xmlns:a14="http://schemas.microsoft.com/office/drawing/2010/main">
+              <a14:hiddenEffects xmlns:a14="http://schemas.microsoft.com/office/drawing/2010/main" xmlns="">
                 <a:effectLst>
                   <a:outerShdw blurRad="63500" dist="38099" dir="2700000" algn="ctr" rotWithShape="0">
                     <a:srgbClr val="000000">
@@ -8926,14 +8926,14 @@
               <ma14:placeholderFlag xmlns:ma14="http://schemas.microsoft.com/office/mac/drawingml/2011/main" val="1"/>
             </a:ext>
             <a:ext uri="{909E8E84-426E-40dd-AFC4-6F175D3DCCD1}">
-              <a14:hiddenFill xmlns="" xmlns:a14="http://schemas.microsoft.com/office/drawing/2010/main">
+              <a14:hiddenFill xmlns:a14="http://schemas.microsoft.com/office/drawing/2010/main" xmlns="">
                 <a:solidFill>
                   <a:srgbClr val="FFFFFF"/>
                 </a:solidFill>
               </a14:hiddenFill>
             </a:ext>
             <a:ext uri="{91240B29-F687-4f45-9708-019B960494DF}">
-              <a14:hiddenLine xmlns="" xmlns:a14="http://schemas.microsoft.com/office/drawing/2010/main" w="12700">
+              <a14:hiddenLine xmlns:a14="http://schemas.microsoft.com/office/drawing/2010/main" xmlns="" w="12700">
                 <a:solidFill>
                   <a:schemeClr val="tx1"/>
                 </a:solidFill>
@@ -8943,7 +8943,7 @@
               </a14:hiddenLine>
             </a:ext>
             <a:ext uri="{AF507438-7753-43e0-B8FC-AC1667EBCBE1}">
-              <a14:hiddenEffects xmlns="" xmlns:a14="http://schemas.microsoft.com/office/drawing/2010/main">
+              <a14:hiddenEffects xmlns:a14="http://schemas.microsoft.com/office/drawing/2010/main" xmlns="">
                 <a:effectLst>
                   <a:outerShdw blurRad="63500" dist="38099" dir="2700000" algn="ctr" rotWithShape="0">
                     <a:srgbClr val="000000">
@@ -9037,14 +9037,14 @@
           <a:effectLst/>
           <a:extLst>
             <a:ext uri="{909E8E84-426E-40dd-AFC4-6F175D3DCCD1}">
-              <a14:hiddenFill xmlns="" xmlns:a14="http://schemas.microsoft.com/office/drawing/2010/main">
+              <a14:hiddenFill xmlns:a14="http://schemas.microsoft.com/office/drawing/2010/main" xmlns="">
                 <a:solidFill>
                   <a:srgbClr val="FFFFFF"/>
                 </a:solidFill>
               </a14:hiddenFill>
             </a:ext>
             <a:ext uri="{91240B29-F687-4f45-9708-019B960494DF}">
-              <a14:hiddenLine xmlns="" xmlns:a14="http://schemas.microsoft.com/office/drawing/2010/main" w="12700">
+              <a14:hiddenLine xmlns:a14="http://schemas.microsoft.com/office/drawing/2010/main" xmlns="" w="12700">
                 <a:solidFill>
                   <a:schemeClr val="tx1"/>
                 </a:solidFill>
@@ -9054,7 +9054,7 @@
               </a14:hiddenLine>
             </a:ext>
             <a:ext uri="{AF507438-7753-43e0-B8FC-AC1667EBCBE1}">
-              <a14:hiddenEffects xmlns="" xmlns:a14="http://schemas.microsoft.com/office/drawing/2010/main">
+              <a14:hiddenEffects xmlns:a14="http://schemas.microsoft.com/office/drawing/2010/main" xmlns="">
                 <a:effectLst>
                   <a:outerShdw blurRad="63500" dist="38099" dir="2700000" algn="ctr" rotWithShape="0">
                     <a:srgbClr val="000000">
@@ -9743,14 +9743,14 @@
               <ma14:placeholderFlag xmlns:ma14="http://schemas.microsoft.com/office/mac/drawingml/2011/main" val="1"/>
             </a:ext>
             <a:ext uri="{909E8E84-426E-40dd-AFC4-6F175D3DCCD1}">
-              <a14:hiddenFill xmlns="" xmlns:a14="http://schemas.microsoft.com/office/drawing/2010/main">
+              <a14:hiddenFill xmlns:a14="http://schemas.microsoft.com/office/drawing/2010/main" xmlns="">
                 <a:solidFill>
                   <a:srgbClr val="FFFFFF"/>
                 </a:solidFill>
               </a14:hiddenFill>
             </a:ext>
             <a:ext uri="{91240B29-F687-4f45-9708-019B960494DF}">
-              <a14:hiddenLine xmlns="" xmlns:a14="http://schemas.microsoft.com/office/drawing/2010/main" w="12700">
+              <a14:hiddenLine xmlns:a14="http://schemas.microsoft.com/office/drawing/2010/main" xmlns="" w="12700">
                 <a:solidFill>
                   <a:schemeClr val="tx1"/>
                 </a:solidFill>
@@ -9760,7 +9760,7 @@
               </a14:hiddenLine>
             </a:ext>
             <a:ext uri="{AF507438-7753-43e0-B8FC-AC1667EBCBE1}">
-              <a14:hiddenEffects xmlns="" xmlns:a14="http://schemas.microsoft.com/office/drawing/2010/main">
+              <a14:hiddenEffects xmlns:a14="http://schemas.microsoft.com/office/drawing/2010/main" xmlns="">
                 <a:effectLst>
                   <a:outerShdw blurRad="63500" dist="38099" dir="2700000" algn="ctr" rotWithShape="0">
                     <a:srgbClr val="000000">
@@ -9818,14 +9818,14 @@
               <ma14:placeholderFlag xmlns:ma14="http://schemas.microsoft.com/office/mac/drawingml/2011/main" val="1"/>
             </a:ext>
             <a:ext uri="{909E8E84-426E-40dd-AFC4-6F175D3DCCD1}">
-              <a14:hiddenFill xmlns="" xmlns:a14="http://schemas.microsoft.com/office/drawing/2010/main">
+              <a14:hiddenFill xmlns:a14="http://schemas.microsoft.com/office/drawing/2010/main" xmlns="">
                 <a:solidFill>
                   <a:srgbClr val="FFFFFF"/>
                 </a:solidFill>
               </a14:hiddenFill>
             </a:ext>
             <a:ext uri="{91240B29-F687-4f45-9708-019B960494DF}">
-              <a14:hiddenLine xmlns="" xmlns:a14="http://schemas.microsoft.com/office/drawing/2010/main" w="12700">
+              <a14:hiddenLine xmlns:a14="http://schemas.microsoft.com/office/drawing/2010/main" xmlns="" w="12700">
                 <a:solidFill>
                   <a:schemeClr val="tx1"/>
                 </a:solidFill>
@@ -9835,7 +9835,7 @@
               </a14:hiddenLine>
             </a:ext>
             <a:ext uri="{AF507438-7753-43e0-B8FC-AC1667EBCBE1}">
-              <a14:hiddenEffects xmlns="" xmlns:a14="http://schemas.microsoft.com/office/drawing/2010/main">
+              <a14:hiddenEffects xmlns:a14="http://schemas.microsoft.com/office/drawing/2010/main" xmlns="">
                 <a:effectLst>
                   <a:outerShdw blurRad="63500" dist="38099" dir="2700000" algn="ctr" rotWithShape="0">
                     <a:srgbClr val="000000">
@@ -9926,14 +9926,14 @@
           <a:effectLst/>
           <a:extLst>
             <a:ext uri="{909E8E84-426E-40dd-AFC4-6F175D3DCCD1}">
-              <a14:hiddenFill xmlns="" xmlns:a14="http://schemas.microsoft.com/office/drawing/2010/main">
+              <a14:hiddenFill xmlns:a14="http://schemas.microsoft.com/office/drawing/2010/main" xmlns="">
                 <a:solidFill>
                   <a:srgbClr val="FFFFFF"/>
                 </a:solidFill>
               </a14:hiddenFill>
             </a:ext>
             <a:ext uri="{91240B29-F687-4f45-9708-019B960494DF}">
-              <a14:hiddenLine xmlns="" xmlns:a14="http://schemas.microsoft.com/office/drawing/2010/main" w="12700">
+              <a14:hiddenLine xmlns:a14="http://schemas.microsoft.com/office/drawing/2010/main" xmlns="" w="12700">
                 <a:solidFill>
                   <a:schemeClr val="tx1"/>
                 </a:solidFill>
@@ -9943,7 +9943,7 @@
               </a14:hiddenLine>
             </a:ext>
             <a:ext uri="{AF507438-7753-43e0-B8FC-AC1667EBCBE1}">
-              <a14:hiddenEffects xmlns="" xmlns:a14="http://schemas.microsoft.com/office/drawing/2010/main">
+              <a14:hiddenEffects xmlns:a14="http://schemas.microsoft.com/office/drawing/2010/main" xmlns="">
                 <a:effectLst>
                   <a:outerShdw blurRad="63500" dist="38099" dir="2700000" algn="ctr" rotWithShape="0">
                     <a:srgbClr val="000000">
@@ -10641,14 +10641,14 @@
               <ma14:placeholderFlag xmlns:ma14="http://schemas.microsoft.com/office/mac/drawingml/2011/main" val="1"/>
             </a:ext>
             <a:ext uri="{909E8E84-426E-40dd-AFC4-6F175D3DCCD1}">
-              <a14:hiddenFill xmlns="" xmlns:a14="http://schemas.microsoft.com/office/drawing/2010/main">
+              <a14:hiddenFill xmlns:a14="http://schemas.microsoft.com/office/drawing/2010/main" xmlns="">
                 <a:solidFill>
                   <a:srgbClr val="FFFFFF"/>
                 </a:solidFill>
               </a14:hiddenFill>
             </a:ext>
             <a:ext uri="{91240B29-F687-4f45-9708-019B960494DF}">
-              <a14:hiddenLine xmlns="" xmlns:a14="http://schemas.microsoft.com/office/drawing/2010/main" w="12700">
+              <a14:hiddenLine xmlns:a14="http://schemas.microsoft.com/office/drawing/2010/main" xmlns="" w="12700">
                 <a:solidFill>
                   <a:schemeClr val="tx1"/>
                 </a:solidFill>
@@ -10658,7 +10658,7 @@
               </a14:hiddenLine>
             </a:ext>
             <a:ext uri="{AF507438-7753-43e0-B8FC-AC1667EBCBE1}">
-              <a14:hiddenEffects xmlns="" xmlns:a14="http://schemas.microsoft.com/office/drawing/2010/main">
+              <a14:hiddenEffects xmlns:a14="http://schemas.microsoft.com/office/drawing/2010/main" xmlns="">
                 <a:effectLst>
                   <a:outerShdw blurRad="63500" dist="38099" dir="2700000" algn="ctr" rotWithShape="0">
                     <a:srgbClr val="000000">
@@ -10716,14 +10716,14 @@
               <ma14:placeholderFlag xmlns:ma14="http://schemas.microsoft.com/office/mac/drawingml/2011/main" val="1"/>
             </a:ext>
             <a:ext uri="{909E8E84-426E-40dd-AFC4-6F175D3DCCD1}">
-              <a14:hiddenFill xmlns="" xmlns:a14="http://schemas.microsoft.com/office/drawing/2010/main">
+              <a14:hiddenFill xmlns:a14="http://schemas.microsoft.com/office/drawing/2010/main" xmlns="">
                 <a:solidFill>
                   <a:srgbClr val="FFFFFF"/>
                 </a:solidFill>
               </a14:hiddenFill>
             </a:ext>
             <a:ext uri="{91240B29-F687-4f45-9708-019B960494DF}">
-              <a14:hiddenLine xmlns="" xmlns:a14="http://schemas.microsoft.com/office/drawing/2010/main" w="12700">
+              <a14:hiddenLine xmlns:a14="http://schemas.microsoft.com/office/drawing/2010/main" xmlns="" w="12700">
                 <a:solidFill>
                   <a:schemeClr val="tx1"/>
                 </a:solidFill>
@@ -10733,7 +10733,7 @@
               </a14:hiddenLine>
             </a:ext>
             <a:ext uri="{AF507438-7753-43e0-B8FC-AC1667EBCBE1}">
-              <a14:hiddenEffects xmlns="" xmlns:a14="http://schemas.microsoft.com/office/drawing/2010/main">
+              <a14:hiddenEffects xmlns:a14="http://schemas.microsoft.com/office/drawing/2010/main" xmlns="">
                 <a:effectLst>
                   <a:outerShdw blurRad="63500" dist="38099" dir="2700000" algn="ctr" rotWithShape="0">
                     <a:srgbClr val="000000">
@@ -10824,14 +10824,14 @@
           <a:effectLst/>
           <a:extLst>
             <a:ext uri="{909E8E84-426E-40dd-AFC4-6F175D3DCCD1}">
-              <a14:hiddenFill xmlns="" xmlns:a14="http://schemas.microsoft.com/office/drawing/2010/main">
+              <a14:hiddenFill xmlns:a14="http://schemas.microsoft.com/office/drawing/2010/main" xmlns="">
                 <a:solidFill>
                   <a:srgbClr val="FFFFFF"/>
                 </a:solidFill>
               </a14:hiddenFill>
             </a:ext>
             <a:ext uri="{91240B29-F687-4f45-9708-019B960494DF}">
-              <a14:hiddenLine xmlns="" xmlns:a14="http://schemas.microsoft.com/office/drawing/2010/main" w="12700">
+              <a14:hiddenLine xmlns:a14="http://schemas.microsoft.com/office/drawing/2010/main" xmlns="" w="12700">
                 <a:solidFill>
                   <a:schemeClr val="tx1"/>
                 </a:solidFill>
@@ -10841,7 +10841,7 @@
               </a14:hiddenLine>
             </a:ext>
             <a:ext uri="{AF507438-7753-43e0-B8FC-AC1667EBCBE1}">
-              <a14:hiddenEffects xmlns="" xmlns:a14="http://schemas.microsoft.com/office/drawing/2010/main">
+              <a14:hiddenEffects xmlns:a14="http://schemas.microsoft.com/office/drawing/2010/main" xmlns="">
                 <a:effectLst>
                   <a:outerShdw blurRad="63500" dist="38099" dir="2700000" algn="ctr" rotWithShape="0">
                     <a:srgbClr val="000000">
@@ -11527,7 +11527,6 @@
               <a:rPr lang="en-US" sz="9600" cap="none" dirty="0" smtClean="0"/>
               <a:t>Stubs &amp; Mocks</a:t>
             </a:r>
-            <a:endParaRPr lang="en-US" sz="9600" cap="none" dirty="0" smtClean="0"/>
           </a:p>
         </p:txBody>
       </p:sp>
@@ -12029,7 +12028,6 @@
               <a:rPr lang="en-US" dirty="0" smtClean="0"/>
               <a:t>Stubs Vs Mocks</a:t>
             </a:r>
-            <a:endParaRPr lang="en-US" dirty="0" smtClean="0"/>
           </a:p>
         </p:txBody>
       </p:sp>
@@ -12053,13 +12051,8 @@
             </a:pPr>
             <a:r>
               <a:rPr lang="en-US" dirty="0" smtClean="0"/>
-              <a:t>With Google </a:t>
-            </a:r>
-            <a:r>
-              <a:rPr lang="en-US" dirty="0" smtClean="0"/>
-              <a:t>Mock</a:t>
-            </a:r>
-            <a:endParaRPr lang="en-US" dirty="0" smtClean="0"/>
+              <a:t>With Google Mock</a:t>
+            </a:r>
           </a:p>
         </p:txBody>
       </p:sp>
@@ -14045,11 +14038,7 @@
             </a:r>
             <a:r>
               <a:rPr lang="en-US" altLang="zh-CHS" sz="3600" dirty="0" smtClean="0"/>
-              <a:t>Librarian::</a:t>
-            </a:r>
-            <a:r>
-              <a:rPr lang="en-US" altLang="zh-CHS" sz="3600" dirty="0" smtClean="0"/>
-              <a:t>store(vendor)</a:t>
+              <a:t>Librarian::store(vendor)</a:t>
             </a:r>
             <a:r>
               <a:rPr lang="zh-CHS" altLang="en-US" sz="3600" dirty="0" smtClean="0"/>
@@ -14124,7 +14113,75 @@
   <p:timing>
     <p:tnLst>
       <p:par>
-        <p:cTn id="1" dur="indefinite" restart="never" nodeType="tmRoot"/>
+        <p:cTn id="1" dur="indefinite" restart="never" nodeType="tmRoot">
+          <p:childTnLst>
+            <p:seq concurrent="1" nextAc="seek">
+              <p:cTn id="2" dur="indefinite" nodeType="mainSeq">
+                <p:childTnLst>
+                  <p:par>
+                    <p:cTn id="3" fill="hold">
+                      <p:stCondLst>
+                        <p:cond delay="indefinite"/>
+                      </p:stCondLst>
+                      <p:childTnLst>
+                        <p:par>
+                          <p:cTn id="4" fill="hold">
+                            <p:stCondLst>
+                              <p:cond delay="0"/>
+                            </p:stCondLst>
+                            <p:childTnLst>
+                              <p:par>
+                                <p:cTn id="5" presetID="3" presetClass="emph" presetSubtype="2" fill="hold" nodeType="clickEffect">
+                                  <p:stCondLst>
+                                    <p:cond delay="0"/>
+                                  </p:stCondLst>
+                                  <p:childTnLst>
+                                    <p:animClr clrSpc="rgb" dir="cw">
+                                      <p:cBhvr override="childStyle">
+                                        <p:cTn id="6" dur="500" fill="hold"/>
+                                        <p:tgtEl>
+                                          <p:spTgt spid="3">
+                                            <p:txEl>
+                                              <p:pRg st="7" end="7"/>
+                                            </p:txEl>
+                                          </p:spTgt>
+                                        </p:tgtEl>
+                                        <p:attrNameLst>
+                                          <p:attrName>style.color</p:attrName>
+                                        </p:attrNameLst>
+                                      </p:cBhvr>
+                                      <p:to>
+                                        <a:srgbClr val="FF0000"/>
+                                      </p:to>
+                                    </p:animClr>
+                                  </p:childTnLst>
+                                </p:cTn>
+                              </p:par>
+                            </p:childTnLst>
+                          </p:cTn>
+                        </p:par>
+                      </p:childTnLst>
+                    </p:cTn>
+                  </p:par>
+                </p:childTnLst>
+              </p:cTn>
+              <p:prevCondLst>
+                <p:cond evt="onPrev" delay="0">
+                  <p:tgtEl>
+                    <p:sldTgt/>
+                  </p:tgtEl>
+                </p:cond>
+              </p:prevCondLst>
+              <p:nextCondLst>
+                <p:cond evt="onNext" delay="0">
+                  <p:tgtEl>
+                    <p:sldTgt/>
+                  </p:tgtEl>
+                </p:cond>
+              </p:nextCondLst>
+            </p:seq>
+          </p:childTnLst>
+        </p:cTn>
       </p:par>
     </p:tnLst>
   </p:timing>
@@ -14170,7 +14227,6 @@
               <a:rPr lang="en-US" dirty="0" smtClean="0"/>
               <a:t>Mocking</a:t>
             </a:r>
-            <a:endParaRPr lang="en-US" dirty="0" smtClean="0"/>
           </a:p>
         </p:txBody>
       </p:sp>
@@ -14194,13 +14250,8 @@
             </a:pPr>
             <a:r>
               <a:rPr lang="en-US" dirty="0" smtClean="0"/>
-              <a:t>With Google </a:t>
-            </a:r>
-            <a:r>
-              <a:rPr lang="en-US" dirty="0" smtClean="0"/>
-              <a:t>Mock</a:t>
-            </a:r>
-            <a:endParaRPr lang="en-US" dirty="0" smtClean="0"/>
+              <a:t>With Google Mock</a:t>
+            </a:r>
           </a:p>
         </p:txBody>
       </p:sp>
@@ -14645,7 +14696,11 @@
             <a:pPr marL="0"/>
             <a:r>
               <a:rPr lang="en-US" altLang="zh-CHT" dirty="0" smtClean="0"/>
-              <a:t>use the </a:t>
+              <a:t>Use </a:t>
+            </a:r>
+            <a:r>
+              <a:rPr lang="en-US" altLang="zh-CHT" dirty="0" smtClean="0"/>
+              <a:t>the </a:t>
             </a:r>
             <a:r>
               <a:rPr lang="en-US" altLang="zh-CHT" dirty="0" smtClean="0">
@@ -15465,7 +15520,7 @@
         <a:effectLst/>
         <a:extLst>
           <a:ext uri="{91240B29-F687-4f45-9708-019B960494DF}">
-            <a14:hiddenLine xmlns="" xmlns:a14="http://schemas.microsoft.com/office/drawing/2010/main" w="25400" cap="flat" cmpd="sng" algn="ctr">
+            <a14:hiddenLine xmlns:a14="http://schemas.microsoft.com/office/drawing/2010/main" xmlns="" w="25400" cap="flat" cmpd="sng" algn="ctr">
               <a:solidFill>
                 <a:srgbClr val="000000"/>
               </a:solidFill>
@@ -15476,7 +15531,7 @@
             </a14:hiddenLine>
           </a:ext>
           <a:ext uri="{AF507438-7753-43e0-B8FC-AC1667EBCBE1}">
-            <a14:hiddenEffects xmlns="" xmlns:a14="http://schemas.microsoft.com/office/drawing/2010/main">
+            <a14:hiddenEffects xmlns:a14="http://schemas.microsoft.com/office/drawing/2010/main" xmlns="">
               <a:effectLst>
                 <a:outerShdw blurRad="63500" dist="38099" dir="2700000" algn="ctr" rotWithShape="0">
                   <a:schemeClr val="bg2">
@@ -15852,7 +15907,7 @@
         <a:effectLst/>
         <a:extLst>
           <a:ext uri="{91240B29-F687-4f45-9708-019B960494DF}">
-            <a14:hiddenLine xmlns="" xmlns:a14="http://schemas.microsoft.com/office/drawing/2010/main" w="25400" cap="flat" cmpd="sng" algn="ctr">
+            <a14:hiddenLine xmlns:a14="http://schemas.microsoft.com/office/drawing/2010/main" xmlns="" w="25400" cap="flat" cmpd="sng" algn="ctr">
               <a:solidFill>
                 <a:srgbClr val="000000"/>
               </a:solidFill>
@@ -15863,7 +15918,7 @@
             </a14:hiddenLine>
           </a:ext>
           <a:ext uri="{AF507438-7753-43e0-B8FC-AC1667EBCBE1}">
-            <a14:hiddenEffects xmlns="" xmlns:a14="http://schemas.microsoft.com/office/drawing/2010/main">
+            <a14:hiddenEffects xmlns:a14="http://schemas.microsoft.com/office/drawing/2010/main" xmlns="">
               <a:effectLst>
                 <a:outerShdw blurRad="63500" dist="38099" dir="2700000" algn="ctr" rotWithShape="0">
                   <a:schemeClr val="bg2">
@@ -16239,7 +16294,7 @@
         <a:effectLst/>
         <a:extLst>
           <a:ext uri="{91240B29-F687-4f45-9708-019B960494DF}">
-            <a14:hiddenLine xmlns="" xmlns:a14="http://schemas.microsoft.com/office/drawing/2010/main" w="25400" cap="flat" cmpd="sng" algn="ctr">
+            <a14:hiddenLine xmlns:a14="http://schemas.microsoft.com/office/drawing/2010/main" xmlns="" w="25400" cap="flat" cmpd="sng" algn="ctr">
               <a:solidFill>
                 <a:srgbClr val="000000"/>
               </a:solidFill>
@@ -16250,7 +16305,7 @@
             </a14:hiddenLine>
           </a:ext>
           <a:ext uri="{AF507438-7753-43e0-B8FC-AC1667EBCBE1}">
-            <a14:hiddenEffects xmlns="" xmlns:a14="http://schemas.microsoft.com/office/drawing/2010/main">
+            <a14:hiddenEffects xmlns:a14="http://schemas.microsoft.com/office/drawing/2010/main" xmlns="">
               <a:effectLst>
                 <a:outerShdw blurRad="63500" dist="38099" dir="2700000" algn="ctr" rotWithShape="0">
                   <a:schemeClr val="bg2">

</xml_diff>

<commit_message>
update 02-stubs & mocks
</commit_message>
<xml_diff>
--- a/.slides/02-stubs-and-mocks.pptx
+++ b/.slides/02-stubs-and-mocks.pptx
@@ -303,7 +303,7 @@
               <a:pPr>
                 <a:defRPr/>
               </a:pPr>
-              <a:t>4/6/15</a:t>
+              <a:t>4/8/2015</a:t>
             </a:fld>
             <a:endParaRPr lang="en-US"/>
           </a:p>
@@ -655,7 +655,7 @@
           <a:lstStyle/>
           <a:p>
             <a:r>
-              <a:rPr lang="zh-CHS" altLang="en-US" dirty="0" smtClean="0"/>
+              <a:rPr lang="zh-Hans" altLang="en-US" dirty="0" smtClean="0"/>
               <a:t>介绍新需求</a:t>
             </a:r>
             <a:endParaRPr lang="en-US" dirty="0"/>
@@ -753,15 +753,15 @@
               <a:buChar char="•"/>
             </a:pPr>
             <a:r>
-              <a:rPr lang="zh-CHS" altLang="en-US" dirty="0" smtClean="0"/>
+              <a:rPr lang="zh-Hans" altLang="en-US" dirty="0" smtClean="0"/>
               <a:t>更新代码</a:t>
             </a:r>
             <a:r>
-              <a:rPr lang="en-US" altLang="zh-CHS" dirty="0" smtClean="0"/>
+              <a:rPr lang="en-US" altLang="zh-Hans" dirty="0" smtClean="0"/>
               <a:t>, </a:t>
             </a:r>
             <a:r>
-              <a:rPr lang="zh-CHS" altLang="en-US" dirty="0" smtClean="0"/>
+              <a:rPr lang="zh-Hans" altLang="en-US" dirty="0" smtClean="0"/>
               <a:t>后续课程均需进行此步</a:t>
             </a:r>
           </a:p>
@@ -771,39 +771,39 @@
               <a:buChar char="•"/>
             </a:pPr>
             <a:r>
-              <a:rPr lang="zh-CHS" altLang="en-US" dirty="0" smtClean="0"/>
+              <a:rPr lang="zh-Hans" altLang="en-US" dirty="0" smtClean="0"/>
               <a:t>重构使</a:t>
             </a:r>
             <a:r>
-              <a:rPr lang="en-US" altLang="zh-CHS" dirty="0" smtClean="0"/>
+              <a:rPr lang="en-US" altLang="zh-Hans" dirty="0" smtClean="0"/>
               <a:t>Librarian</a:t>
             </a:r>
             <a:r>
-              <a:rPr lang="zh-CHS" altLang="en-US" dirty="0" smtClean="0"/>
+              <a:rPr lang="zh-Hans" altLang="en-US" dirty="0" smtClean="0"/>
               <a:t>对象支持新的</a:t>
             </a:r>
             <a:r>
-              <a:rPr lang="en-US" altLang="zh-CHS" dirty="0" smtClean="0"/>
+              <a:rPr lang="en-US" altLang="zh-Hans" dirty="0" smtClean="0"/>
               <a:t>Book</a:t>
             </a:r>
             <a:r>
-              <a:rPr lang="zh-CHS" altLang="en-US" dirty="0" smtClean="0"/>
+              <a:rPr lang="zh-Hans" altLang="en-US" dirty="0" smtClean="0"/>
               <a:t>依赖</a:t>
             </a:r>
             <a:r>
-              <a:rPr lang="en-US" altLang="zh-CHS" dirty="0" smtClean="0"/>
+              <a:rPr lang="en-US" altLang="zh-Hans" dirty="0" smtClean="0"/>
               <a:t>, </a:t>
             </a:r>
             <a:r>
-              <a:rPr lang="zh-CHS" altLang="en-US" dirty="0" smtClean="0"/>
+              <a:rPr lang="zh-Hans" altLang="en-US" dirty="0" smtClean="0"/>
               <a:t>测试可以通过</a:t>
             </a:r>
             <a:r>
-              <a:rPr lang="en-US" altLang="zh-CHS" dirty="0" smtClean="0"/>
+              <a:rPr lang="en-US" altLang="zh-Hans" dirty="0" smtClean="0"/>
               <a:t>Book</a:t>
             </a:r>
             <a:r>
-              <a:rPr lang="zh-CHS" altLang="en-US" dirty="0" smtClean="0"/>
+              <a:rPr lang="zh-Hans" altLang="en-US" dirty="0" smtClean="0"/>
               <a:t>真实对象实现</a:t>
             </a:r>
           </a:p>
@@ -813,34 +813,34 @@
               <a:buChar char="•"/>
             </a:pPr>
             <a:r>
-              <a:rPr lang="en-US" altLang="zh-CHS" dirty="0" smtClean="0"/>
+              <a:rPr lang="en-US" altLang="zh-Hans" dirty="0" smtClean="0"/>
               <a:t>Librarian::store(vendor)</a:t>
             </a:r>
             <a:r>
-              <a:rPr lang="zh-CHS" altLang="en-US" dirty="0" smtClean="0"/>
+              <a:rPr lang="zh-Hans" altLang="en-US" dirty="0" smtClean="0"/>
               <a:t>需要构造一个</a:t>
             </a:r>
             <a:r>
-              <a:rPr lang="en-US" altLang="zh-CHS" dirty="0" smtClean="0"/>
+              <a:rPr lang="en-US" altLang="zh-Hans" dirty="0" smtClean="0"/>
               <a:t>`</a:t>
             </a:r>
             <a:r>
-              <a:rPr lang="zh-CHS" altLang="en-US" dirty="0" smtClean="0"/>
+              <a:rPr lang="zh-Hans" altLang="en-US" dirty="0" smtClean="0"/>
               <a:t>假</a:t>
             </a:r>
             <a:r>
-              <a:rPr lang="en-US" altLang="zh-CHS" dirty="0" smtClean="0"/>
+              <a:rPr lang="en-US" altLang="zh-Hans" dirty="0" smtClean="0"/>
               <a:t>`</a:t>
             </a:r>
             <a:r>
-              <a:rPr lang="zh-CHS" altLang="en-US" dirty="0" smtClean="0"/>
+              <a:rPr lang="zh-Hans" altLang="en-US" dirty="0" smtClean="0"/>
               <a:t>的</a:t>
             </a:r>
             <a:r>
-              <a:rPr lang="en-US" altLang="zh-CHS" dirty="0" smtClean="0"/>
+              <a:rPr lang="en-US" altLang="zh-Hans" dirty="0" smtClean="0"/>
               <a:t>vendor</a:t>
             </a:r>
-            <a:endParaRPr lang="zh-CHS" altLang="en-US" dirty="0" smtClean="0"/>
+            <a:endParaRPr lang="zh-Hans" altLang="en-US" dirty="0" smtClean="0"/>
           </a:p>
           <a:p>
             <a:pPr marL="171450" indent="-171450">
@@ -942,15 +942,15 @@
               <a:buChar char="•"/>
             </a:pPr>
             <a:r>
-              <a:rPr lang="zh-CHS" altLang="en-US" dirty="0" smtClean="0"/>
+              <a:rPr lang="zh-Hans" altLang="en-US" dirty="0" smtClean="0"/>
               <a:t>通过</a:t>
             </a:r>
             <a:r>
-              <a:rPr lang="en-US" altLang="zh-CHS" dirty="0" smtClean="0"/>
+              <a:rPr lang="en-US" altLang="zh-Hans" dirty="0" smtClean="0"/>
               <a:t>EXPECT</a:t>
             </a:r>
             <a:r>
-              <a:rPr lang="zh-CHS" altLang="en-US" dirty="0" smtClean="0"/>
+              <a:rPr lang="zh-Hans" altLang="en-US" dirty="0" smtClean="0"/>
               <a:t>对传入参数设置期望</a:t>
             </a:r>
           </a:p>
@@ -960,15 +960,15 @@
               <a:buChar char="•"/>
             </a:pPr>
             <a:r>
-              <a:rPr lang="zh-CHS" altLang="en-US" dirty="0" smtClean="0"/>
+              <a:rPr lang="zh-Hans" altLang="en-US" dirty="0" smtClean="0"/>
               <a:t>通过</a:t>
             </a:r>
             <a:r>
-              <a:rPr lang="en-US" altLang="zh-CHS" dirty="0" smtClean="0"/>
+              <a:rPr lang="en-US" altLang="zh-Hans" dirty="0" smtClean="0"/>
               <a:t>Times</a:t>
             </a:r>
             <a:r>
-              <a:rPr lang="zh-CHS" altLang="en-US" dirty="0" smtClean="0"/>
+              <a:rPr lang="zh-Hans" altLang="en-US" dirty="0" smtClean="0"/>
               <a:t>限制付款次数</a:t>
             </a:r>
             <a:endParaRPr lang="en-US" dirty="0"/>
@@ -1061,7 +1061,7 @@
           </a:ln>
           <a:extLst>
             <a:ext uri="{909E8E84-426E-40dd-AFC4-6F175D3DCCD1}">
-              <a14:hiddenFill xmlns:a14="http://schemas.microsoft.com/office/drawing/2010/main" xmlns="">
+              <a14:hiddenFill xmlns="" xmlns:a14="http://schemas.microsoft.com/office/drawing/2010/main">
                 <a:noFill/>
               </a14:hiddenFill>
             </a:ext>
@@ -1105,7 +1105,7 @@
           </a:ln>
           <a:extLst>
             <a:ext uri="{909E8E84-426E-40dd-AFC4-6F175D3DCCD1}">
-              <a14:hiddenFill xmlns:a14="http://schemas.microsoft.com/office/drawing/2010/main" xmlns="">
+              <a14:hiddenFill xmlns="" xmlns:a14="http://schemas.microsoft.com/office/drawing/2010/main">
                 <a:noFill/>
               </a14:hiddenFill>
             </a:ext>
@@ -1154,14 +1154,14 @@
           </a:ln>
           <a:extLst>
             <a:ext uri="{909E8E84-426E-40dd-AFC4-6F175D3DCCD1}">
-              <a14:hiddenFill xmlns:a14="http://schemas.microsoft.com/office/drawing/2010/main" xmlns="">
+              <a14:hiddenFill xmlns="" xmlns:a14="http://schemas.microsoft.com/office/drawing/2010/main">
                 <a:solidFill>
                   <a:srgbClr val="FFFFFF"/>
                 </a:solidFill>
               </a14:hiddenFill>
             </a:ext>
             <a:ext uri="{91240B29-F687-4f45-9708-019B960494DF}">
-              <a14:hiddenLine xmlns:a14="http://schemas.microsoft.com/office/drawing/2010/main" xmlns="" w="9525">
+              <a14:hiddenLine xmlns="" xmlns:a14="http://schemas.microsoft.com/office/drawing/2010/main" w="9525">
                 <a:solidFill>
                   <a:srgbClr val="000000"/>
                 </a:solidFill>
@@ -1200,7 +1200,7 @@
           </a:lstStyle>
           <a:p>
             <a:r>
-              <a:rPr lang="zh-CHS" altLang="en-US" smtClean="0"/>
+              <a:rPr lang="zh-Hans" altLang="en-US" smtClean="0"/>
               <a:t>单击此处编辑母版标题样式</a:t>
             </a:r>
             <a:endParaRPr lang="en-US" dirty="0"/>
@@ -1260,35 +1260,35 @@
           <a:p>
             <a:pPr lvl="0"/>
             <a:r>
-              <a:rPr lang="zh-CHS" altLang="en-US" smtClean="0"/>
+              <a:rPr lang="zh-Hans" altLang="en-US" smtClean="0"/>
               <a:t>单击此处编辑母版文本样式</a:t>
             </a:r>
           </a:p>
           <a:p>
             <a:pPr lvl="1"/>
             <a:r>
-              <a:rPr lang="zh-CHS" altLang="en-US" smtClean="0"/>
+              <a:rPr lang="zh-Hans" altLang="en-US" smtClean="0"/>
               <a:t>第二级</a:t>
             </a:r>
           </a:p>
           <a:p>
             <a:pPr lvl="2"/>
             <a:r>
-              <a:rPr lang="zh-CHS" altLang="en-US" smtClean="0"/>
+              <a:rPr lang="zh-Hans" altLang="en-US" smtClean="0"/>
               <a:t>第三级</a:t>
             </a:r>
           </a:p>
           <a:p>
             <a:pPr lvl="3"/>
             <a:r>
-              <a:rPr lang="zh-CHS" altLang="en-US" smtClean="0"/>
+              <a:rPr lang="zh-Hans" altLang="en-US" smtClean="0"/>
               <a:t>第四级</a:t>
             </a:r>
           </a:p>
           <a:p>
             <a:pPr lvl="4"/>
             <a:r>
-              <a:rPr lang="zh-CHS" altLang="en-US" smtClean="0"/>
+              <a:rPr lang="zh-Hans" altLang="en-US" smtClean="0"/>
               <a:t>第五级</a:t>
             </a:r>
             <a:endParaRPr lang="en-US" dirty="0"/>
@@ -1371,7 +1371,7 @@
           <a:p>
             <a:pPr lvl="0"/>
             <a:r>
-              <a:rPr lang="zh-CHS" altLang="en-US" smtClean="0"/>
+              <a:rPr lang="zh-Hans" altLang="en-US" smtClean="0"/>
               <a:t>单击此处编辑母版文本样式</a:t>
             </a:r>
           </a:p>
@@ -1506,7 +1506,7 @@
           </a:ln>
           <a:extLst>
             <a:ext uri="{909E8E84-426E-40dd-AFC4-6F175D3DCCD1}">
-              <a14:hiddenFill xmlns:a14="http://schemas.microsoft.com/office/drawing/2010/main" xmlns="">
+              <a14:hiddenFill xmlns="" xmlns:a14="http://schemas.microsoft.com/office/drawing/2010/main">
                 <a:noFill/>
               </a14:hiddenFill>
             </a:ext>
@@ -1555,14 +1555,14 @@
           </a:ln>
           <a:extLst>
             <a:ext uri="{909E8E84-426E-40dd-AFC4-6F175D3DCCD1}">
-              <a14:hiddenFill xmlns:a14="http://schemas.microsoft.com/office/drawing/2010/main" xmlns="">
+              <a14:hiddenFill xmlns="" xmlns:a14="http://schemas.microsoft.com/office/drawing/2010/main">
                 <a:solidFill>
                   <a:srgbClr val="FFFFFF"/>
                 </a:solidFill>
               </a14:hiddenFill>
             </a:ext>
             <a:ext uri="{91240B29-F687-4f45-9708-019B960494DF}">
-              <a14:hiddenLine xmlns:a14="http://schemas.microsoft.com/office/drawing/2010/main" xmlns="" w="9525">
+              <a14:hiddenLine xmlns="" xmlns:a14="http://schemas.microsoft.com/office/drawing/2010/main" w="9525">
                 <a:solidFill>
                   <a:srgbClr val="000000"/>
                 </a:solidFill>
@@ -1601,7 +1601,7 @@
           </a:lstStyle>
           <a:p>
             <a:r>
-              <a:rPr lang="zh-CHS" altLang="en-US" smtClean="0"/>
+              <a:rPr lang="zh-Hans" altLang="en-US" smtClean="0"/>
               <a:t>单击此处编辑母版标题样式</a:t>
             </a:r>
             <a:endParaRPr lang="en-US" dirty="0"/>
@@ -1696,35 +1696,35 @@
           <a:p>
             <a:pPr lvl="0"/>
             <a:r>
-              <a:rPr lang="zh-CHS" altLang="en-US" smtClean="0"/>
+              <a:rPr lang="zh-Hans" altLang="en-US" smtClean="0"/>
               <a:t>单击此处编辑母版文本样式</a:t>
             </a:r>
           </a:p>
           <a:p>
             <a:pPr lvl="1"/>
             <a:r>
-              <a:rPr lang="zh-CHS" altLang="en-US" smtClean="0"/>
+              <a:rPr lang="zh-Hans" altLang="en-US" smtClean="0"/>
               <a:t>第二级</a:t>
             </a:r>
           </a:p>
           <a:p>
             <a:pPr lvl="2"/>
             <a:r>
-              <a:rPr lang="zh-CHS" altLang="en-US" smtClean="0"/>
+              <a:rPr lang="zh-Hans" altLang="en-US" smtClean="0"/>
               <a:t>第三级</a:t>
             </a:r>
           </a:p>
           <a:p>
             <a:pPr lvl="3"/>
             <a:r>
-              <a:rPr lang="zh-CHS" altLang="en-US" smtClean="0"/>
+              <a:rPr lang="zh-Hans" altLang="en-US" smtClean="0"/>
               <a:t>第四级</a:t>
             </a:r>
           </a:p>
           <a:p>
             <a:pPr lvl="4"/>
             <a:r>
-              <a:rPr lang="zh-CHS" altLang="en-US" smtClean="0"/>
+              <a:rPr lang="zh-Hans" altLang="en-US" smtClean="0"/>
               <a:t>第五级</a:t>
             </a:r>
             <a:endParaRPr lang="en-US" dirty="0"/>
@@ -1789,7 +1789,7 @@
           </a:ln>
           <a:extLst>
             <a:ext uri="{909E8E84-426E-40dd-AFC4-6F175D3DCCD1}">
-              <a14:hiddenFill xmlns:a14="http://schemas.microsoft.com/office/drawing/2010/main" xmlns="">
+              <a14:hiddenFill xmlns="" xmlns:a14="http://schemas.microsoft.com/office/drawing/2010/main">
                 <a:noFill/>
               </a14:hiddenFill>
             </a:ext>
@@ -1833,7 +1833,7 @@
           </a:ln>
           <a:extLst>
             <a:ext uri="{909E8E84-426E-40dd-AFC4-6F175D3DCCD1}">
-              <a14:hiddenFill xmlns:a14="http://schemas.microsoft.com/office/drawing/2010/main" xmlns="">
+              <a14:hiddenFill xmlns="" xmlns:a14="http://schemas.microsoft.com/office/drawing/2010/main">
                 <a:noFill/>
               </a14:hiddenFill>
             </a:ext>
@@ -1882,14 +1882,14 @@
           </a:ln>
           <a:extLst>
             <a:ext uri="{909E8E84-426E-40dd-AFC4-6F175D3DCCD1}">
-              <a14:hiddenFill xmlns:a14="http://schemas.microsoft.com/office/drawing/2010/main" xmlns="">
+              <a14:hiddenFill xmlns="" xmlns:a14="http://schemas.microsoft.com/office/drawing/2010/main">
                 <a:solidFill>
                   <a:srgbClr val="FFFFFF"/>
                 </a:solidFill>
               </a14:hiddenFill>
             </a:ext>
             <a:ext uri="{91240B29-F687-4f45-9708-019B960494DF}">
-              <a14:hiddenLine xmlns:a14="http://schemas.microsoft.com/office/drawing/2010/main" xmlns="" w="9525">
+              <a14:hiddenLine xmlns="" xmlns:a14="http://schemas.microsoft.com/office/drawing/2010/main" w="9525">
                 <a:solidFill>
                   <a:srgbClr val="000000"/>
                 </a:solidFill>
@@ -2163,7 +2163,7 @@
           </a:ln>
           <a:extLst>
             <a:ext uri="{909E8E84-426E-40dd-AFC4-6F175D3DCCD1}">
-              <a14:hiddenFill xmlns:a14="http://schemas.microsoft.com/office/drawing/2010/main" xmlns="">
+              <a14:hiddenFill xmlns="" xmlns:a14="http://schemas.microsoft.com/office/drawing/2010/main">
                 <a:noFill/>
               </a14:hiddenFill>
             </a:ext>
@@ -2368,7 +2368,7 @@
           </a:ln>
           <a:extLst>
             <a:ext uri="{909E8E84-426E-40dd-AFC4-6F175D3DCCD1}">
-              <a14:hiddenFill xmlns:a14="http://schemas.microsoft.com/office/drawing/2010/main" xmlns="">
+              <a14:hiddenFill xmlns="" xmlns:a14="http://schemas.microsoft.com/office/drawing/2010/main">
                 <a:noFill/>
               </a14:hiddenFill>
             </a:ext>
@@ -2578,7 +2578,7 @@
           </a:ln>
           <a:extLst>
             <a:ext uri="{909E8E84-426E-40dd-AFC4-6F175D3DCCD1}">
-              <a14:hiddenFill xmlns:a14="http://schemas.microsoft.com/office/drawing/2010/main" xmlns="">
+              <a14:hiddenFill xmlns="" xmlns:a14="http://schemas.microsoft.com/office/drawing/2010/main">
                 <a:noFill/>
               </a14:hiddenFill>
             </a:ext>
@@ -2829,7 +2829,7 @@
           </a:ln>
           <a:extLst>
             <a:ext uri="{909E8E84-426E-40dd-AFC4-6F175D3DCCD1}">
-              <a14:hiddenFill xmlns:a14="http://schemas.microsoft.com/office/drawing/2010/main" xmlns="">
+              <a14:hiddenFill xmlns="" xmlns:a14="http://schemas.microsoft.com/office/drawing/2010/main">
                 <a:noFill/>
               </a14:hiddenFill>
             </a:ext>
@@ -2878,14 +2878,14 @@
           </a:ln>
           <a:extLst>
             <a:ext uri="{909E8E84-426E-40dd-AFC4-6F175D3DCCD1}">
-              <a14:hiddenFill xmlns:a14="http://schemas.microsoft.com/office/drawing/2010/main" xmlns="">
+              <a14:hiddenFill xmlns="" xmlns:a14="http://schemas.microsoft.com/office/drawing/2010/main">
                 <a:solidFill>
                   <a:srgbClr val="FFFFFF"/>
                 </a:solidFill>
               </a14:hiddenFill>
             </a:ext>
             <a:ext uri="{91240B29-F687-4f45-9708-019B960494DF}">
-              <a14:hiddenLine xmlns:a14="http://schemas.microsoft.com/office/drawing/2010/main" xmlns="" w="9525">
+              <a14:hiddenLine xmlns="" xmlns:a14="http://schemas.microsoft.com/office/drawing/2010/main" w="9525">
                 <a:solidFill>
                   <a:srgbClr val="000000"/>
                 </a:solidFill>
@@ -3147,7 +3147,7 @@
           </a:ln>
           <a:extLst>
             <a:ext uri="{909E8E84-426E-40dd-AFC4-6F175D3DCCD1}">
-              <a14:hiddenFill xmlns:a14="http://schemas.microsoft.com/office/drawing/2010/main" xmlns="">
+              <a14:hiddenFill xmlns="" xmlns:a14="http://schemas.microsoft.com/office/drawing/2010/main">
                 <a:noFill/>
               </a14:hiddenFill>
             </a:ext>
@@ -3196,14 +3196,14 @@
           </a:ln>
           <a:extLst>
             <a:ext uri="{909E8E84-426E-40dd-AFC4-6F175D3DCCD1}">
-              <a14:hiddenFill xmlns:a14="http://schemas.microsoft.com/office/drawing/2010/main" xmlns="">
+              <a14:hiddenFill xmlns="" xmlns:a14="http://schemas.microsoft.com/office/drawing/2010/main">
                 <a:solidFill>
                   <a:srgbClr val="FFFFFF"/>
                 </a:solidFill>
               </a14:hiddenFill>
             </a:ext>
             <a:ext uri="{91240B29-F687-4f45-9708-019B960494DF}">
-              <a14:hiddenLine xmlns:a14="http://schemas.microsoft.com/office/drawing/2010/main" xmlns="" w="9525">
+              <a14:hiddenLine xmlns="" xmlns:a14="http://schemas.microsoft.com/office/drawing/2010/main" w="9525">
                 <a:solidFill>
                   <a:srgbClr val="000000"/>
                 </a:solidFill>
@@ -3848,7 +3848,7 @@
           </a:ln>
           <a:extLst>
             <a:ext uri="{909E8E84-426E-40dd-AFC4-6F175D3DCCD1}">
-              <a14:hiddenFill xmlns:a14="http://schemas.microsoft.com/office/drawing/2010/main" xmlns="">
+              <a14:hiddenFill xmlns="" xmlns:a14="http://schemas.microsoft.com/office/drawing/2010/main">
                 <a:noFill/>
               </a14:hiddenFill>
             </a:ext>
@@ -3878,7 +3878,7 @@
           <a:lstStyle/>
           <a:p>
             <a:r>
-              <a:rPr lang="zh-CHS" altLang="en-US" smtClean="0"/>
+              <a:rPr lang="zh-Hans" altLang="en-US" smtClean="0"/>
               <a:t>单击此处编辑母版标题样式</a:t>
             </a:r>
             <a:endParaRPr lang="en-US"/>
@@ -3915,35 +3915,35 @@
           <a:p>
             <a:pPr lvl="0"/>
             <a:r>
-              <a:rPr lang="zh-CHS" altLang="en-US" smtClean="0"/>
+              <a:rPr lang="zh-Hans" altLang="en-US" smtClean="0"/>
               <a:t>单击此处编辑母版文本样式</a:t>
             </a:r>
           </a:p>
           <a:p>
             <a:pPr lvl="1"/>
             <a:r>
-              <a:rPr lang="zh-CHS" altLang="en-US" smtClean="0"/>
+              <a:rPr lang="zh-Hans" altLang="en-US" smtClean="0"/>
               <a:t>第二级</a:t>
             </a:r>
           </a:p>
           <a:p>
             <a:pPr lvl="2"/>
             <a:r>
-              <a:rPr lang="zh-CHS" altLang="en-US" smtClean="0"/>
+              <a:rPr lang="zh-Hans" altLang="en-US" smtClean="0"/>
               <a:t>第三级</a:t>
             </a:r>
           </a:p>
           <a:p>
             <a:pPr lvl="3"/>
             <a:r>
-              <a:rPr lang="zh-CHS" altLang="en-US" smtClean="0"/>
+              <a:rPr lang="zh-Hans" altLang="en-US" smtClean="0"/>
               <a:t>第四级</a:t>
             </a:r>
           </a:p>
           <a:p>
             <a:pPr lvl="4"/>
             <a:r>
-              <a:rPr lang="zh-CHS" altLang="en-US" smtClean="0"/>
+              <a:rPr lang="zh-Hans" altLang="en-US" smtClean="0"/>
               <a:t>第五级</a:t>
             </a:r>
             <a:endParaRPr lang="en-US" dirty="0"/>
@@ -4041,7 +4041,7 @@
           </a:ln>
           <a:extLst>
             <a:ext uri="{909E8E84-426E-40dd-AFC4-6F175D3DCCD1}">
-              <a14:hiddenFill xmlns:a14="http://schemas.microsoft.com/office/drawing/2010/main" xmlns="">
+              <a14:hiddenFill xmlns="" xmlns:a14="http://schemas.microsoft.com/office/drawing/2010/main">
                 <a:noFill/>
               </a14:hiddenFill>
             </a:ext>
@@ -4082,7 +4082,7 @@
           </a:ln>
           <a:extLst>
             <a:ext uri="{909E8E84-426E-40dd-AFC4-6F175D3DCCD1}">
-              <a14:hiddenFill xmlns:a14="http://schemas.microsoft.com/office/drawing/2010/main" xmlns="">
+              <a14:hiddenFill xmlns="" xmlns:a14="http://schemas.microsoft.com/office/drawing/2010/main">
                 <a:noFill/>
               </a14:hiddenFill>
             </a:ext>
@@ -4293,7 +4293,7 @@
           </a:ln>
           <a:extLst>
             <a:ext uri="{909E8E84-426E-40dd-AFC4-6F175D3DCCD1}">
-              <a14:hiddenFill xmlns:a14="http://schemas.microsoft.com/office/drawing/2010/main" xmlns="">
+              <a14:hiddenFill xmlns="" xmlns:a14="http://schemas.microsoft.com/office/drawing/2010/main">
                 <a:noFill/>
               </a14:hiddenFill>
             </a:ext>
@@ -4342,14 +4342,14 @@
           </a:ln>
           <a:extLst>
             <a:ext uri="{909E8E84-426E-40dd-AFC4-6F175D3DCCD1}">
-              <a14:hiddenFill xmlns:a14="http://schemas.microsoft.com/office/drawing/2010/main" xmlns="">
+              <a14:hiddenFill xmlns="" xmlns:a14="http://schemas.microsoft.com/office/drawing/2010/main">
                 <a:solidFill>
                   <a:srgbClr val="FFFFFF"/>
                 </a:solidFill>
               </a14:hiddenFill>
             </a:ext>
             <a:ext uri="{91240B29-F687-4f45-9708-019B960494DF}">
-              <a14:hiddenLine xmlns:a14="http://schemas.microsoft.com/office/drawing/2010/main" xmlns="" w="9525">
+              <a14:hiddenLine xmlns="" xmlns:a14="http://schemas.microsoft.com/office/drawing/2010/main" w="9525">
                 <a:solidFill>
                   <a:srgbClr val="000000"/>
                 </a:solidFill>
@@ -4580,7 +4580,7 @@
           </a:ln>
           <a:extLst>
             <a:ext uri="{909E8E84-426E-40dd-AFC4-6F175D3DCCD1}">
-              <a14:hiddenFill xmlns:a14="http://schemas.microsoft.com/office/drawing/2010/main" xmlns="">
+              <a14:hiddenFill xmlns="" xmlns:a14="http://schemas.microsoft.com/office/drawing/2010/main">
                 <a:noFill/>
               </a14:hiddenFill>
             </a:ext>
@@ -4624,7 +4624,7 @@
           </a:ln>
           <a:extLst>
             <a:ext uri="{909E8E84-426E-40dd-AFC4-6F175D3DCCD1}">
-              <a14:hiddenFill xmlns:a14="http://schemas.microsoft.com/office/drawing/2010/main" xmlns="">
+              <a14:hiddenFill xmlns="" xmlns:a14="http://schemas.microsoft.com/office/drawing/2010/main">
                 <a:noFill/>
               </a14:hiddenFill>
             </a:ext>
@@ -4673,14 +4673,14 @@
           </a:ln>
           <a:extLst>
             <a:ext uri="{909E8E84-426E-40dd-AFC4-6F175D3DCCD1}">
-              <a14:hiddenFill xmlns:a14="http://schemas.microsoft.com/office/drawing/2010/main" xmlns="">
+              <a14:hiddenFill xmlns="" xmlns:a14="http://schemas.microsoft.com/office/drawing/2010/main">
                 <a:solidFill>
                   <a:srgbClr val="FFFFFF"/>
                 </a:solidFill>
               </a14:hiddenFill>
             </a:ext>
             <a:ext uri="{91240B29-F687-4f45-9708-019B960494DF}">
-              <a14:hiddenLine xmlns:a14="http://schemas.microsoft.com/office/drawing/2010/main" xmlns="" w="9525">
+              <a14:hiddenLine xmlns="" xmlns:a14="http://schemas.microsoft.com/office/drawing/2010/main" w="9525">
                 <a:solidFill>
                   <a:srgbClr val="000000"/>
                 </a:solidFill>
@@ -4954,7 +4954,7 @@
           </a:ln>
           <a:extLst>
             <a:ext uri="{909E8E84-426E-40dd-AFC4-6F175D3DCCD1}">
-              <a14:hiddenFill xmlns:a14="http://schemas.microsoft.com/office/drawing/2010/main" xmlns="">
+              <a14:hiddenFill xmlns="" xmlns:a14="http://schemas.microsoft.com/office/drawing/2010/main">
                 <a:noFill/>
               </a14:hiddenFill>
             </a:ext>
@@ -5168,7 +5168,7 @@
           </a:ln>
           <a:extLst>
             <a:ext uri="{909E8E84-426E-40dd-AFC4-6F175D3DCCD1}">
-              <a14:hiddenFill xmlns:a14="http://schemas.microsoft.com/office/drawing/2010/main" xmlns="">
+              <a14:hiddenFill xmlns="" xmlns:a14="http://schemas.microsoft.com/office/drawing/2010/main">
                 <a:noFill/>
               </a14:hiddenFill>
             </a:ext>
@@ -5387,7 +5387,7 @@
           </a:ln>
           <a:extLst>
             <a:ext uri="{909E8E84-426E-40dd-AFC4-6F175D3DCCD1}">
-              <a14:hiddenFill xmlns:a14="http://schemas.microsoft.com/office/drawing/2010/main" xmlns="">
+              <a14:hiddenFill xmlns="" xmlns:a14="http://schemas.microsoft.com/office/drawing/2010/main">
                 <a:noFill/>
               </a14:hiddenFill>
             </a:ext>
@@ -5638,7 +5638,7 @@
           </a:ln>
           <a:extLst>
             <a:ext uri="{909E8E84-426E-40dd-AFC4-6F175D3DCCD1}">
-              <a14:hiddenFill xmlns:a14="http://schemas.microsoft.com/office/drawing/2010/main" xmlns="">
+              <a14:hiddenFill xmlns="" xmlns:a14="http://schemas.microsoft.com/office/drawing/2010/main">
                 <a:noFill/>
               </a14:hiddenFill>
             </a:ext>
@@ -5687,14 +5687,14 @@
           </a:ln>
           <a:extLst>
             <a:ext uri="{909E8E84-426E-40dd-AFC4-6F175D3DCCD1}">
-              <a14:hiddenFill xmlns:a14="http://schemas.microsoft.com/office/drawing/2010/main" xmlns="">
+              <a14:hiddenFill xmlns="" xmlns:a14="http://schemas.microsoft.com/office/drawing/2010/main">
                 <a:solidFill>
                   <a:srgbClr val="FFFFFF"/>
                 </a:solidFill>
               </a14:hiddenFill>
             </a:ext>
             <a:ext uri="{91240B29-F687-4f45-9708-019B960494DF}">
-              <a14:hiddenLine xmlns:a14="http://schemas.microsoft.com/office/drawing/2010/main" xmlns="" w="9525">
+              <a14:hiddenLine xmlns="" xmlns:a14="http://schemas.microsoft.com/office/drawing/2010/main" w="9525">
                 <a:solidFill>
                   <a:srgbClr val="000000"/>
                 </a:solidFill>
@@ -5956,7 +5956,7 @@
           </a:ln>
           <a:extLst>
             <a:ext uri="{909E8E84-426E-40dd-AFC4-6F175D3DCCD1}">
-              <a14:hiddenFill xmlns:a14="http://schemas.microsoft.com/office/drawing/2010/main" xmlns="">
+              <a14:hiddenFill xmlns="" xmlns:a14="http://schemas.microsoft.com/office/drawing/2010/main">
                 <a:noFill/>
               </a14:hiddenFill>
             </a:ext>
@@ -6005,14 +6005,14 @@
           </a:ln>
           <a:extLst>
             <a:ext uri="{909E8E84-426E-40dd-AFC4-6F175D3DCCD1}">
-              <a14:hiddenFill xmlns:a14="http://schemas.microsoft.com/office/drawing/2010/main" xmlns="">
+              <a14:hiddenFill xmlns="" xmlns:a14="http://schemas.microsoft.com/office/drawing/2010/main">
                 <a:solidFill>
                   <a:srgbClr val="FFFFFF"/>
                 </a:solidFill>
               </a14:hiddenFill>
             </a:ext>
             <a:ext uri="{91240B29-F687-4f45-9708-019B960494DF}">
-              <a14:hiddenLine xmlns:a14="http://schemas.microsoft.com/office/drawing/2010/main" xmlns="" w="9525">
+              <a14:hiddenLine xmlns="" xmlns:a14="http://schemas.microsoft.com/office/drawing/2010/main" w="9525">
                 <a:solidFill>
                   <a:srgbClr val="000000"/>
                 </a:solidFill>
@@ -6482,7 +6482,7 @@
           </a:ln>
           <a:extLst>
             <a:ext uri="{909E8E84-426E-40dd-AFC4-6F175D3DCCD1}">
-              <a14:hiddenFill xmlns:a14="http://schemas.microsoft.com/office/drawing/2010/main" xmlns="">
+              <a14:hiddenFill xmlns="" xmlns:a14="http://schemas.microsoft.com/office/drawing/2010/main">
                 <a:noFill/>
               </a14:hiddenFill>
             </a:ext>
@@ -6512,7 +6512,7 @@
           <a:lstStyle/>
           <a:p>
             <a:r>
-              <a:rPr lang="zh-CHS" altLang="en-US" smtClean="0"/>
+              <a:rPr lang="zh-Hans" altLang="en-US" smtClean="0"/>
               <a:t>单击此处编辑母版标题样式</a:t>
             </a:r>
             <a:endParaRPr lang="en-US"/>
@@ -6554,35 +6554,35 @@
           <a:p>
             <a:pPr lvl="0"/>
             <a:r>
-              <a:rPr lang="zh-CHS" altLang="en-US" smtClean="0"/>
+              <a:rPr lang="zh-Hans" altLang="en-US" smtClean="0"/>
               <a:t>单击此处编辑母版文本样式</a:t>
             </a:r>
           </a:p>
           <a:p>
             <a:pPr lvl="1"/>
             <a:r>
-              <a:rPr lang="zh-CHS" altLang="en-US" smtClean="0"/>
+              <a:rPr lang="zh-Hans" altLang="en-US" smtClean="0"/>
               <a:t>第二级</a:t>
             </a:r>
           </a:p>
           <a:p>
             <a:pPr lvl="2"/>
             <a:r>
-              <a:rPr lang="zh-CHS" altLang="en-US" smtClean="0"/>
+              <a:rPr lang="zh-Hans" altLang="en-US" smtClean="0"/>
               <a:t>第三级</a:t>
             </a:r>
           </a:p>
           <a:p>
             <a:pPr lvl="3"/>
             <a:r>
-              <a:rPr lang="zh-CHS" altLang="en-US" smtClean="0"/>
+              <a:rPr lang="zh-Hans" altLang="en-US" smtClean="0"/>
               <a:t>第四级</a:t>
             </a:r>
           </a:p>
           <a:p>
             <a:pPr lvl="4"/>
             <a:r>
-              <a:rPr lang="zh-CHS" altLang="en-US" smtClean="0"/>
+              <a:rPr lang="zh-Hans" altLang="en-US" smtClean="0"/>
               <a:t>第五级</a:t>
             </a:r>
             <a:endParaRPr lang="en-US" dirty="0"/>
@@ -6861,7 +6861,7 @@
           </a:ln>
           <a:extLst>
             <a:ext uri="{909E8E84-426E-40dd-AFC4-6F175D3DCCD1}">
-              <a14:hiddenFill xmlns:a14="http://schemas.microsoft.com/office/drawing/2010/main" xmlns="">
+              <a14:hiddenFill xmlns="" xmlns:a14="http://schemas.microsoft.com/office/drawing/2010/main">
                 <a:noFill/>
               </a14:hiddenFill>
             </a:ext>
@@ -6902,7 +6902,7 @@
           </a:ln>
           <a:extLst>
             <a:ext uri="{909E8E84-426E-40dd-AFC4-6F175D3DCCD1}">
-              <a14:hiddenFill xmlns:a14="http://schemas.microsoft.com/office/drawing/2010/main" xmlns="">
+              <a14:hiddenFill xmlns="" xmlns:a14="http://schemas.microsoft.com/office/drawing/2010/main">
                 <a:noFill/>
               </a14:hiddenFill>
             </a:ext>
@@ -7113,7 +7113,7 @@
           </a:ln>
           <a:extLst>
             <a:ext uri="{909E8E84-426E-40dd-AFC4-6F175D3DCCD1}">
-              <a14:hiddenFill xmlns:a14="http://schemas.microsoft.com/office/drawing/2010/main" xmlns="">
+              <a14:hiddenFill xmlns="" xmlns:a14="http://schemas.microsoft.com/office/drawing/2010/main">
                 <a:noFill/>
               </a14:hiddenFill>
             </a:ext>
@@ -7162,14 +7162,14 @@
           </a:ln>
           <a:extLst>
             <a:ext uri="{909E8E84-426E-40dd-AFC4-6F175D3DCCD1}">
-              <a14:hiddenFill xmlns:a14="http://schemas.microsoft.com/office/drawing/2010/main" xmlns="">
+              <a14:hiddenFill xmlns="" xmlns:a14="http://schemas.microsoft.com/office/drawing/2010/main">
                 <a:solidFill>
                   <a:srgbClr val="FFFFFF"/>
                 </a:solidFill>
               </a14:hiddenFill>
             </a:ext>
             <a:ext uri="{91240B29-F687-4f45-9708-019B960494DF}">
-              <a14:hiddenLine xmlns:a14="http://schemas.microsoft.com/office/drawing/2010/main" xmlns="" w="9525">
+              <a14:hiddenLine xmlns="" xmlns:a14="http://schemas.microsoft.com/office/drawing/2010/main" w="9525">
                 <a:solidFill>
                   <a:srgbClr val="000000"/>
                 </a:solidFill>
@@ -7400,7 +7400,7 @@
           </a:ln>
           <a:extLst>
             <a:ext uri="{909E8E84-426E-40dd-AFC4-6F175D3DCCD1}">
-              <a14:hiddenFill xmlns:a14="http://schemas.microsoft.com/office/drawing/2010/main" xmlns="">
+              <a14:hiddenFill xmlns="" xmlns:a14="http://schemas.microsoft.com/office/drawing/2010/main">
                 <a:noFill/>
               </a14:hiddenFill>
             </a:ext>
@@ -7430,7 +7430,7 @@
           <a:lstStyle/>
           <a:p>
             <a:r>
-              <a:rPr lang="zh-CHS" altLang="en-US" smtClean="0"/>
+              <a:rPr lang="zh-Hans" altLang="en-US" smtClean="0"/>
               <a:t>单击此处编辑母版标题样式</a:t>
             </a:r>
             <a:endParaRPr lang="en-US"/>
@@ -7525,35 +7525,35 @@
           <a:p>
             <a:pPr lvl="0"/>
             <a:r>
-              <a:rPr lang="zh-CHS" altLang="en-US" smtClean="0"/>
+              <a:rPr lang="zh-Hans" altLang="en-US" smtClean="0"/>
               <a:t>单击此处编辑母版文本样式</a:t>
             </a:r>
           </a:p>
           <a:p>
             <a:pPr lvl="1"/>
             <a:r>
-              <a:rPr lang="zh-CHS" altLang="en-US" smtClean="0"/>
+              <a:rPr lang="zh-Hans" altLang="en-US" smtClean="0"/>
               <a:t>第二级</a:t>
             </a:r>
           </a:p>
           <a:p>
             <a:pPr lvl="2"/>
             <a:r>
-              <a:rPr lang="zh-CHS" altLang="en-US" smtClean="0"/>
+              <a:rPr lang="zh-Hans" altLang="en-US" smtClean="0"/>
               <a:t>第三级</a:t>
             </a:r>
           </a:p>
           <a:p>
             <a:pPr lvl="3"/>
             <a:r>
-              <a:rPr lang="zh-CHS" altLang="en-US" smtClean="0"/>
+              <a:rPr lang="zh-Hans" altLang="en-US" smtClean="0"/>
               <a:t>第四级</a:t>
             </a:r>
           </a:p>
           <a:p>
             <a:pPr lvl="4"/>
             <a:r>
-              <a:rPr lang="zh-CHS" altLang="en-US" smtClean="0"/>
+              <a:rPr lang="zh-Hans" altLang="en-US" smtClean="0"/>
               <a:t>第五级</a:t>
             </a:r>
             <a:endParaRPr lang="en-US" dirty="0"/>
@@ -7651,7 +7651,7 @@
           </a:ln>
           <a:extLst>
             <a:ext uri="{909E8E84-426E-40dd-AFC4-6F175D3DCCD1}">
-              <a14:hiddenFill xmlns:a14="http://schemas.microsoft.com/office/drawing/2010/main" xmlns="">
+              <a14:hiddenFill xmlns="" xmlns:a14="http://schemas.microsoft.com/office/drawing/2010/main">
                 <a:noFill/>
               </a14:hiddenFill>
             </a:ext>
@@ -7700,14 +7700,14 @@
           </a:ln>
           <a:extLst>
             <a:ext uri="{909E8E84-426E-40dd-AFC4-6F175D3DCCD1}">
-              <a14:hiddenFill xmlns:a14="http://schemas.microsoft.com/office/drawing/2010/main" xmlns="">
+              <a14:hiddenFill xmlns="" xmlns:a14="http://schemas.microsoft.com/office/drawing/2010/main">
                 <a:solidFill>
                   <a:srgbClr val="FFFFFF"/>
                 </a:solidFill>
               </a14:hiddenFill>
             </a:ext>
             <a:ext uri="{91240B29-F687-4f45-9708-019B960494DF}">
-              <a14:hiddenLine xmlns:a14="http://schemas.microsoft.com/office/drawing/2010/main" xmlns="" w="9525">
+              <a14:hiddenLine xmlns="" xmlns:a14="http://schemas.microsoft.com/office/drawing/2010/main" w="9525">
                 <a:solidFill>
                   <a:srgbClr val="000000"/>
                 </a:solidFill>
@@ -7758,7 +7758,7 @@
           </a:lstStyle>
           <a:p>
             <a:r>
-              <a:rPr lang="zh-CHS" altLang="en-US" noProof="0" smtClean="0">
+              <a:rPr lang="zh-Hans" altLang="en-US" noProof="0" smtClean="0">
                 <a:sym typeface="Open Sans Extrabold" charset="0"/>
               </a:rPr>
               <a:t>单击此处编辑母版标题样式</a:t>
@@ -7835,35 +7835,35 @@
           <a:p>
             <a:pPr lvl="0"/>
             <a:r>
-              <a:rPr lang="zh-CHS" altLang="en-US" smtClean="0"/>
+              <a:rPr lang="zh-Hans" altLang="en-US" smtClean="0"/>
               <a:t>单击此处编辑母版文本样式</a:t>
             </a:r>
           </a:p>
           <a:p>
             <a:pPr lvl="1"/>
             <a:r>
-              <a:rPr lang="zh-CHS" altLang="en-US" smtClean="0"/>
+              <a:rPr lang="zh-Hans" altLang="en-US" smtClean="0"/>
               <a:t>第二级</a:t>
             </a:r>
           </a:p>
           <a:p>
             <a:pPr lvl="2"/>
             <a:r>
-              <a:rPr lang="zh-CHS" altLang="en-US" smtClean="0"/>
+              <a:rPr lang="zh-Hans" altLang="en-US" smtClean="0"/>
               <a:t>第三级</a:t>
             </a:r>
           </a:p>
           <a:p>
             <a:pPr lvl="3"/>
             <a:r>
-              <a:rPr lang="zh-CHS" altLang="en-US" smtClean="0"/>
+              <a:rPr lang="zh-Hans" altLang="en-US" smtClean="0"/>
               <a:t>第四级</a:t>
             </a:r>
           </a:p>
           <a:p>
             <a:pPr lvl="4"/>
             <a:r>
-              <a:rPr lang="zh-CHS" altLang="en-US" smtClean="0"/>
+              <a:rPr lang="zh-Hans" altLang="en-US" smtClean="0"/>
               <a:t>第五级</a:t>
             </a:r>
             <a:endParaRPr lang="en-US" dirty="0"/>
@@ -7969,7 +7969,7 @@
           </a:ln>
           <a:extLst>
             <a:ext uri="{909E8E84-426E-40dd-AFC4-6F175D3DCCD1}">
-              <a14:hiddenFill xmlns:a14="http://schemas.microsoft.com/office/drawing/2010/main" xmlns="">
+              <a14:hiddenFill xmlns="" xmlns:a14="http://schemas.microsoft.com/office/drawing/2010/main">
                 <a:noFill/>
               </a14:hiddenFill>
             </a:ext>
@@ -8018,14 +8018,14 @@
           </a:ln>
           <a:extLst>
             <a:ext uri="{909E8E84-426E-40dd-AFC4-6F175D3DCCD1}">
-              <a14:hiddenFill xmlns:a14="http://schemas.microsoft.com/office/drawing/2010/main" xmlns="">
+              <a14:hiddenFill xmlns="" xmlns:a14="http://schemas.microsoft.com/office/drawing/2010/main">
                 <a:solidFill>
                   <a:srgbClr val="FFFFFF"/>
                 </a:solidFill>
               </a14:hiddenFill>
             </a:ext>
             <a:ext uri="{91240B29-F687-4f45-9708-019B960494DF}">
-              <a14:hiddenLine xmlns:a14="http://schemas.microsoft.com/office/drawing/2010/main" xmlns="" w="9525">
+              <a14:hiddenLine xmlns="" xmlns:a14="http://schemas.microsoft.com/office/drawing/2010/main" w="9525">
                 <a:solidFill>
                   <a:srgbClr val="000000"/>
                 </a:solidFill>
@@ -8080,7 +8080,7 @@
           </a:lstStyle>
           <a:p>
             <a:r>
-              <a:rPr lang="zh-CHS" altLang="en-US" noProof="0" smtClean="0">
+              <a:rPr lang="zh-Hans" altLang="en-US" noProof="0" smtClean="0">
                 <a:sym typeface="Open Sans Extrabold" charset="0"/>
               </a:rPr>
               <a:t>单击此处编辑母版标题样式</a:t>
@@ -8172,35 +8172,35 @@
           <a:p>
             <a:pPr lvl="0"/>
             <a:r>
-              <a:rPr lang="zh-CHS" altLang="en-US" smtClean="0"/>
+              <a:rPr lang="zh-Hans" altLang="en-US" smtClean="0"/>
               <a:t>单击此处编辑母版文本样式</a:t>
             </a:r>
           </a:p>
           <a:p>
             <a:pPr lvl="1"/>
             <a:r>
-              <a:rPr lang="zh-CHS" altLang="en-US" smtClean="0"/>
+              <a:rPr lang="zh-Hans" altLang="en-US" smtClean="0"/>
               <a:t>第二级</a:t>
             </a:r>
           </a:p>
           <a:p>
             <a:pPr lvl="2"/>
             <a:r>
-              <a:rPr lang="zh-CHS" altLang="en-US" smtClean="0"/>
+              <a:rPr lang="zh-Hans" altLang="en-US" smtClean="0"/>
               <a:t>第三级</a:t>
             </a:r>
           </a:p>
           <a:p>
             <a:pPr lvl="3"/>
             <a:r>
-              <a:rPr lang="zh-CHS" altLang="en-US" smtClean="0"/>
+              <a:rPr lang="zh-Hans" altLang="en-US" smtClean="0"/>
               <a:t>第四级</a:t>
             </a:r>
           </a:p>
           <a:p>
             <a:pPr lvl="4"/>
             <a:r>
-              <a:rPr lang="zh-CHS" altLang="en-US" smtClean="0"/>
+              <a:rPr lang="zh-Hans" altLang="en-US" smtClean="0"/>
               <a:t>第五级</a:t>
             </a:r>
             <a:endParaRPr lang="en-US" dirty="0"/>
@@ -8292,7 +8292,7 @@
           <a:lstStyle/>
           <a:p>
             <a:r>
-              <a:rPr lang="zh-CHS" altLang="en-US" smtClean="0"/>
+              <a:rPr lang="zh-Hans" altLang="en-US" smtClean="0"/>
               <a:t>单击此处编辑母版标题样式</a:t>
             </a:r>
             <a:endParaRPr lang="en-US" dirty="0"/>
@@ -8352,35 +8352,35 @@
           <a:p>
             <a:pPr lvl="0"/>
             <a:r>
-              <a:rPr lang="zh-CHS" altLang="en-US" smtClean="0"/>
+              <a:rPr lang="zh-Hans" altLang="en-US" smtClean="0"/>
               <a:t>单击此处编辑母版文本样式</a:t>
             </a:r>
           </a:p>
           <a:p>
             <a:pPr lvl="1"/>
             <a:r>
-              <a:rPr lang="zh-CHS" altLang="en-US" smtClean="0"/>
+              <a:rPr lang="zh-Hans" altLang="en-US" smtClean="0"/>
               <a:t>第二级</a:t>
             </a:r>
           </a:p>
           <a:p>
             <a:pPr lvl="2"/>
             <a:r>
-              <a:rPr lang="zh-CHS" altLang="en-US" smtClean="0"/>
+              <a:rPr lang="zh-Hans" altLang="en-US" smtClean="0"/>
               <a:t>第三级</a:t>
             </a:r>
           </a:p>
           <a:p>
             <a:pPr lvl="3"/>
             <a:r>
-              <a:rPr lang="zh-CHS" altLang="en-US" smtClean="0"/>
+              <a:rPr lang="zh-Hans" altLang="en-US" smtClean="0"/>
               <a:t>第四级</a:t>
             </a:r>
           </a:p>
           <a:p>
             <a:pPr lvl="4"/>
             <a:r>
-              <a:rPr lang="zh-CHS" altLang="en-US" smtClean="0"/>
+              <a:rPr lang="zh-Hans" altLang="en-US" smtClean="0"/>
               <a:t>第五级</a:t>
             </a:r>
             <a:endParaRPr lang="en-US" dirty="0"/>
@@ -8533,35 +8533,35 @@
           <a:p>
             <a:pPr lvl="0"/>
             <a:r>
-              <a:rPr lang="zh-CHS" altLang="en-US" smtClean="0"/>
+              <a:rPr lang="zh-Hans" altLang="en-US" smtClean="0"/>
               <a:t>单击此处编辑母版文本样式</a:t>
             </a:r>
           </a:p>
           <a:p>
             <a:pPr lvl="1"/>
             <a:r>
-              <a:rPr lang="zh-CHS" altLang="en-US" smtClean="0"/>
+              <a:rPr lang="zh-Hans" altLang="en-US" smtClean="0"/>
               <a:t>第二级</a:t>
             </a:r>
           </a:p>
           <a:p>
             <a:pPr lvl="2"/>
             <a:r>
-              <a:rPr lang="zh-CHS" altLang="en-US" smtClean="0"/>
+              <a:rPr lang="zh-Hans" altLang="en-US" smtClean="0"/>
               <a:t>第三级</a:t>
             </a:r>
           </a:p>
           <a:p>
             <a:pPr lvl="3"/>
             <a:r>
-              <a:rPr lang="zh-CHS" altLang="en-US" smtClean="0"/>
+              <a:rPr lang="zh-Hans" altLang="en-US" smtClean="0"/>
               <a:t>第四级</a:t>
             </a:r>
           </a:p>
           <a:p>
             <a:pPr lvl="4"/>
             <a:r>
-              <a:rPr lang="zh-CHS" altLang="en-US" smtClean="0"/>
+              <a:rPr lang="zh-Hans" altLang="en-US" smtClean="0"/>
               <a:t>第五级</a:t>
             </a:r>
             <a:endParaRPr lang="en-US" dirty="0"/>
@@ -8661,7 +8661,7 @@
           </a:ln>
           <a:extLst>
             <a:ext uri="{909E8E84-426E-40dd-AFC4-6F175D3DCCD1}">
-              <a14:hiddenFill xmlns:a14="http://schemas.microsoft.com/office/drawing/2010/main" xmlns="">
+              <a14:hiddenFill xmlns="" xmlns:a14="http://schemas.microsoft.com/office/drawing/2010/main">
                 <a:noFill/>
               </a14:hiddenFill>
             </a:ext>
@@ -8702,7 +8702,7 @@
           </a:ln>
           <a:extLst>
             <a:ext uri="{909E8E84-426E-40dd-AFC4-6F175D3DCCD1}">
-              <a14:hiddenFill xmlns:a14="http://schemas.microsoft.com/office/drawing/2010/main" xmlns="">
+              <a14:hiddenFill xmlns="" xmlns:a14="http://schemas.microsoft.com/office/drawing/2010/main">
                 <a:noFill/>
               </a14:hiddenFill>
             </a:ext>
@@ -8741,7 +8741,7 @@
           </a:lstStyle>
           <a:p>
             <a:r>
-              <a:rPr lang="zh-CHS" altLang="en-US" smtClean="0"/>
+              <a:rPr lang="zh-Hans" altLang="en-US" smtClean="0"/>
               <a:t>单击此处编辑母版标题样式</a:t>
             </a:r>
             <a:endParaRPr lang="en-US" dirty="0"/>
@@ -8845,17 +8845,17 @@
           <a:effectLst/>
           <a:extLst>
             <a:ext uri="{FAA26D3D-D897-4be2-8F04-BA451C77F1D7}">
-              <ma14:placeholderFlag xmlns:ma14="http://schemas.microsoft.com/office/mac/drawingml/2011/main" val="1"/>
+              <ma14:placeholderFlag xmlns:ma14="http://schemas.microsoft.com/office/mac/drawingml/2011/main" xmlns="" val="1"/>
             </a:ext>
             <a:ext uri="{909E8E84-426E-40dd-AFC4-6F175D3DCCD1}">
-              <a14:hiddenFill xmlns:a14="http://schemas.microsoft.com/office/drawing/2010/main" xmlns="">
+              <a14:hiddenFill xmlns="" xmlns:a14="http://schemas.microsoft.com/office/drawing/2010/main">
                 <a:solidFill>
                   <a:srgbClr val="FFFFFF"/>
                 </a:solidFill>
               </a14:hiddenFill>
             </a:ext>
             <a:ext uri="{91240B29-F687-4f45-9708-019B960494DF}">
-              <a14:hiddenLine xmlns:a14="http://schemas.microsoft.com/office/drawing/2010/main" xmlns="" w="12700">
+              <a14:hiddenLine xmlns="" xmlns:a14="http://schemas.microsoft.com/office/drawing/2010/main" w="12700">
                 <a:solidFill>
                   <a:schemeClr val="tx1"/>
                 </a:solidFill>
@@ -8865,7 +8865,7 @@
               </a14:hiddenLine>
             </a:ext>
             <a:ext uri="{AF507438-7753-43e0-B8FC-AC1667EBCBE1}">
-              <a14:hiddenEffects xmlns:a14="http://schemas.microsoft.com/office/drawing/2010/main" xmlns="">
+              <a14:hiddenEffects xmlns="" xmlns:a14="http://schemas.microsoft.com/office/drawing/2010/main">
                 <a:effectLst>
                   <a:outerShdw blurRad="63500" dist="38099" dir="2700000" algn="ctr" rotWithShape="0">
                     <a:srgbClr val="000000">
@@ -8887,7 +8887,7 @@
           <a:p>
             <a:pPr lvl="0"/>
             <a:r>
-              <a:rPr lang="zh-CHS" altLang="en-US" smtClean="0">
+              <a:rPr lang="zh-Hans" altLang="en-US" smtClean="0">
                 <a:sym typeface="Open Sans Extrabold" charset="0"/>
               </a:rPr>
               <a:t>单击此处编辑母版标题样式</a:t>
@@ -8923,17 +8923,17 @@
           <a:effectLst/>
           <a:extLst>
             <a:ext uri="{FAA26D3D-D897-4be2-8F04-BA451C77F1D7}">
-              <ma14:placeholderFlag xmlns:ma14="http://schemas.microsoft.com/office/mac/drawingml/2011/main" val="1"/>
+              <ma14:placeholderFlag xmlns:ma14="http://schemas.microsoft.com/office/mac/drawingml/2011/main" xmlns="" val="1"/>
             </a:ext>
             <a:ext uri="{909E8E84-426E-40dd-AFC4-6F175D3DCCD1}">
-              <a14:hiddenFill xmlns:a14="http://schemas.microsoft.com/office/drawing/2010/main" xmlns="">
+              <a14:hiddenFill xmlns="" xmlns:a14="http://schemas.microsoft.com/office/drawing/2010/main">
                 <a:solidFill>
                   <a:srgbClr val="FFFFFF"/>
                 </a:solidFill>
               </a14:hiddenFill>
             </a:ext>
             <a:ext uri="{91240B29-F687-4f45-9708-019B960494DF}">
-              <a14:hiddenLine xmlns:a14="http://schemas.microsoft.com/office/drawing/2010/main" xmlns="" w="12700">
+              <a14:hiddenLine xmlns="" xmlns:a14="http://schemas.microsoft.com/office/drawing/2010/main" w="12700">
                 <a:solidFill>
                   <a:schemeClr val="tx1"/>
                 </a:solidFill>
@@ -8943,7 +8943,7 @@
               </a14:hiddenLine>
             </a:ext>
             <a:ext uri="{AF507438-7753-43e0-B8FC-AC1667EBCBE1}">
-              <a14:hiddenEffects xmlns:a14="http://schemas.microsoft.com/office/drawing/2010/main" xmlns="">
+              <a14:hiddenEffects xmlns="" xmlns:a14="http://schemas.microsoft.com/office/drawing/2010/main">
                 <a:effectLst>
                   <a:outerShdw blurRad="63500" dist="38099" dir="2700000" algn="ctr" rotWithShape="0">
                     <a:srgbClr val="000000">
@@ -8965,7 +8965,7 @@
           <a:p>
             <a:pPr lvl="0"/>
             <a:r>
-              <a:rPr lang="zh-CHS" altLang="en-US" smtClean="0">
+              <a:rPr lang="zh-Hans" altLang="en-US" smtClean="0">
                 <a:sym typeface="Open Sans Light" charset="0"/>
               </a:rPr>
               <a:t>单击此处编辑母版文本样式</a:t>
@@ -8974,7 +8974,7 @@
           <a:p>
             <a:pPr lvl="1"/>
             <a:r>
-              <a:rPr lang="zh-CHS" altLang="en-US" smtClean="0">
+              <a:rPr lang="zh-Hans" altLang="en-US" smtClean="0">
                 <a:sym typeface="Open Sans Light" charset="0"/>
               </a:rPr>
               <a:t>第二级</a:t>
@@ -8983,7 +8983,7 @@
           <a:p>
             <a:pPr lvl="2"/>
             <a:r>
-              <a:rPr lang="zh-CHS" altLang="en-US" smtClean="0">
+              <a:rPr lang="zh-Hans" altLang="en-US" smtClean="0">
                 <a:sym typeface="Open Sans Light" charset="0"/>
               </a:rPr>
               <a:t>第三级</a:t>
@@ -8992,7 +8992,7 @@
           <a:p>
             <a:pPr lvl="3"/>
             <a:r>
-              <a:rPr lang="zh-CHS" altLang="en-US" smtClean="0">
+              <a:rPr lang="zh-Hans" altLang="en-US" smtClean="0">
                 <a:sym typeface="Open Sans Light" charset="0"/>
               </a:rPr>
               <a:t>第四级</a:t>
@@ -9001,7 +9001,7 @@
           <a:p>
             <a:pPr lvl="4"/>
             <a:r>
-              <a:rPr lang="zh-CHS" altLang="en-US" smtClean="0">
+              <a:rPr lang="zh-Hans" altLang="en-US" smtClean="0">
                 <a:sym typeface="Open Sans Light" charset="0"/>
               </a:rPr>
               <a:t>第五级</a:t>
@@ -9037,14 +9037,14 @@
           <a:effectLst/>
           <a:extLst>
             <a:ext uri="{909E8E84-426E-40dd-AFC4-6F175D3DCCD1}">
-              <a14:hiddenFill xmlns:a14="http://schemas.microsoft.com/office/drawing/2010/main" xmlns="">
+              <a14:hiddenFill xmlns="" xmlns:a14="http://schemas.microsoft.com/office/drawing/2010/main">
                 <a:solidFill>
                   <a:srgbClr val="FFFFFF"/>
                 </a:solidFill>
               </a14:hiddenFill>
             </a:ext>
             <a:ext uri="{91240B29-F687-4f45-9708-019B960494DF}">
-              <a14:hiddenLine xmlns:a14="http://schemas.microsoft.com/office/drawing/2010/main" xmlns="" w="12700">
+              <a14:hiddenLine xmlns="" xmlns:a14="http://schemas.microsoft.com/office/drawing/2010/main" w="12700">
                 <a:solidFill>
                   <a:schemeClr val="tx1"/>
                 </a:solidFill>
@@ -9054,7 +9054,7 @@
               </a14:hiddenLine>
             </a:ext>
             <a:ext uri="{AF507438-7753-43e0-B8FC-AC1667EBCBE1}">
-              <a14:hiddenEffects xmlns:a14="http://schemas.microsoft.com/office/drawing/2010/main" xmlns="">
+              <a14:hiddenEffects xmlns="" xmlns:a14="http://schemas.microsoft.com/office/drawing/2010/main">
                 <a:effectLst>
                   <a:outerShdw blurRad="63500" dist="38099" dir="2700000" algn="ctr" rotWithShape="0">
                     <a:srgbClr val="000000">
@@ -9740,17 +9740,17 @@
           <a:effectLst/>
           <a:extLst>
             <a:ext uri="{FAA26D3D-D897-4be2-8F04-BA451C77F1D7}">
-              <ma14:placeholderFlag xmlns:ma14="http://schemas.microsoft.com/office/mac/drawingml/2011/main" val="1"/>
+              <ma14:placeholderFlag xmlns:ma14="http://schemas.microsoft.com/office/mac/drawingml/2011/main" xmlns="" val="1"/>
             </a:ext>
             <a:ext uri="{909E8E84-426E-40dd-AFC4-6F175D3DCCD1}">
-              <a14:hiddenFill xmlns:a14="http://schemas.microsoft.com/office/drawing/2010/main" xmlns="">
+              <a14:hiddenFill xmlns="" xmlns:a14="http://schemas.microsoft.com/office/drawing/2010/main">
                 <a:solidFill>
                   <a:srgbClr val="FFFFFF"/>
                 </a:solidFill>
               </a14:hiddenFill>
             </a:ext>
             <a:ext uri="{91240B29-F687-4f45-9708-019B960494DF}">
-              <a14:hiddenLine xmlns:a14="http://schemas.microsoft.com/office/drawing/2010/main" xmlns="" w="12700">
+              <a14:hiddenLine xmlns="" xmlns:a14="http://schemas.microsoft.com/office/drawing/2010/main" w="12700">
                 <a:solidFill>
                   <a:schemeClr val="tx1"/>
                 </a:solidFill>
@@ -9760,7 +9760,7 @@
               </a14:hiddenLine>
             </a:ext>
             <a:ext uri="{AF507438-7753-43e0-B8FC-AC1667EBCBE1}">
-              <a14:hiddenEffects xmlns:a14="http://schemas.microsoft.com/office/drawing/2010/main" xmlns="">
+              <a14:hiddenEffects xmlns="" xmlns:a14="http://schemas.microsoft.com/office/drawing/2010/main">
                 <a:effectLst>
                   <a:outerShdw blurRad="63500" dist="38099" dir="2700000" algn="ctr" rotWithShape="0">
                     <a:srgbClr val="000000">
@@ -9815,17 +9815,17 @@
           <a:effectLst/>
           <a:extLst>
             <a:ext uri="{FAA26D3D-D897-4be2-8F04-BA451C77F1D7}">
-              <ma14:placeholderFlag xmlns:ma14="http://schemas.microsoft.com/office/mac/drawingml/2011/main" val="1"/>
+              <ma14:placeholderFlag xmlns:ma14="http://schemas.microsoft.com/office/mac/drawingml/2011/main" xmlns="" val="1"/>
             </a:ext>
             <a:ext uri="{909E8E84-426E-40dd-AFC4-6F175D3DCCD1}">
-              <a14:hiddenFill xmlns:a14="http://schemas.microsoft.com/office/drawing/2010/main" xmlns="">
+              <a14:hiddenFill xmlns="" xmlns:a14="http://schemas.microsoft.com/office/drawing/2010/main">
                 <a:solidFill>
                   <a:srgbClr val="FFFFFF"/>
                 </a:solidFill>
               </a14:hiddenFill>
             </a:ext>
             <a:ext uri="{91240B29-F687-4f45-9708-019B960494DF}">
-              <a14:hiddenLine xmlns:a14="http://schemas.microsoft.com/office/drawing/2010/main" xmlns="" w="12700">
+              <a14:hiddenLine xmlns="" xmlns:a14="http://schemas.microsoft.com/office/drawing/2010/main" w="12700">
                 <a:solidFill>
                   <a:schemeClr val="tx1"/>
                 </a:solidFill>
@@ -9835,7 +9835,7 @@
               </a14:hiddenLine>
             </a:ext>
             <a:ext uri="{AF507438-7753-43e0-B8FC-AC1667EBCBE1}">
-              <a14:hiddenEffects xmlns:a14="http://schemas.microsoft.com/office/drawing/2010/main" xmlns="">
+              <a14:hiddenEffects xmlns="" xmlns:a14="http://schemas.microsoft.com/office/drawing/2010/main">
                 <a:effectLst>
                   <a:outerShdw blurRad="63500" dist="38099" dir="2700000" algn="ctr" rotWithShape="0">
                     <a:srgbClr val="000000">
@@ -9926,14 +9926,14 @@
           <a:effectLst/>
           <a:extLst>
             <a:ext uri="{909E8E84-426E-40dd-AFC4-6F175D3DCCD1}">
-              <a14:hiddenFill xmlns:a14="http://schemas.microsoft.com/office/drawing/2010/main" xmlns="">
+              <a14:hiddenFill xmlns="" xmlns:a14="http://schemas.microsoft.com/office/drawing/2010/main">
                 <a:solidFill>
                   <a:srgbClr val="FFFFFF"/>
                 </a:solidFill>
               </a14:hiddenFill>
             </a:ext>
             <a:ext uri="{91240B29-F687-4f45-9708-019B960494DF}">
-              <a14:hiddenLine xmlns:a14="http://schemas.microsoft.com/office/drawing/2010/main" xmlns="" w="12700">
+              <a14:hiddenLine xmlns="" xmlns:a14="http://schemas.microsoft.com/office/drawing/2010/main" w="12700">
                 <a:solidFill>
                   <a:schemeClr val="tx1"/>
                 </a:solidFill>
@@ -9943,7 +9943,7 @@
               </a14:hiddenLine>
             </a:ext>
             <a:ext uri="{AF507438-7753-43e0-B8FC-AC1667EBCBE1}">
-              <a14:hiddenEffects xmlns:a14="http://schemas.microsoft.com/office/drawing/2010/main" xmlns="">
+              <a14:hiddenEffects xmlns="" xmlns:a14="http://schemas.microsoft.com/office/drawing/2010/main">
                 <a:effectLst>
                   <a:outerShdw blurRad="63500" dist="38099" dir="2700000" algn="ctr" rotWithShape="0">
                     <a:srgbClr val="000000">
@@ -10638,17 +10638,17 @@
           <a:effectLst/>
           <a:extLst>
             <a:ext uri="{FAA26D3D-D897-4be2-8F04-BA451C77F1D7}">
-              <ma14:placeholderFlag xmlns:ma14="http://schemas.microsoft.com/office/mac/drawingml/2011/main" val="1"/>
+              <ma14:placeholderFlag xmlns:ma14="http://schemas.microsoft.com/office/mac/drawingml/2011/main" xmlns="" val="1"/>
             </a:ext>
             <a:ext uri="{909E8E84-426E-40dd-AFC4-6F175D3DCCD1}">
-              <a14:hiddenFill xmlns:a14="http://schemas.microsoft.com/office/drawing/2010/main" xmlns="">
+              <a14:hiddenFill xmlns="" xmlns:a14="http://schemas.microsoft.com/office/drawing/2010/main">
                 <a:solidFill>
                   <a:srgbClr val="FFFFFF"/>
                 </a:solidFill>
               </a14:hiddenFill>
             </a:ext>
             <a:ext uri="{91240B29-F687-4f45-9708-019B960494DF}">
-              <a14:hiddenLine xmlns:a14="http://schemas.microsoft.com/office/drawing/2010/main" xmlns="" w="12700">
+              <a14:hiddenLine xmlns="" xmlns:a14="http://schemas.microsoft.com/office/drawing/2010/main" w="12700">
                 <a:solidFill>
                   <a:schemeClr val="tx1"/>
                 </a:solidFill>
@@ -10658,7 +10658,7 @@
               </a14:hiddenLine>
             </a:ext>
             <a:ext uri="{AF507438-7753-43e0-B8FC-AC1667EBCBE1}">
-              <a14:hiddenEffects xmlns:a14="http://schemas.microsoft.com/office/drawing/2010/main" xmlns="">
+              <a14:hiddenEffects xmlns="" xmlns:a14="http://schemas.microsoft.com/office/drawing/2010/main">
                 <a:effectLst>
                   <a:outerShdw blurRad="63500" dist="38099" dir="2700000" algn="ctr" rotWithShape="0">
                     <a:srgbClr val="000000">
@@ -10713,17 +10713,17 @@
           <a:effectLst/>
           <a:extLst>
             <a:ext uri="{FAA26D3D-D897-4be2-8F04-BA451C77F1D7}">
-              <ma14:placeholderFlag xmlns:ma14="http://schemas.microsoft.com/office/mac/drawingml/2011/main" val="1"/>
+              <ma14:placeholderFlag xmlns:ma14="http://schemas.microsoft.com/office/mac/drawingml/2011/main" xmlns="" val="1"/>
             </a:ext>
             <a:ext uri="{909E8E84-426E-40dd-AFC4-6F175D3DCCD1}">
-              <a14:hiddenFill xmlns:a14="http://schemas.microsoft.com/office/drawing/2010/main" xmlns="">
+              <a14:hiddenFill xmlns="" xmlns:a14="http://schemas.microsoft.com/office/drawing/2010/main">
                 <a:solidFill>
                   <a:srgbClr val="FFFFFF"/>
                 </a:solidFill>
               </a14:hiddenFill>
             </a:ext>
             <a:ext uri="{91240B29-F687-4f45-9708-019B960494DF}">
-              <a14:hiddenLine xmlns:a14="http://schemas.microsoft.com/office/drawing/2010/main" xmlns="" w="12700">
+              <a14:hiddenLine xmlns="" xmlns:a14="http://schemas.microsoft.com/office/drawing/2010/main" w="12700">
                 <a:solidFill>
                   <a:schemeClr val="tx1"/>
                 </a:solidFill>
@@ -10733,7 +10733,7 @@
               </a14:hiddenLine>
             </a:ext>
             <a:ext uri="{AF507438-7753-43e0-B8FC-AC1667EBCBE1}">
-              <a14:hiddenEffects xmlns:a14="http://schemas.microsoft.com/office/drawing/2010/main" xmlns="">
+              <a14:hiddenEffects xmlns="" xmlns:a14="http://schemas.microsoft.com/office/drawing/2010/main">
                 <a:effectLst>
                   <a:outerShdw blurRad="63500" dist="38099" dir="2700000" algn="ctr" rotWithShape="0">
                     <a:srgbClr val="000000">
@@ -10824,14 +10824,14 @@
           <a:effectLst/>
           <a:extLst>
             <a:ext uri="{909E8E84-426E-40dd-AFC4-6F175D3DCCD1}">
-              <a14:hiddenFill xmlns:a14="http://schemas.microsoft.com/office/drawing/2010/main" xmlns="">
+              <a14:hiddenFill xmlns="" xmlns:a14="http://schemas.microsoft.com/office/drawing/2010/main">
                 <a:solidFill>
                   <a:srgbClr val="FFFFFF"/>
                 </a:solidFill>
               </a14:hiddenFill>
             </a:ext>
             <a:ext uri="{91240B29-F687-4f45-9708-019B960494DF}">
-              <a14:hiddenLine xmlns:a14="http://schemas.microsoft.com/office/drawing/2010/main" xmlns="" w="12700">
+              <a14:hiddenLine xmlns="" xmlns:a14="http://schemas.microsoft.com/office/drawing/2010/main" w="12700">
                 <a:solidFill>
                   <a:schemeClr val="tx1"/>
                 </a:solidFill>
@@ -10841,7 +10841,7 @@
               </a14:hiddenLine>
             </a:ext>
             <a:ext uri="{AF507438-7753-43e0-B8FC-AC1667EBCBE1}">
-              <a14:hiddenEffects xmlns:a14="http://schemas.microsoft.com/office/drawing/2010/main" xmlns="">
+              <a14:hiddenEffects xmlns="" xmlns:a14="http://schemas.microsoft.com/office/drawing/2010/main">
                 <a:effectLst>
                   <a:outerShdw blurRad="63500" dist="38099" dir="2700000" algn="ctr" rotWithShape="0">
                     <a:srgbClr val="000000">
@@ -11524,7 +11524,10 @@
               <a:defRPr/>
             </a:pPr>
             <a:r>
-              <a:rPr lang="en-US" sz="9600" cap="none" dirty="0" smtClean="0"/>
+              <a:rPr lang="en-US" sz="9600" cap="none" dirty="0" smtClean="0">
+                <a:latin typeface="微软雅黑" panose="020B0503020204020204" pitchFamily="34" charset="-122"/>
+                <a:ea typeface="微软雅黑" panose="020B0503020204020204" pitchFamily="34" charset="-122"/>
+              </a:rPr>
               <a:t>Stubs &amp; Mocks</a:t>
             </a:r>
           </a:p>
@@ -11548,7 +11551,10 @@
             <a:pPr marL="0" indent="0" eaLnBrk="1" hangingPunct="1">
               <a:defRPr/>
             </a:pPr>
-            <a:endParaRPr lang="en-US" dirty="0"/>
+            <a:endParaRPr lang="en-US" dirty="0">
+              <a:latin typeface="微软雅黑" panose="020B0503020204020204" pitchFamily="34" charset="-122"/>
+              <a:ea typeface="微软雅黑" panose="020B0503020204020204" pitchFamily="34" charset="-122"/>
+            </a:endParaRPr>
           </a:p>
         </p:txBody>
       </p:sp>
@@ -11564,8 +11570,8 @@
         </p:nvSpPr>
         <p:spPr>
           <a:xfrm>
-            <a:off x="4448255" y="2673404"/>
-            <a:ext cx="4121000" cy="757130"/>
+            <a:off x="4295168" y="2673404"/>
+            <a:ext cx="4427174" cy="757130"/>
           </a:xfrm>
         </p:spPr>
         <p:txBody>
@@ -11576,7 +11582,10 @@
               <a:defRPr/>
             </a:pPr>
             <a:r>
-              <a:rPr lang="en-US" dirty="0" smtClean="0"/>
+              <a:rPr lang="en-US" dirty="0" smtClean="0">
+                <a:latin typeface="微软雅黑" panose="020B0503020204020204" pitchFamily="34" charset="-122"/>
+                <a:ea typeface="微软雅黑" panose="020B0503020204020204" pitchFamily="34" charset="-122"/>
+              </a:rPr>
               <a:t>C++ Unit Testing</a:t>
             </a:r>
           </a:p>
@@ -11637,10 +11646,16 @@
           <a:p>
             <a:pPr algn="ctr"/>
             <a:r>
-              <a:rPr lang="en-US" altLang="zh-CHS" sz="4800" dirty="0" smtClean="0"/>
+              <a:rPr lang="en-US" altLang="zh-Hans" sz="4800" dirty="0" smtClean="0">
+                <a:latin typeface="微软雅黑" panose="020B0503020204020204" pitchFamily="34" charset="-122"/>
+                <a:ea typeface="微软雅黑" panose="020B0503020204020204" pitchFamily="34" charset="-122"/>
+              </a:rPr>
               <a:t>EXERCISE</a:t>
             </a:r>
-            <a:endParaRPr lang="zh-CHS" altLang="en-US" sz="4800" dirty="0"/>
+            <a:endParaRPr lang="zh-Hans" altLang="en-US" sz="4800" dirty="0">
+              <a:latin typeface="微软雅黑" panose="020B0503020204020204" pitchFamily="34" charset="-122"/>
+              <a:ea typeface="微软雅黑" panose="020B0503020204020204" pitchFamily="34" charset="-122"/>
+            </a:endParaRPr>
           </a:p>
         </p:txBody>
       </p:sp>
@@ -11670,7 +11685,10 @@
                 <a:schemeClr val="tx2"/>
               </a:buClr>
             </a:pPr>
-            <a:endParaRPr lang="en-US" altLang="zh-CHS" sz="800" dirty="0"/>
+            <a:endParaRPr lang="en-US" altLang="zh-Hans" sz="800" dirty="0">
+              <a:latin typeface="微软雅黑" panose="020B0503020204020204" pitchFamily="34" charset="-122"/>
+              <a:ea typeface="微软雅黑" panose="020B0503020204020204" pitchFamily="34" charset="-122"/>
+            </a:endParaRPr>
           </a:p>
           <a:p>
             <a:pPr marL="0" indent="0">
@@ -11685,35 +11703,59 @@
               </a:buClr>
             </a:pPr>
             <a:r>
-              <a:rPr lang="zh-CHS" altLang="en-US" sz="3600" dirty="0"/>
+              <a:rPr lang="zh-Hans" altLang="en-US" sz="3600" dirty="0">
+                <a:latin typeface="微软雅黑" panose="020B0503020204020204" pitchFamily="34" charset="-122"/>
+                <a:ea typeface="微软雅黑" panose="020B0503020204020204" pitchFamily="34" charset="-122"/>
+              </a:rPr>
               <a:t>图书馆管理员</a:t>
             </a:r>
             <a:r>
-              <a:rPr lang="en-US" altLang="zh-CHS" sz="3600" dirty="0"/>
+              <a:rPr lang="en-US" altLang="zh-Hans" sz="3600" dirty="0">
+                <a:latin typeface="微软雅黑" panose="020B0503020204020204" pitchFamily="34" charset="-122"/>
+                <a:ea typeface="微软雅黑" panose="020B0503020204020204" pitchFamily="34" charset="-122"/>
+              </a:rPr>
               <a:t>(Librarian)</a:t>
             </a:r>
             <a:r>
-              <a:rPr lang="zh-CHS" altLang="en-US" sz="3600" dirty="0"/>
+              <a:rPr lang="zh-Hans" altLang="en-US" sz="3600" dirty="0">
+                <a:latin typeface="微软雅黑" panose="020B0503020204020204" pitchFamily="34" charset="-122"/>
+                <a:ea typeface="微软雅黑" panose="020B0503020204020204" pitchFamily="34" charset="-122"/>
+              </a:rPr>
               <a:t>会定期向书商</a:t>
             </a:r>
             <a:r>
-              <a:rPr lang="en-US" altLang="zh-CHS" sz="3600" dirty="0"/>
+              <a:rPr lang="en-US" altLang="zh-Hans" sz="3600" dirty="0">
+                <a:latin typeface="微软雅黑" panose="020B0503020204020204" pitchFamily="34" charset="-122"/>
+                <a:ea typeface="微软雅黑" panose="020B0503020204020204" pitchFamily="34" charset="-122"/>
+              </a:rPr>
               <a:t>(</a:t>
             </a:r>
             <a:r>
-              <a:rPr lang="en-US" altLang="zh-CHS" sz="3600" dirty="0" err="1"/>
+              <a:rPr lang="en-US" altLang="zh-Hans" sz="3600" dirty="0" err="1">
+                <a:latin typeface="微软雅黑" panose="020B0503020204020204" pitchFamily="34" charset="-122"/>
+                <a:ea typeface="微软雅黑" panose="020B0503020204020204" pitchFamily="34" charset="-122"/>
+              </a:rPr>
               <a:t>BookVendor</a:t>
             </a:r>
             <a:r>
-              <a:rPr lang="en-US" altLang="zh-CHS" sz="3600" dirty="0"/>
+              <a:rPr lang="en-US" altLang="zh-Hans" sz="3600" dirty="0">
+                <a:latin typeface="微软雅黑" panose="020B0503020204020204" pitchFamily="34" charset="-122"/>
+                <a:ea typeface="微软雅黑" panose="020B0503020204020204" pitchFamily="34" charset="-122"/>
+              </a:rPr>
               <a:t>)</a:t>
             </a:r>
             <a:r>
-              <a:rPr lang="zh-CHS" altLang="en-US" sz="3600" dirty="0"/>
+              <a:rPr lang="zh-Hans" altLang="en-US" sz="3600" dirty="0">
+                <a:latin typeface="微软雅黑" panose="020B0503020204020204" pitchFamily="34" charset="-122"/>
+                <a:ea typeface="微软雅黑" panose="020B0503020204020204" pitchFamily="34" charset="-122"/>
+              </a:rPr>
               <a:t>购买一些书籍来充实图书馆</a:t>
             </a:r>
             <a:r>
-              <a:rPr lang="en-US" altLang="zh-CHS" sz="3600" dirty="0" smtClean="0"/>
+              <a:rPr lang="en-US" altLang="zh-Hans" sz="3600" dirty="0" smtClean="0">
+                <a:latin typeface="微软雅黑" panose="020B0503020204020204" pitchFamily="34" charset="-122"/>
+                <a:ea typeface="微软雅黑" panose="020B0503020204020204" pitchFamily="34" charset="-122"/>
+              </a:rPr>
               <a:t>:</a:t>
             </a:r>
           </a:p>
@@ -11729,7 +11771,10 @@
                 <a:schemeClr val="tx2"/>
               </a:buClr>
             </a:pPr>
-            <a:endParaRPr lang="en-US" altLang="zh-CHS" sz="800" dirty="0" smtClean="0"/>
+            <a:endParaRPr lang="en-US" altLang="zh-Hans" sz="800" dirty="0" smtClean="0">
+              <a:latin typeface="微软雅黑" panose="020B0503020204020204" pitchFamily="34" charset="-122"/>
+              <a:ea typeface="微软雅黑" panose="020B0503020204020204" pitchFamily="34" charset="-122"/>
+            </a:endParaRPr>
           </a:p>
           <a:p>
             <a:pPr marL="520700" indent="-520700">
@@ -11746,57 +11791,71 @@
               <a:buChar char=""/>
             </a:pPr>
             <a:r>
-              <a:rPr lang="zh-CHS" altLang="en-US" sz="3600" dirty="0">
+              <a:rPr lang="zh-Hans" altLang="en-US" sz="3600" dirty="0">
                 <a:solidFill>
                   <a:srgbClr val="FF0000"/>
                 </a:solidFill>
+                <a:latin typeface="微软雅黑" panose="020B0503020204020204" pitchFamily="34" charset="-122"/>
+                <a:ea typeface="微软雅黑" panose="020B0503020204020204" pitchFamily="34" charset="-122"/>
               </a:rPr>
               <a:t>书商能够提供多种图书</a:t>
             </a:r>
             <a:r>
-              <a:rPr lang="en-US" altLang="zh-CHS" sz="3600" dirty="0">
+              <a:rPr lang="en-US" altLang="zh-Hans" sz="3600" dirty="0">
                 <a:solidFill>
                   <a:srgbClr val="FF0000"/>
                 </a:solidFill>
+                <a:latin typeface="微软雅黑" panose="020B0503020204020204" pitchFamily="34" charset="-122"/>
+                <a:ea typeface="微软雅黑" panose="020B0503020204020204" pitchFamily="34" charset="-122"/>
               </a:rPr>
               <a:t>(</a:t>
             </a:r>
             <a:r>
-              <a:rPr lang="zh-CHS" altLang="en-US" sz="3600" dirty="0">
+              <a:rPr lang="zh-Hans" altLang="en-US" sz="3600" dirty="0">
                 <a:solidFill>
                   <a:srgbClr val="FF0000"/>
                 </a:solidFill>
+                <a:latin typeface="微软雅黑" panose="020B0503020204020204" pitchFamily="34" charset="-122"/>
+                <a:ea typeface="微软雅黑" panose="020B0503020204020204" pitchFamily="34" charset="-122"/>
               </a:rPr>
               <a:t>附有价格</a:t>
             </a:r>
             <a:r>
-              <a:rPr lang="en-US" altLang="zh-CHS" sz="3600" dirty="0">
+              <a:rPr lang="en-US" altLang="zh-Hans" sz="3600" dirty="0">
                 <a:solidFill>
                   <a:srgbClr val="FF0000"/>
                 </a:solidFill>
+                <a:latin typeface="微软雅黑" panose="020B0503020204020204" pitchFamily="34" charset="-122"/>
+                <a:ea typeface="微软雅黑" panose="020B0503020204020204" pitchFamily="34" charset="-122"/>
               </a:rPr>
               <a:t>)</a:t>
             </a:r>
             <a:r>
-              <a:rPr lang="zh-CHS" altLang="en-US" sz="3600" dirty="0">
+              <a:rPr lang="zh-Hans" altLang="en-US" sz="3600" dirty="0">
                 <a:solidFill>
                   <a:srgbClr val="FF0000"/>
                 </a:solidFill>
+                <a:latin typeface="微软雅黑" panose="020B0503020204020204" pitchFamily="34" charset="-122"/>
+                <a:ea typeface="微软雅黑" panose="020B0503020204020204" pitchFamily="34" charset="-122"/>
               </a:rPr>
               <a:t>供管理员进行</a:t>
             </a:r>
             <a:r>
-              <a:rPr lang="zh-CHS" altLang="en-US" sz="3600" dirty="0" smtClean="0">
+              <a:rPr lang="zh-Hans" altLang="en-US" sz="3600" dirty="0" smtClean="0">
                 <a:solidFill>
                   <a:srgbClr val="FF0000"/>
                 </a:solidFill>
+                <a:latin typeface="微软雅黑" panose="020B0503020204020204" pitchFamily="34" charset="-122"/>
+                <a:ea typeface="微软雅黑" panose="020B0503020204020204" pitchFamily="34" charset="-122"/>
               </a:rPr>
               <a:t>选择</a:t>
             </a:r>
-            <a:endParaRPr lang="en-US" altLang="zh-CHS" sz="3600" dirty="0" smtClean="0">
+            <a:endParaRPr lang="en-US" altLang="zh-Hans" sz="3600" dirty="0" smtClean="0">
               <a:solidFill>
                 <a:srgbClr val="FF0000"/>
               </a:solidFill>
+              <a:latin typeface="微软雅黑" panose="020B0503020204020204" pitchFamily="34" charset="-122"/>
+              <a:ea typeface="微软雅黑" panose="020B0503020204020204" pitchFamily="34" charset="-122"/>
             </a:endParaRPr>
           </a:p>
           <a:p>
@@ -11811,10 +11870,12 @@
                 <a:schemeClr val="tx2"/>
               </a:buClr>
             </a:pPr>
-            <a:endParaRPr lang="zh-CHS" altLang="en-US" sz="800" dirty="0">
+            <a:endParaRPr lang="zh-Hans" altLang="en-US" sz="800" dirty="0">
               <a:solidFill>
                 <a:srgbClr val="FF0000"/>
               </a:solidFill>
+              <a:latin typeface="微软雅黑" panose="020B0503020204020204" pitchFamily="34" charset="-122"/>
+              <a:ea typeface="微软雅黑" panose="020B0503020204020204" pitchFamily="34" charset="-122"/>
             </a:endParaRPr>
           </a:p>
           <a:p>
@@ -11832,25 +11893,31 @@
               <a:buChar char=""/>
             </a:pPr>
             <a:r>
-              <a:rPr lang="zh-CHS" altLang="en-US" sz="3600" dirty="0">
+              <a:rPr lang="zh-Hans" altLang="en-US" sz="3600" dirty="0">
                 <a:solidFill>
                   <a:srgbClr val="FF0000"/>
                 </a:solidFill>
+                <a:latin typeface="微软雅黑" panose="020B0503020204020204" pitchFamily="34" charset="-122"/>
+                <a:ea typeface="微软雅黑" panose="020B0503020204020204" pitchFamily="34" charset="-122"/>
               </a:rPr>
               <a:t>管理员仅会挑选当前图书馆中不存在的书籍进行</a:t>
             </a:r>
             <a:r>
-              <a:rPr lang="zh-CHS" altLang="en-US" sz="3600" dirty="0" smtClean="0">
+              <a:rPr lang="zh-Hans" altLang="en-US" sz="3600" dirty="0" smtClean="0">
                 <a:solidFill>
                   <a:srgbClr val="FF0000"/>
                 </a:solidFill>
+                <a:latin typeface="微软雅黑" panose="020B0503020204020204" pitchFamily="34" charset="-122"/>
+                <a:ea typeface="微软雅黑" panose="020B0503020204020204" pitchFamily="34" charset="-122"/>
               </a:rPr>
               <a:t>购买</a:t>
             </a:r>
-            <a:endParaRPr lang="en-US" altLang="zh-CHS" sz="3600" dirty="0">
+            <a:endParaRPr lang="en-US" altLang="zh-Hans" sz="3600" dirty="0">
               <a:solidFill>
                 <a:srgbClr val="FF0000"/>
               </a:solidFill>
+              <a:latin typeface="微软雅黑" panose="020B0503020204020204" pitchFamily="34" charset="-122"/>
+              <a:ea typeface="微软雅黑" panose="020B0503020204020204" pitchFamily="34" charset="-122"/>
             </a:endParaRPr>
           </a:p>
           <a:p>
@@ -11865,7 +11932,10 @@
                 <a:schemeClr val="tx2"/>
               </a:buClr>
             </a:pPr>
-            <a:endParaRPr lang="en-US" altLang="zh-CHS" sz="800" dirty="0" smtClean="0"/>
+            <a:endParaRPr lang="en-US" altLang="zh-Hans" sz="800" dirty="0" smtClean="0">
+              <a:latin typeface="微软雅黑" panose="020B0503020204020204" pitchFamily="34" charset="-122"/>
+              <a:ea typeface="微软雅黑" panose="020B0503020204020204" pitchFamily="34" charset="-122"/>
+            </a:endParaRPr>
           </a:p>
           <a:p>
             <a:pPr marL="520700" indent="-520700">
@@ -11882,15 +11952,24 @@
               <a:buChar char=""/>
             </a:pPr>
             <a:r>
-              <a:rPr lang="zh-CHS" altLang="en-US" sz="3600" dirty="0"/>
+              <a:rPr lang="zh-Hans" altLang="en-US" sz="3600" dirty="0">
+                <a:latin typeface="微软雅黑" panose="020B0503020204020204" pitchFamily="34" charset="-122"/>
+                <a:ea typeface="微软雅黑" panose="020B0503020204020204" pitchFamily="34" charset="-122"/>
+              </a:rPr>
               <a:t>管理员选好图书后</a:t>
             </a:r>
             <a:r>
-              <a:rPr lang="en-US" altLang="zh-CHS" sz="3600" dirty="0"/>
+              <a:rPr lang="en-US" altLang="zh-Hans" sz="3600" dirty="0">
+                <a:latin typeface="微软雅黑" panose="020B0503020204020204" pitchFamily="34" charset="-122"/>
+                <a:ea typeface="微软雅黑" panose="020B0503020204020204" pitchFamily="34" charset="-122"/>
+              </a:rPr>
               <a:t>, </a:t>
             </a:r>
             <a:r>
-              <a:rPr lang="zh-CHS" altLang="en-US" sz="3600" dirty="0"/>
+              <a:rPr lang="zh-Hans" altLang="en-US" sz="3600" dirty="0">
+                <a:latin typeface="微软雅黑" panose="020B0503020204020204" pitchFamily="34" charset="-122"/>
+                <a:ea typeface="微软雅黑" panose="020B0503020204020204" pitchFamily="34" charset="-122"/>
+              </a:rPr>
               <a:t>会向书商支付所选书籍的总金额</a:t>
             </a:r>
           </a:p>
@@ -11908,7 +11987,10 @@
               <a:buFont typeface="Wingdings" charset="2"/>
               <a:buChar char=""/>
             </a:pPr>
-            <a:endParaRPr lang="zh-CHS" altLang="en-US" sz="3600" dirty="0"/>
+            <a:endParaRPr lang="zh-Hans" altLang="en-US" sz="3600" dirty="0">
+              <a:latin typeface="微软雅黑" panose="020B0503020204020204" pitchFamily="34" charset="-122"/>
+              <a:ea typeface="微软雅黑" panose="020B0503020204020204" pitchFamily="34" charset="-122"/>
+            </a:endParaRPr>
           </a:p>
         </p:txBody>
       </p:sp>
@@ -11931,13 +12013,19 @@
               <a:defRPr/>
             </a:pPr>
             <a:fld id="{6BD71149-C6B6-DA41-AB69-4C8E97C931F0}" type="slidenum">
-              <a:rPr lang="en-US" smtClean="0"/>
+              <a:rPr lang="en-US" smtClean="0">
+                <a:latin typeface="微软雅黑" panose="020B0503020204020204" pitchFamily="34" charset="-122"/>
+                <a:ea typeface="微软雅黑" panose="020B0503020204020204" pitchFamily="34" charset="-122"/>
+              </a:rPr>
               <a:pPr>
                 <a:defRPr/>
               </a:pPr>
               <a:t>10</a:t>
             </a:fld>
-            <a:endParaRPr lang="en-US"/>
+            <a:endParaRPr lang="en-US">
+              <a:latin typeface="微软雅黑" panose="020B0503020204020204" pitchFamily="34" charset="-122"/>
+              <a:ea typeface="微软雅黑" panose="020B0503020204020204" pitchFamily="34" charset="-122"/>
+            </a:endParaRPr>
           </a:p>
         </p:txBody>
       </p:sp>
@@ -12025,7 +12113,10 @@
               <a:defRPr/>
             </a:pPr>
             <a:r>
-              <a:rPr lang="en-US" dirty="0" smtClean="0"/>
+              <a:rPr lang="en-US" dirty="0" smtClean="0">
+                <a:latin typeface="微软雅黑" panose="020B0503020204020204" pitchFamily="34" charset="-122"/>
+                <a:ea typeface="微软雅黑" panose="020B0503020204020204" pitchFamily="34" charset="-122"/>
+              </a:rPr>
               <a:t>Stubs Vs Mocks</a:t>
             </a:r>
           </a:p>
@@ -12046,13 +12137,27 @@
           <a:bodyPr/>
           <a:lstStyle/>
           <a:p>
-            <a:pPr marL="0" indent="0" eaLnBrk="1" hangingPunct="1">
+            <a:pPr marL="0" indent="0">
               <a:defRPr/>
             </a:pPr>
             <a:r>
-              <a:rPr lang="en-US" dirty="0" smtClean="0"/>
-              <a:t>With Google Mock</a:t>
-            </a:r>
+              <a:rPr lang="en-US" dirty="0">
+                <a:latin typeface="微软雅黑" panose="020B0503020204020204" pitchFamily="34" charset="-122"/>
+                <a:ea typeface="微软雅黑" panose="020B0503020204020204" pitchFamily="34" charset="-122"/>
+              </a:rPr>
+              <a:t>Behavior </a:t>
+            </a:r>
+            <a:r>
+              <a:rPr lang="en-US" smtClean="0">
+                <a:latin typeface="微软雅黑" panose="020B0503020204020204" pitchFamily="34" charset="-122"/>
+                <a:ea typeface="微软雅黑" panose="020B0503020204020204" pitchFamily="34" charset="-122"/>
+              </a:rPr>
+              <a:t>Based Verification</a:t>
+            </a:r>
+            <a:endParaRPr lang="en-US" dirty="0" smtClean="0">
+              <a:latin typeface="微软雅黑" panose="020B0503020204020204" pitchFamily="34" charset="-122"/>
+              <a:ea typeface="微软雅黑" panose="020B0503020204020204" pitchFamily="34" charset="-122"/>
+            </a:endParaRPr>
           </a:p>
         </p:txBody>
       </p:sp>
@@ -12075,13 +12180,19 @@
               <a:defRPr/>
             </a:pPr>
             <a:fld id="{FF174A22-F644-8D40-AF6E-ACD99327719B}" type="slidenum">
-              <a:rPr lang="en-US"/>
+              <a:rPr lang="en-US">
+                <a:latin typeface="微软雅黑" panose="020B0503020204020204" pitchFamily="34" charset="-122"/>
+                <a:ea typeface="微软雅黑" panose="020B0503020204020204" pitchFamily="34" charset="-122"/>
+              </a:rPr>
               <a:pPr>
                 <a:defRPr/>
               </a:pPr>
               <a:t>11</a:t>
             </a:fld>
-            <a:endParaRPr lang="en-US"/>
+            <a:endParaRPr lang="en-US">
+              <a:latin typeface="微软雅黑" panose="020B0503020204020204" pitchFamily="34" charset="-122"/>
+              <a:ea typeface="微软雅黑" panose="020B0503020204020204" pitchFamily="34" charset="-122"/>
+            </a:endParaRPr>
           </a:p>
         </p:txBody>
       </p:sp>
@@ -12140,10 +12251,10 @@
           <a:p>
             <a:pPr algn="ctr"/>
             <a:r>
-              <a:rPr lang="en-US" altLang="zh-CHS" dirty="0" smtClean="0"/>
+              <a:rPr lang="en-US" altLang="zh-Hans" dirty="0" smtClean="0"/>
               <a:t>Test Doubles</a:t>
             </a:r>
-            <a:endParaRPr lang="zh-CHS" altLang="en-US" dirty="0"/>
+            <a:endParaRPr lang="zh-Hans" altLang="en-US" dirty="0"/>
           </a:p>
         </p:txBody>
       </p:sp>
@@ -12252,7 +12363,7 @@
             <a:endParaRPr lang="en-US" sz="3200" dirty="0"/>
           </a:p>
           <a:p>
-            <a:endParaRPr lang="zh-CHS" altLang="en-US" sz="3200" dirty="0"/>
+            <a:endParaRPr lang="zh-Hans" altLang="en-US" sz="3200" dirty="0"/>
           </a:p>
         </p:txBody>
       </p:sp>
@@ -12340,10 +12451,16 @@
           <a:p>
             <a:pPr algn="ctr"/>
             <a:r>
-              <a:rPr lang="en-US" altLang="zh-CHS" dirty="0" smtClean="0"/>
+              <a:rPr lang="en-US" altLang="zh-Hans" dirty="0" smtClean="0">
+                <a:latin typeface="微软雅黑" panose="020B0503020204020204" pitchFamily="34" charset="-122"/>
+                <a:ea typeface="微软雅黑" panose="020B0503020204020204" pitchFamily="34" charset="-122"/>
+              </a:rPr>
               <a:t>MATCHERS</a:t>
             </a:r>
-            <a:endParaRPr lang="zh-CHS" altLang="en-US" dirty="0"/>
+            <a:endParaRPr lang="zh-Hans" altLang="en-US" dirty="0">
+              <a:latin typeface="微软雅黑" panose="020B0503020204020204" pitchFamily="34" charset="-122"/>
+              <a:ea typeface="微软雅黑" panose="020B0503020204020204" pitchFamily="34" charset="-122"/>
+            </a:endParaRPr>
           </a:p>
         </p:txBody>
       </p:sp>
@@ -12364,42 +12481,89 @@
           <a:p>
             <a:pPr marL="0"/>
             <a:r>
-              <a:rPr lang="en-US" altLang="zh-CHT" sz="4400" dirty="0" smtClean="0"/>
-              <a:t>When a mock function takes arguments, we must specify the expected arguments value</a:t>
-            </a:r>
-          </a:p>
-          <a:p>
-            <a:pPr marL="0"/>
-            <a:endParaRPr lang="en-US" altLang="zh-CHT" sz="4400" dirty="0" smtClean="0"/>
-          </a:p>
-          <a:p>
-            <a:pPr marL="0"/>
-            <a:endParaRPr lang="en-US" altLang="zh-CHT" sz="4400" dirty="0" smtClean="0"/>
-          </a:p>
-          <a:p>
-            <a:pPr marL="0"/>
-            <a:endParaRPr lang="en-US" altLang="zh-CHT" sz="4400" dirty="0" smtClean="0"/>
-          </a:p>
-          <a:p>
-            <a:pPr marL="0"/>
-            <a:endParaRPr lang="en-US" altLang="zh-CHT" sz="4400" dirty="0" smtClean="0"/>
-          </a:p>
-          <a:p>
-            <a:pPr marL="0"/>
-            <a:r>
-              <a:rPr lang="en-US" altLang="zh-CHT" sz="4000" dirty="0" smtClean="0"/>
-              <a:t>	</a:t>
-            </a:r>
-            <a:r>
-              <a:rPr lang="en-US" altLang="zh-CHT" sz="4000" dirty="0" smtClean="0">
+              <a:rPr lang="en-US" altLang="zh-Hant" sz="4400" dirty="0" smtClean="0">
+                <a:latin typeface="微软雅黑" panose="020B0503020204020204" pitchFamily="34" charset="-122"/>
+                <a:ea typeface="微软雅黑" panose="020B0503020204020204" pitchFamily="34" charset="-122"/>
+              </a:rPr>
+              <a:t>When a mock function takes arguments, we </a:t>
+            </a:r>
+            <a:r>
+              <a:rPr lang="en-US" altLang="zh-Hant" sz="4400" dirty="0" smtClean="0">
+                <a:latin typeface="微软雅黑" panose="020B0503020204020204" pitchFamily="34" charset="-122"/>
+                <a:ea typeface="微软雅黑" panose="020B0503020204020204" pitchFamily="34" charset="-122"/>
+              </a:rPr>
+              <a:t>can specify </a:t>
+            </a:r>
+            <a:r>
+              <a:rPr lang="en-US" altLang="zh-Hant" sz="4400" dirty="0" smtClean="0">
+                <a:latin typeface="微软雅黑" panose="020B0503020204020204" pitchFamily="34" charset="-122"/>
+                <a:ea typeface="微软雅黑" panose="020B0503020204020204" pitchFamily="34" charset="-122"/>
+              </a:rPr>
+              <a:t>the </a:t>
+            </a:r>
+            <a:r>
+              <a:rPr lang="en-US" altLang="zh-Hant" sz="4400" dirty="0" smtClean="0">
                 <a:solidFill>
                   <a:srgbClr val="FF0000"/>
                 </a:solidFill>
+                <a:latin typeface="微软雅黑" panose="020B0503020204020204" pitchFamily="34" charset="-122"/>
+                <a:ea typeface="微软雅黑" panose="020B0503020204020204" pitchFamily="34" charset="-122"/>
+              </a:rPr>
+              <a:t>expected arguments value</a:t>
+            </a:r>
+          </a:p>
+          <a:p>
+            <a:pPr marL="0"/>
+            <a:endParaRPr lang="en-US" altLang="zh-Hant" sz="4400" dirty="0" smtClean="0">
+              <a:latin typeface="微软雅黑" panose="020B0503020204020204" pitchFamily="34" charset="-122"/>
+              <a:ea typeface="微软雅黑" panose="020B0503020204020204" pitchFamily="34" charset="-122"/>
+            </a:endParaRPr>
+          </a:p>
+          <a:p>
+            <a:pPr marL="0"/>
+            <a:endParaRPr lang="en-US" altLang="zh-Hant" sz="4400" dirty="0" smtClean="0">
+              <a:latin typeface="微软雅黑" panose="020B0503020204020204" pitchFamily="34" charset="-122"/>
+              <a:ea typeface="微软雅黑" panose="020B0503020204020204" pitchFamily="34" charset="-122"/>
+            </a:endParaRPr>
+          </a:p>
+          <a:p>
+            <a:pPr marL="0"/>
+            <a:endParaRPr lang="en-US" altLang="zh-Hant" sz="4400" dirty="0" smtClean="0">
+              <a:latin typeface="微软雅黑" panose="020B0503020204020204" pitchFamily="34" charset="-122"/>
+              <a:ea typeface="微软雅黑" panose="020B0503020204020204" pitchFamily="34" charset="-122"/>
+            </a:endParaRPr>
+          </a:p>
+          <a:p>
+            <a:pPr marL="0"/>
+            <a:endParaRPr lang="en-US" altLang="zh-Hant" sz="4400" dirty="0" smtClean="0">
+              <a:latin typeface="微软雅黑" panose="020B0503020204020204" pitchFamily="34" charset="-122"/>
+              <a:ea typeface="微软雅黑" panose="020B0503020204020204" pitchFamily="34" charset="-122"/>
+            </a:endParaRPr>
+          </a:p>
+          <a:p>
+            <a:pPr marL="0"/>
+            <a:r>
+              <a:rPr lang="en-US" altLang="zh-Hant" sz="4000" dirty="0" smtClean="0">
+                <a:latin typeface="微软雅黑" panose="020B0503020204020204" pitchFamily="34" charset="-122"/>
+                <a:ea typeface="微软雅黑" panose="020B0503020204020204" pitchFamily="34" charset="-122"/>
+              </a:rPr>
+              <a:t>	</a:t>
+            </a:r>
+            <a:r>
+              <a:rPr lang="en-US" altLang="zh-Hant" sz="4000" dirty="0" smtClean="0">
+                <a:solidFill>
+                  <a:srgbClr val="FF0000"/>
+                </a:solidFill>
+                <a:latin typeface="微软雅黑" panose="020B0503020204020204" pitchFamily="34" charset="-122"/>
+                <a:ea typeface="微软雅黑" panose="020B0503020204020204" pitchFamily="34" charset="-122"/>
               </a:rPr>
               <a:t>testing::_ </a:t>
             </a:r>
             <a:r>
-              <a:rPr lang="en-US" altLang="zh-CHT" sz="4000" dirty="0" smtClean="0"/>
+              <a:rPr lang="en-US" altLang="zh-Hant" sz="4000" dirty="0" smtClean="0">
+                <a:latin typeface="微软雅黑" panose="020B0503020204020204" pitchFamily="34" charset="-122"/>
+                <a:ea typeface="微软雅黑" panose="020B0503020204020204" pitchFamily="34" charset="-122"/>
+              </a:rPr>
               <a:t>will match any input arguments</a:t>
             </a:r>
           </a:p>
@@ -12424,13 +12588,19 @@
               <a:defRPr/>
             </a:pPr>
             <a:fld id="{9FA9E053-A9C9-5E43-89F1-83E618EAF168}" type="slidenum">
-              <a:rPr lang="en-US" smtClean="0"/>
+              <a:rPr lang="en-US" smtClean="0">
+                <a:latin typeface="微软雅黑" panose="020B0503020204020204" pitchFamily="34" charset="-122"/>
+                <a:ea typeface="微软雅黑" panose="020B0503020204020204" pitchFamily="34" charset="-122"/>
+              </a:rPr>
               <a:pPr>
                 <a:defRPr/>
               </a:pPr>
               <a:t>13</a:t>
             </a:fld>
-            <a:endParaRPr lang="en-US"/>
+            <a:endParaRPr lang="en-US">
+              <a:latin typeface="微软雅黑" panose="020B0503020204020204" pitchFamily="34" charset="-122"/>
+              <a:ea typeface="微软雅黑" panose="020B0503020204020204" pitchFamily="34" charset="-122"/>
+            </a:endParaRPr>
           </a:p>
         </p:txBody>
       </p:sp>
@@ -12521,10 +12691,16 @@
           <a:p>
             <a:pPr algn="ctr"/>
             <a:r>
-              <a:rPr lang="en-US" dirty="0"/>
+              <a:rPr lang="en-US" dirty="0">
+                <a:latin typeface="微软雅黑" panose="020B0503020204020204" pitchFamily="34" charset="-122"/>
+                <a:ea typeface="微软雅黑" panose="020B0503020204020204" pitchFamily="34" charset="-122"/>
+              </a:rPr>
               <a:t>Cardinalities</a:t>
             </a:r>
-            <a:endParaRPr lang="zh-CHS" altLang="en-US" dirty="0"/>
+            <a:endParaRPr lang="zh-Hans" altLang="en-US" dirty="0">
+              <a:latin typeface="微软雅黑" panose="020B0503020204020204" pitchFamily="34" charset="-122"/>
+              <a:ea typeface="微软雅黑" panose="020B0503020204020204" pitchFamily="34" charset="-122"/>
+            </a:endParaRPr>
           </a:p>
         </p:txBody>
       </p:sp>
@@ -12545,27 +12721,41 @@
           <a:p>
             <a:pPr marL="0"/>
             <a:r>
-              <a:rPr lang="en-US" altLang="zh-CHT" sz="4400" dirty="0" smtClean="0"/>
+              <a:rPr lang="en-US" altLang="zh-Hant" sz="4400" dirty="0" smtClean="0">
+                <a:latin typeface="微软雅黑" panose="020B0503020204020204" pitchFamily="34" charset="-122"/>
+                <a:ea typeface="微软雅黑" panose="020B0503020204020204" pitchFamily="34" charset="-122"/>
+              </a:rPr>
               <a:t>Use the </a:t>
             </a:r>
             <a:r>
-              <a:rPr lang="en-US" altLang="zh-CHT" sz="4400" dirty="0" smtClean="0">
+              <a:rPr lang="en-US" altLang="zh-Hant" sz="4400" dirty="0" smtClean="0">
                 <a:solidFill>
                   <a:srgbClr val="FF0000"/>
                 </a:solidFill>
+                <a:latin typeface="微软雅黑" panose="020B0503020204020204" pitchFamily="34" charset="-122"/>
+                <a:ea typeface="微软雅黑" panose="020B0503020204020204" pitchFamily="34" charset="-122"/>
               </a:rPr>
               <a:t>Times()</a:t>
             </a:r>
             <a:r>
-              <a:rPr lang="en-US" altLang="zh-CHT" sz="4400" dirty="0" smtClean="0"/>
+              <a:rPr lang="en-US" altLang="zh-Hant" sz="4400" dirty="0" smtClean="0">
+                <a:latin typeface="微软雅黑" panose="020B0503020204020204" pitchFamily="34" charset="-122"/>
+                <a:ea typeface="微软雅黑" panose="020B0503020204020204" pitchFamily="34" charset="-122"/>
+              </a:rPr>
               <a:t> to specify the </a:t>
             </a:r>
             <a:r>
-              <a:rPr lang="en-US" sz="4400" dirty="0"/>
+              <a:rPr lang="en-US" sz="4400" dirty="0">
+                <a:latin typeface="微软雅黑" panose="020B0503020204020204" pitchFamily="34" charset="-122"/>
+                <a:ea typeface="微软雅黑" panose="020B0503020204020204" pitchFamily="34" charset="-122"/>
+              </a:rPr>
               <a:t>cardinality </a:t>
             </a:r>
             <a:r>
-              <a:rPr lang="en-US" sz="4400" dirty="0" smtClean="0"/>
+              <a:rPr lang="en-US" sz="4400" dirty="0" smtClean="0">
+                <a:latin typeface="微软雅黑" panose="020B0503020204020204" pitchFamily="34" charset="-122"/>
+                <a:ea typeface="微软雅黑" panose="020B0503020204020204" pitchFamily="34" charset="-122"/>
+              </a:rPr>
               <a:t>as it tells </a:t>
             </a:r>
             <a:r>
@@ -12573,27 +12763,44 @@
                 <a:solidFill>
                   <a:srgbClr val="FF0000"/>
                 </a:solidFill>
+                <a:latin typeface="微软雅黑" panose="020B0503020204020204" pitchFamily="34" charset="-122"/>
+                <a:ea typeface="微软雅黑" panose="020B0503020204020204" pitchFamily="34" charset="-122"/>
               </a:rPr>
               <a:t>how many times the call should occur</a:t>
             </a:r>
-            <a:endParaRPr lang="en-US" altLang="zh-CHT" sz="4400" dirty="0" smtClean="0"/>
+            <a:endParaRPr lang="en-US" altLang="zh-Hant" sz="4400" dirty="0" smtClean="0">
+              <a:latin typeface="微软雅黑" panose="020B0503020204020204" pitchFamily="34" charset="-122"/>
+              <a:ea typeface="微软雅黑" panose="020B0503020204020204" pitchFamily="34" charset="-122"/>
+            </a:endParaRPr>
           </a:p>
           <a:p>
             <a:pPr marL="0"/>
-            <a:endParaRPr lang="en-US" altLang="zh-CHT" sz="4400" dirty="0" smtClean="0"/>
+            <a:endParaRPr lang="en-US" altLang="zh-Hant" sz="4400" dirty="0" smtClean="0">
+              <a:latin typeface="微软雅黑" panose="020B0503020204020204" pitchFamily="34" charset="-122"/>
+              <a:ea typeface="微软雅黑" panose="020B0503020204020204" pitchFamily="34" charset="-122"/>
+            </a:endParaRPr>
           </a:p>
           <a:p>
             <a:pPr marL="0"/>
-            <a:endParaRPr lang="en-US" altLang="zh-CHT" sz="4400" dirty="0" smtClean="0"/>
+            <a:endParaRPr lang="en-US" altLang="zh-Hant" sz="4400" dirty="0" smtClean="0">
+              <a:latin typeface="微软雅黑" panose="020B0503020204020204" pitchFamily="34" charset="-122"/>
+              <a:ea typeface="微软雅黑" panose="020B0503020204020204" pitchFamily="34" charset="-122"/>
+            </a:endParaRPr>
           </a:p>
           <a:p>
             <a:pPr marL="0"/>
-            <a:endParaRPr lang="en-US" altLang="zh-CHT" sz="4400" dirty="0" smtClean="0"/>
+            <a:endParaRPr lang="en-US" altLang="zh-Hant" sz="4400" dirty="0" smtClean="0">
+              <a:latin typeface="微软雅黑" panose="020B0503020204020204" pitchFamily="34" charset="-122"/>
+              <a:ea typeface="微软雅黑" panose="020B0503020204020204" pitchFamily="34" charset="-122"/>
+            </a:endParaRPr>
           </a:p>
           <a:p>
             <a:pPr marL="0"/>
             <a:r>
-              <a:rPr lang="en-US" altLang="zh-CHT" sz="4000" dirty="0" smtClean="0"/>
+              <a:rPr lang="en-US" altLang="zh-Hant" sz="4000" dirty="0" smtClean="0">
+                <a:latin typeface="微软雅黑" panose="020B0503020204020204" pitchFamily="34" charset="-122"/>
+                <a:ea typeface="微软雅黑" panose="020B0503020204020204" pitchFamily="34" charset="-122"/>
+              </a:rPr>
               <a:t>	</a:t>
             </a:r>
           </a:p>
@@ -12618,13 +12825,19 @@
               <a:defRPr/>
             </a:pPr>
             <a:fld id="{9FA9E053-A9C9-5E43-89F1-83E618EAF168}" type="slidenum">
-              <a:rPr lang="en-US" smtClean="0"/>
+              <a:rPr lang="en-US" smtClean="0">
+                <a:latin typeface="微软雅黑" panose="020B0503020204020204" pitchFamily="34" charset="-122"/>
+                <a:ea typeface="微软雅黑" panose="020B0503020204020204" pitchFamily="34" charset="-122"/>
+              </a:rPr>
               <a:pPr>
                 <a:defRPr/>
               </a:pPr>
               <a:t>14</a:t>
             </a:fld>
-            <a:endParaRPr lang="en-US"/>
+            <a:endParaRPr lang="en-US">
+              <a:latin typeface="微软雅黑" panose="020B0503020204020204" pitchFamily="34" charset="-122"/>
+              <a:ea typeface="微软雅黑" panose="020B0503020204020204" pitchFamily="34" charset="-122"/>
+            </a:endParaRPr>
           </a:p>
         </p:txBody>
       </p:sp>
@@ -12712,10 +12925,16 @@
           <a:p>
             <a:pPr algn="ctr"/>
             <a:r>
-              <a:rPr lang="en-US" altLang="zh-CHS" sz="4800" dirty="0" smtClean="0"/>
+              <a:rPr lang="en-US" altLang="zh-Hans" sz="4800" dirty="0" smtClean="0">
+                <a:latin typeface="微软雅黑" panose="020B0503020204020204" pitchFamily="34" charset="-122"/>
+                <a:ea typeface="微软雅黑" panose="020B0503020204020204" pitchFamily="34" charset="-122"/>
+              </a:rPr>
               <a:t>EXERCISE</a:t>
             </a:r>
-            <a:endParaRPr lang="zh-CHS" altLang="en-US" sz="4800" dirty="0"/>
+            <a:endParaRPr lang="zh-Hans" altLang="en-US" sz="4800" dirty="0">
+              <a:latin typeface="微软雅黑" panose="020B0503020204020204" pitchFamily="34" charset="-122"/>
+              <a:ea typeface="微软雅黑" panose="020B0503020204020204" pitchFamily="34" charset="-122"/>
+            </a:endParaRPr>
           </a:p>
         </p:txBody>
       </p:sp>
@@ -12745,7 +12964,10 @@
                 <a:schemeClr val="tx2"/>
               </a:buClr>
             </a:pPr>
-            <a:endParaRPr lang="en-US" altLang="zh-CHS" sz="800" dirty="0"/>
+            <a:endParaRPr lang="en-US" altLang="zh-Hans" sz="800" dirty="0">
+              <a:latin typeface="微软雅黑" panose="020B0503020204020204" pitchFamily="34" charset="-122"/>
+              <a:ea typeface="微软雅黑" panose="020B0503020204020204" pitchFamily="34" charset="-122"/>
+            </a:endParaRPr>
           </a:p>
           <a:p>
             <a:pPr marL="0" indent="0">
@@ -12760,35 +12982,59 @@
               </a:buClr>
             </a:pPr>
             <a:r>
-              <a:rPr lang="zh-CHS" altLang="en-US" sz="3600" dirty="0"/>
+              <a:rPr lang="zh-Hans" altLang="en-US" sz="3600" dirty="0">
+                <a:latin typeface="微软雅黑" panose="020B0503020204020204" pitchFamily="34" charset="-122"/>
+                <a:ea typeface="微软雅黑" panose="020B0503020204020204" pitchFamily="34" charset="-122"/>
+              </a:rPr>
               <a:t>图书馆管理员</a:t>
             </a:r>
             <a:r>
-              <a:rPr lang="en-US" altLang="zh-CHS" sz="3600" dirty="0"/>
+              <a:rPr lang="en-US" altLang="zh-Hans" sz="3600" dirty="0">
+                <a:latin typeface="微软雅黑" panose="020B0503020204020204" pitchFamily="34" charset="-122"/>
+                <a:ea typeface="微软雅黑" panose="020B0503020204020204" pitchFamily="34" charset="-122"/>
+              </a:rPr>
               <a:t>(Librarian)</a:t>
             </a:r>
             <a:r>
-              <a:rPr lang="zh-CHS" altLang="en-US" sz="3600" dirty="0"/>
+              <a:rPr lang="zh-Hans" altLang="en-US" sz="3600" dirty="0">
+                <a:latin typeface="微软雅黑" panose="020B0503020204020204" pitchFamily="34" charset="-122"/>
+                <a:ea typeface="微软雅黑" panose="020B0503020204020204" pitchFamily="34" charset="-122"/>
+              </a:rPr>
               <a:t>会定期向书商</a:t>
             </a:r>
             <a:r>
-              <a:rPr lang="en-US" altLang="zh-CHS" sz="3600" dirty="0"/>
+              <a:rPr lang="en-US" altLang="zh-Hans" sz="3600" dirty="0">
+                <a:latin typeface="微软雅黑" panose="020B0503020204020204" pitchFamily="34" charset="-122"/>
+                <a:ea typeface="微软雅黑" panose="020B0503020204020204" pitchFamily="34" charset="-122"/>
+              </a:rPr>
               <a:t>(</a:t>
             </a:r>
             <a:r>
-              <a:rPr lang="en-US" altLang="zh-CHS" sz="3600" dirty="0" err="1"/>
+              <a:rPr lang="en-US" altLang="zh-Hans" sz="3600" dirty="0" err="1">
+                <a:latin typeface="微软雅黑" panose="020B0503020204020204" pitchFamily="34" charset="-122"/>
+                <a:ea typeface="微软雅黑" panose="020B0503020204020204" pitchFamily="34" charset="-122"/>
+              </a:rPr>
               <a:t>BookVendor</a:t>
             </a:r>
             <a:r>
-              <a:rPr lang="en-US" altLang="zh-CHS" sz="3600" dirty="0"/>
+              <a:rPr lang="en-US" altLang="zh-Hans" sz="3600" dirty="0">
+                <a:latin typeface="微软雅黑" panose="020B0503020204020204" pitchFamily="34" charset="-122"/>
+                <a:ea typeface="微软雅黑" panose="020B0503020204020204" pitchFamily="34" charset="-122"/>
+              </a:rPr>
               <a:t>)</a:t>
             </a:r>
             <a:r>
-              <a:rPr lang="zh-CHS" altLang="en-US" sz="3600" dirty="0"/>
+              <a:rPr lang="zh-Hans" altLang="en-US" sz="3600" dirty="0">
+                <a:latin typeface="微软雅黑" panose="020B0503020204020204" pitchFamily="34" charset="-122"/>
+                <a:ea typeface="微软雅黑" panose="020B0503020204020204" pitchFamily="34" charset="-122"/>
+              </a:rPr>
               <a:t>购买一些书籍来充实图书馆</a:t>
             </a:r>
             <a:r>
-              <a:rPr lang="en-US" altLang="zh-CHS" sz="3600" dirty="0" smtClean="0"/>
+              <a:rPr lang="en-US" altLang="zh-Hans" sz="3600" dirty="0" smtClean="0">
+                <a:latin typeface="微软雅黑" panose="020B0503020204020204" pitchFamily="34" charset="-122"/>
+                <a:ea typeface="微软雅黑" panose="020B0503020204020204" pitchFamily="34" charset="-122"/>
+              </a:rPr>
               <a:t>:</a:t>
             </a:r>
           </a:p>
@@ -12804,7 +13050,10 @@
                 <a:schemeClr val="tx2"/>
               </a:buClr>
             </a:pPr>
-            <a:endParaRPr lang="en-US" altLang="zh-CHS" sz="800" dirty="0" smtClean="0"/>
+            <a:endParaRPr lang="en-US" altLang="zh-Hans" sz="800" dirty="0" smtClean="0">
+              <a:latin typeface="微软雅黑" panose="020B0503020204020204" pitchFamily="34" charset="-122"/>
+              <a:ea typeface="微软雅黑" panose="020B0503020204020204" pitchFamily="34" charset="-122"/>
+            </a:endParaRPr>
           </a:p>
           <a:p>
             <a:pPr marL="520700" indent="-520700">
@@ -12821,30 +13070,51 @@
               <a:buChar char=""/>
             </a:pPr>
             <a:r>
-              <a:rPr lang="zh-CHS" altLang="en-US" sz="3600" dirty="0"/>
+              <a:rPr lang="zh-Hans" altLang="en-US" sz="3600" dirty="0">
+                <a:latin typeface="微软雅黑" panose="020B0503020204020204" pitchFamily="34" charset="-122"/>
+                <a:ea typeface="微软雅黑" panose="020B0503020204020204" pitchFamily="34" charset="-122"/>
+              </a:rPr>
               <a:t>书商能够提供多种图书</a:t>
             </a:r>
             <a:r>
-              <a:rPr lang="en-US" altLang="zh-CHS" sz="3600" dirty="0"/>
+              <a:rPr lang="en-US" altLang="zh-Hans" sz="3600" dirty="0">
+                <a:latin typeface="微软雅黑" panose="020B0503020204020204" pitchFamily="34" charset="-122"/>
+                <a:ea typeface="微软雅黑" panose="020B0503020204020204" pitchFamily="34" charset="-122"/>
+              </a:rPr>
               <a:t>(</a:t>
             </a:r>
             <a:r>
-              <a:rPr lang="zh-CHS" altLang="en-US" sz="3600" dirty="0"/>
+              <a:rPr lang="zh-Hans" altLang="en-US" sz="3600" dirty="0">
+                <a:latin typeface="微软雅黑" panose="020B0503020204020204" pitchFamily="34" charset="-122"/>
+                <a:ea typeface="微软雅黑" panose="020B0503020204020204" pitchFamily="34" charset="-122"/>
+              </a:rPr>
               <a:t>附有价格</a:t>
             </a:r>
             <a:r>
-              <a:rPr lang="en-US" altLang="zh-CHS" sz="3600" dirty="0"/>
+              <a:rPr lang="en-US" altLang="zh-Hans" sz="3600" dirty="0">
+                <a:latin typeface="微软雅黑" panose="020B0503020204020204" pitchFamily="34" charset="-122"/>
+                <a:ea typeface="微软雅黑" panose="020B0503020204020204" pitchFamily="34" charset="-122"/>
+              </a:rPr>
               <a:t>)</a:t>
             </a:r>
             <a:r>
-              <a:rPr lang="zh-CHS" altLang="en-US" sz="3600" dirty="0"/>
+              <a:rPr lang="zh-Hans" altLang="en-US" sz="3600" dirty="0">
+                <a:latin typeface="微软雅黑" panose="020B0503020204020204" pitchFamily="34" charset="-122"/>
+                <a:ea typeface="微软雅黑" panose="020B0503020204020204" pitchFamily="34" charset="-122"/>
+              </a:rPr>
               <a:t>供管理员进行</a:t>
             </a:r>
             <a:r>
-              <a:rPr lang="zh-CHS" altLang="en-US" sz="3600" dirty="0" smtClean="0"/>
+              <a:rPr lang="zh-Hans" altLang="en-US" sz="3600" dirty="0" smtClean="0">
+                <a:latin typeface="微软雅黑" panose="020B0503020204020204" pitchFamily="34" charset="-122"/>
+                <a:ea typeface="微软雅黑" panose="020B0503020204020204" pitchFamily="34" charset="-122"/>
+              </a:rPr>
               <a:t>选择</a:t>
             </a:r>
-            <a:endParaRPr lang="en-US" altLang="zh-CHS" sz="3600" dirty="0" smtClean="0"/>
+            <a:endParaRPr lang="en-US" altLang="zh-Hans" sz="3600" dirty="0" smtClean="0">
+              <a:latin typeface="微软雅黑" panose="020B0503020204020204" pitchFamily="34" charset="-122"/>
+              <a:ea typeface="微软雅黑" panose="020B0503020204020204" pitchFamily="34" charset="-122"/>
+            </a:endParaRPr>
           </a:p>
           <a:p>
             <a:pPr marL="0" indent="0">
@@ -12858,7 +13128,10 @@
                 <a:schemeClr val="tx2"/>
               </a:buClr>
             </a:pPr>
-            <a:endParaRPr lang="zh-CHS" altLang="en-US" sz="800" dirty="0"/>
+            <a:endParaRPr lang="zh-Hans" altLang="en-US" sz="800" dirty="0">
+              <a:latin typeface="微软雅黑" panose="020B0503020204020204" pitchFamily="34" charset="-122"/>
+              <a:ea typeface="微软雅黑" panose="020B0503020204020204" pitchFamily="34" charset="-122"/>
+            </a:endParaRPr>
           </a:p>
           <a:p>
             <a:pPr marL="520700" indent="-520700">
@@ -12875,14 +13148,23 @@
               <a:buChar char=""/>
             </a:pPr>
             <a:r>
-              <a:rPr lang="zh-CHS" altLang="en-US" sz="3600" dirty="0"/>
+              <a:rPr lang="zh-Hans" altLang="en-US" sz="3600" dirty="0">
+                <a:latin typeface="微软雅黑" panose="020B0503020204020204" pitchFamily="34" charset="-122"/>
+                <a:ea typeface="微软雅黑" panose="020B0503020204020204" pitchFamily="34" charset="-122"/>
+              </a:rPr>
               <a:t>管理员仅会挑选当前图书馆中不存在的书籍进行</a:t>
             </a:r>
             <a:r>
-              <a:rPr lang="zh-CHS" altLang="en-US" sz="3600" dirty="0" smtClean="0"/>
+              <a:rPr lang="zh-Hans" altLang="en-US" sz="3600" dirty="0" smtClean="0">
+                <a:latin typeface="微软雅黑" panose="020B0503020204020204" pitchFamily="34" charset="-122"/>
+                <a:ea typeface="微软雅黑" panose="020B0503020204020204" pitchFamily="34" charset="-122"/>
+              </a:rPr>
               <a:t>购买</a:t>
             </a:r>
-            <a:endParaRPr lang="en-US" altLang="zh-CHS" sz="3600" dirty="0"/>
+            <a:endParaRPr lang="en-US" altLang="zh-Hans" sz="3600" dirty="0">
+              <a:latin typeface="微软雅黑" panose="020B0503020204020204" pitchFamily="34" charset="-122"/>
+              <a:ea typeface="微软雅黑" panose="020B0503020204020204" pitchFamily="34" charset="-122"/>
+            </a:endParaRPr>
           </a:p>
           <a:p>
             <a:pPr marL="0" indent="0">
@@ -12896,7 +13178,10 @@
                 <a:schemeClr val="tx2"/>
               </a:buClr>
             </a:pPr>
-            <a:endParaRPr lang="en-US" altLang="zh-CHS" sz="800" dirty="0" smtClean="0"/>
+            <a:endParaRPr lang="en-US" altLang="zh-Hans" sz="800" dirty="0" smtClean="0">
+              <a:latin typeface="微软雅黑" panose="020B0503020204020204" pitchFamily="34" charset="-122"/>
+              <a:ea typeface="微软雅黑" panose="020B0503020204020204" pitchFamily="34" charset="-122"/>
+            </a:endParaRPr>
           </a:p>
           <a:p>
             <a:pPr marL="520700" indent="-520700">
@@ -12913,26 +13198,32 @@
               <a:buChar char=""/>
             </a:pPr>
             <a:r>
-              <a:rPr lang="zh-CHS" altLang="en-US" sz="3600" dirty="0">
+              <a:rPr lang="zh-Hans" altLang="en-US" sz="3600" dirty="0">
                 <a:solidFill>
                   <a:srgbClr val="FF0000"/>
                 </a:solidFill>
+                <a:latin typeface="微软雅黑" panose="020B0503020204020204" pitchFamily="34" charset="-122"/>
+                <a:ea typeface="微软雅黑" panose="020B0503020204020204" pitchFamily="34" charset="-122"/>
               </a:rPr>
               <a:t>管理员选好图书后</a:t>
             </a:r>
             <a:r>
-              <a:rPr lang="en-US" altLang="zh-CHS" sz="3600" dirty="0">
+              <a:rPr lang="en-US" altLang="zh-Hans" sz="3600" dirty="0">
                 <a:solidFill>
                   <a:srgbClr val="FF0000"/>
                 </a:solidFill>
+                <a:latin typeface="微软雅黑" panose="020B0503020204020204" pitchFamily="34" charset="-122"/>
+                <a:ea typeface="微软雅黑" panose="020B0503020204020204" pitchFamily="34" charset="-122"/>
               </a:rPr>
               <a:t>, </a:t>
             </a:r>
             <a:r>
-              <a:rPr lang="zh-CHS" altLang="en-US" sz="3600" dirty="0">
+              <a:rPr lang="zh-Hans" altLang="en-US" sz="3600" dirty="0">
                 <a:solidFill>
                   <a:srgbClr val="FF0000"/>
                 </a:solidFill>
+                <a:latin typeface="微软雅黑" panose="020B0503020204020204" pitchFamily="34" charset="-122"/>
+                <a:ea typeface="微软雅黑" panose="020B0503020204020204" pitchFamily="34" charset="-122"/>
               </a:rPr>
               <a:t>会向书商支付所选书籍的总金额</a:t>
             </a:r>
@@ -12951,7 +13242,10 @@
               <a:buFont typeface="Wingdings" charset="2"/>
               <a:buChar char=""/>
             </a:pPr>
-            <a:endParaRPr lang="zh-CHS" altLang="en-US" sz="3600" dirty="0"/>
+            <a:endParaRPr lang="zh-Hans" altLang="en-US" sz="3600" dirty="0">
+              <a:latin typeface="微软雅黑" panose="020B0503020204020204" pitchFamily="34" charset="-122"/>
+              <a:ea typeface="微软雅黑" panose="020B0503020204020204" pitchFamily="34" charset="-122"/>
+            </a:endParaRPr>
           </a:p>
         </p:txBody>
       </p:sp>
@@ -12974,13 +13268,19 @@
               <a:defRPr/>
             </a:pPr>
             <a:fld id="{6BD71149-C6B6-DA41-AB69-4C8E97C931F0}" type="slidenum">
-              <a:rPr lang="en-US" smtClean="0"/>
+              <a:rPr lang="en-US" smtClean="0">
+                <a:latin typeface="微软雅黑" panose="020B0503020204020204" pitchFamily="34" charset="-122"/>
+                <a:ea typeface="微软雅黑" panose="020B0503020204020204" pitchFamily="34" charset="-122"/>
+              </a:rPr>
               <a:pPr>
                 <a:defRPr/>
               </a:pPr>
               <a:t>15</a:t>
             </a:fld>
-            <a:endParaRPr lang="en-US"/>
+            <a:endParaRPr lang="en-US">
+              <a:latin typeface="微软雅黑" panose="020B0503020204020204" pitchFamily="34" charset="-122"/>
+              <a:ea typeface="微软雅黑" panose="020B0503020204020204" pitchFamily="34" charset="-122"/>
+            </a:endParaRPr>
           </a:p>
         </p:txBody>
       </p:sp>
@@ -13066,10 +13366,16 @@
           <a:p>
             <a:pPr algn="ctr"/>
             <a:r>
-              <a:rPr lang="en-US" smtClean="0"/>
+              <a:rPr lang="en-US" smtClean="0">
+                <a:latin typeface="微软雅黑" panose="020B0503020204020204" pitchFamily="34" charset="-122"/>
+                <a:ea typeface="微软雅黑" panose="020B0503020204020204" pitchFamily="34" charset="-122"/>
+              </a:rPr>
               <a:t>Reference</a:t>
             </a:r>
-            <a:endParaRPr lang="en-US" dirty="0"/>
+            <a:endParaRPr lang="en-US" dirty="0">
+              <a:latin typeface="微软雅黑" panose="020B0503020204020204" pitchFamily="34" charset="-122"/>
+              <a:ea typeface="微软雅黑" panose="020B0503020204020204" pitchFamily="34" charset="-122"/>
+            </a:endParaRPr>
           </a:p>
         </p:txBody>
       </p:sp>
@@ -13091,17 +13397,23 @@
             <a:pPr latinLnBrk="1"/>
             <a:r>
               <a:rPr lang="en-US" dirty="0">
+                <a:latin typeface="微软雅黑" panose="020B0503020204020204" pitchFamily="34" charset="-122"/>
+                <a:ea typeface="微软雅黑" panose="020B0503020204020204" pitchFamily="34" charset="-122"/>
                 <a:hlinkClick r:id="rId2"/>
               </a:rPr>
               <a:t>https://</a:t>
             </a:r>
             <a:r>
               <a:rPr lang="en-US" dirty="0" smtClean="0">
+                <a:latin typeface="微软雅黑" panose="020B0503020204020204" pitchFamily="34" charset="-122"/>
+                <a:ea typeface="微软雅黑" panose="020B0503020204020204" pitchFamily="34" charset="-122"/>
                 <a:hlinkClick r:id="rId2"/>
               </a:rPr>
               <a:t>github.com/coney/cpp-unit-testing/tree/master/02-GMock</a:t>
             </a:r>
             <a:endParaRPr lang="en-US" dirty="0">
+              <a:latin typeface="微软雅黑" panose="020B0503020204020204" pitchFamily="34" charset="-122"/>
+              <a:ea typeface="微软雅黑" panose="020B0503020204020204" pitchFamily="34" charset="-122"/>
               <a:hlinkClick r:id="rId2"/>
             </a:endParaRPr>
           </a:p>
@@ -13109,71 +13421,102 @@
             <a:pPr latinLnBrk="1"/>
             <a:r>
               <a:rPr lang="en-US" dirty="0">
+                <a:latin typeface="微软雅黑" panose="020B0503020204020204" pitchFamily="34" charset="-122"/>
+                <a:ea typeface="微软雅黑" panose="020B0503020204020204" pitchFamily="34" charset="-122"/>
                 <a:hlinkClick r:id="rId3"/>
               </a:rPr>
               <a:t>https://</a:t>
             </a:r>
             <a:r>
               <a:rPr lang="en-US" dirty="0" smtClean="0">
+                <a:latin typeface="微软雅黑" panose="020B0503020204020204" pitchFamily="34" charset="-122"/>
+                <a:ea typeface="微软雅黑" panose="020B0503020204020204" pitchFamily="34" charset="-122"/>
                 <a:hlinkClick r:id="rId3"/>
               </a:rPr>
               <a:t>code.google.com/p/googlemock/wiki/ForDummies</a:t>
             </a:r>
-            <a:endParaRPr lang="en-US" dirty="0" smtClean="0"/>
+            <a:endParaRPr lang="en-US" dirty="0" smtClean="0">
+              <a:latin typeface="微软雅黑" panose="020B0503020204020204" pitchFamily="34" charset="-122"/>
+              <a:ea typeface="微软雅黑" panose="020B0503020204020204" pitchFamily="34" charset="-122"/>
+            </a:endParaRPr>
           </a:p>
           <a:p>
             <a:pPr latinLnBrk="1"/>
             <a:r>
               <a:rPr lang="en-US" dirty="0">
+                <a:latin typeface="微软雅黑" panose="020B0503020204020204" pitchFamily="34" charset="-122"/>
+                <a:ea typeface="微软雅黑" panose="020B0503020204020204" pitchFamily="34" charset="-122"/>
                 <a:hlinkClick r:id="rId4"/>
               </a:rPr>
               <a:t>https://</a:t>
             </a:r>
             <a:r>
               <a:rPr lang="en-US" dirty="0" smtClean="0">
+                <a:latin typeface="微软雅黑" panose="020B0503020204020204" pitchFamily="34" charset="-122"/>
+                <a:ea typeface="微软雅黑" panose="020B0503020204020204" pitchFamily="34" charset="-122"/>
                 <a:hlinkClick r:id="rId4"/>
               </a:rPr>
               <a:t>code.google.com/p/googlemock/wiki/CheatSheet</a:t>
             </a:r>
-            <a:endParaRPr lang="en-US" dirty="0" smtClean="0"/>
+            <a:endParaRPr lang="en-US" dirty="0" smtClean="0">
+              <a:latin typeface="微软雅黑" panose="020B0503020204020204" pitchFamily="34" charset="-122"/>
+              <a:ea typeface="微软雅黑" panose="020B0503020204020204" pitchFamily="34" charset="-122"/>
+            </a:endParaRPr>
           </a:p>
           <a:p>
             <a:pPr latinLnBrk="1"/>
             <a:r>
               <a:rPr lang="en-US" dirty="0">
+                <a:latin typeface="微软雅黑" panose="020B0503020204020204" pitchFamily="34" charset="-122"/>
+                <a:ea typeface="微软雅黑" panose="020B0503020204020204" pitchFamily="34" charset="-122"/>
                 <a:hlinkClick r:id="rId5"/>
               </a:rPr>
               <a:t>https://</a:t>
             </a:r>
             <a:r>
               <a:rPr lang="en-US" dirty="0" smtClean="0">
+                <a:latin typeface="微软雅黑" panose="020B0503020204020204" pitchFamily="34" charset="-122"/>
+                <a:ea typeface="微软雅黑" panose="020B0503020204020204" pitchFamily="34" charset="-122"/>
                 <a:hlinkClick r:id="rId5"/>
               </a:rPr>
               <a:t>code.google.com/p/googlemock/wiki/CookBook</a:t>
             </a:r>
-            <a:endParaRPr lang="en-US" dirty="0" smtClean="0"/>
+            <a:endParaRPr lang="en-US" dirty="0" smtClean="0">
+              <a:latin typeface="微软雅黑" panose="020B0503020204020204" pitchFamily="34" charset="-122"/>
+              <a:ea typeface="微软雅黑" panose="020B0503020204020204" pitchFamily="34" charset="-122"/>
+            </a:endParaRPr>
           </a:p>
           <a:p>
             <a:pPr latinLnBrk="1"/>
             <a:r>
               <a:rPr lang="en-US" dirty="0">
+                <a:latin typeface="微软雅黑" panose="020B0503020204020204" pitchFamily="34" charset="-122"/>
+                <a:ea typeface="微软雅黑" panose="020B0503020204020204" pitchFamily="34" charset="-122"/>
                 <a:hlinkClick r:id="rId6"/>
               </a:rPr>
               <a:t>https://</a:t>
             </a:r>
             <a:r>
               <a:rPr lang="en-US" dirty="0" smtClean="0">
+                <a:latin typeface="微软雅黑" panose="020B0503020204020204" pitchFamily="34" charset="-122"/>
+                <a:ea typeface="微软雅黑" panose="020B0503020204020204" pitchFamily="34" charset="-122"/>
                 <a:hlinkClick r:id="rId6"/>
               </a:rPr>
               <a:t>code.google.com/p/googlemock/wiki/FrequentlyAskedQuestions</a:t>
             </a:r>
-            <a:endParaRPr lang="en-US" dirty="0" smtClean="0"/>
+            <a:endParaRPr lang="en-US" dirty="0" smtClean="0">
+              <a:latin typeface="微软雅黑" panose="020B0503020204020204" pitchFamily="34" charset="-122"/>
+              <a:ea typeface="微软雅黑" panose="020B0503020204020204" pitchFamily="34" charset="-122"/>
+            </a:endParaRPr>
           </a:p>
           <a:p>
             <a:pPr marL="0" indent="0" latinLnBrk="1">
               <a:buNone/>
             </a:pPr>
-            <a:endParaRPr lang="en-US" dirty="0"/>
+            <a:endParaRPr lang="en-US" dirty="0">
+              <a:latin typeface="微软雅黑" panose="020B0503020204020204" pitchFamily="34" charset="-122"/>
+              <a:ea typeface="微软雅黑" panose="020B0503020204020204" pitchFamily="34" charset="-122"/>
+            </a:endParaRPr>
           </a:p>
         </p:txBody>
       </p:sp>
@@ -13196,13 +13539,19 @@
               <a:defRPr/>
             </a:pPr>
             <a:fld id="{28FE6BA1-A7B4-7B4F-846F-93E3CD6980EB}" type="slidenum">
-              <a:rPr lang="en-US" smtClean="0"/>
+              <a:rPr lang="en-US" smtClean="0">
+                <a:latin typeface="微软雅黑" panose="020B0503020204020204" pitchFamily="34" charset="-122"/>
+                <a:ea typeface="微软雅黑" panose="020B0503020204020204" pitchFamily="34" charset="-122"/>
+              </a:rPr>
               <a:pPr>
                 <a:defRPr/>
               </a:pPr>
               <a:t>16</a:t>
             </a:fld>
-            <a:endParaRPr lang="en-US"/>
+            <a:endParaRPr lang="en-US">
+              <a:latin typeface="微软雅黑" panose="020B0503020204020204" pitchFamily="34" charset="-122"/>
+              <a:ea typeface="微软雅黑" panose="020B0503020204020204" pitchFamily="34" charset="-122"/>
+            </a:endParaRPr>
           </a:p>
         </p:txBody>
       </p:sp>
@@ -13263,7 +13612,10 @@
               <a:defRPr/>
             </a:pPr>
             <a:r>
-              <a:rPr lang="en-US" smtClean="0"/>
+              <a:rPr lang="en-US" smtClean="0">
+                <a:latin typeface="微软雅黑" panose="020B0503020204020204" pitchFamily="34" charset="-122"/>
+                <a:ea typeface="微软雅黑" panose="020B0503020204020204" pitchFamily="34" charset="-122"/>
+              </a:rPr>
               <a:t>THANK YOU</a:t>
             </a:r>
           </a:p>
@@ -13296,8 +13648,8 @@
             </a:pPr>
             <a:r>
               <a:rPr lang="en-US" dirty="0">
-                <a:latin typeface="Open Sans Light" charset="0"/>
-                <a:ea typeface="ヒラギノ角ゴ ProN W3" charset="0"/>
+                <a:latin typeface="微软雅黑" panose="020B0503020204020204" pitchFamily="34" charset="-122"/>
+                <a:ea typeface="微软雅黑" panose="020B0503020204020204" pitchFamily="34" charset="-122"/>
                 <a:cs typeface="ヒラギノ角ゴ ProN W3" charset="0"/>
               </a:rPr>
               <a:t>For questions or suggestions:</a:t>
@@ -13310,8 +13662,8 @@
               </a:spcBef>
             </a:pPr>
             <a:endParaRPr lang="en-US" dirty="0">
-              <a:latin typeface="Open Sans Light" charset="0"/>
-              <a:ea typeface="ヒラギノ角ゴ ProN W3" charset="0"/>
+              <a:latin typeface="微软雅黑" panose="020B0503020204020204" pitchFamily="34" charset="-122"/>
+              <a:ea typeface="微软雅黑" panose="020B0503020204020204" pitchFamily="34" charset="-122"/>
               <a:cs typeface="ヒラギノ角ゴ ProN W3" charset="0"/>
             </a:endParaRPr>
           </a:p>
@@ -13323,15 +13675,15 @@
             </a:pPr>
             <a:r>
               <a:rPr lang="en-US" dirty="0" smtClean="0">
-                <a:latin typeface="Open Sans Light" charset="0"/>
-                <a:ea typeface="ヒラギノ角ゴ ProN W3" charset="0"/>
+                <a:latin typeface="微软雅黑" panose="020B0503020204020204" pitchFamily="34" charset="-122"/>
+                <a:ea typeface="微软雅黑" panose="020B0503020204020204" pitchFamily="34" charset="-122"/>
                 <a:cs typeface="ヒラギノ角ゴ ProN W3" charset="0"/>
               </a:rPr>
               <a:t>Wu Kun</a:t>
             </a:r>
             <a:endParaRPr lang="en-US" dirty="0">
-              <a:latin typeface="Open Sans Light" charset="0"/>
-              <a:ea typeface="ヒラギノ角ゴ ProN W3" charset="0"/>
+              <a:latin typeface="微软雅黑" panose="020B0503020204020204" pitchFamily="34" charset="-122"/>
+              <a:ea typeface="微软雅黑" panose="020B0503020204020204" pitchFamily="34" charset="-122"/>
               <a:cs typeface="ヒラギノ角ゴ ProN W3" charset="0"/>
             </a:endParaRPr>
           </a:p>
@@ -13343,15 +13695,15 @@
             </a:pPr>
             <a:r>
               <a:rPr lang="en-US" dirty="0" err="1" smtClean="0">
-                <a:latin typeface="Open Sans Light" charset="0"/>
-                <a:ea typeface="ヒラギノ角ゴ ProN W3" charset="0"/>
+                <a:latin typeface="微软雅黑" panose="020B0503020204020204" pitchFamily="34" charset="-122"/>
+                <a:ea typeface="微软雅黑" panose="020B0503020204020204" pitchFamily="34" charset="-122"/>
                 <a:cs typeface="ヒラギノ角ゴ ProN W3" charset="0"/>
               </a:rPr>
               <a:t>kunwu@thoughtworks.com</a:t>
             </a:r>
             <a:endParaRPr lang="en-US" dirty="0">
-              <a:latin typeface="Open Sans Light" charset="0"/>
-              <a:ea typeface="ヒラギノ角ゴ ProN W3" charset="0"/>
+              <a:latin typeface="微软雅黑" panose="020B0503020204020204" pitchFamily="34" charset="-122"/>
+              <a:ea typeface="微软雅黑" panose="020B0503020204020204" pitchFamily="34" charset="-122"/>
               <a:cs typeface="ヒラギノ角ゴ ProN W3" charset="0"/>
             </a:endParaRPr>
           </a:p>
@@ -13412,10 +13764,16 @@
           <a:p>
             <a:pPr algn="ctr"/>
             <a:r>
-              <a:rPr lang="en-US" altLang="zh-CHS" sz="4800" dirty="0" smtClean="0"/>
+              <a:rPr lang="en-US" altLang="zh-Hans" sz="4800" dirty="0" smtClean="0">
+                <a:latin typeface="微软雅黑" panose="020B0503020204020204" pitchFamily="34" charset="-122"/>
+                <a:ea typeface="微软雅黑" panose="020B0503020204020204" pitchFamily="34" charset="-122"/>
+              </a:rPr>
               <a:t>EXERCISE</a:t>
             </a:r>
-            <a:endParaRPr lang="zh-CHS" altLang="en-US" sz="4800" dirty="0"/>
+            <a:endParaRPr lang="zh-Hans" altLang="en-US" sz="4800" dirty="0">
+              <a:latin typeface="微软雅黑" panose="020B0503020204020204" pitchFamily="34" charset="-122"/>
+              <a:ea typeface="微软雅黑" panose="020B0503020204020204" pitchFamily="34" charset="-122"/>
+            </a:endParaRPr>
           </a:p>
         </p:txBody>
       </p:sp>
@@ -13445,7 +13803,10 @@
                 <a:schemeClr val="tx2"/>
               </a:buClr>
             </a:pPr>
-            <a:endParaRPr lang="en-US" altLang="zh-CHS" sz="800" dirty="0"/>
+            <a:endParaRPr lang="en-US" altLang="zh-Hans" sz="800" dirty="0">
+              <a:latin typeface="微软雅黑" panose="020B0503020204020204" pitchFamily="34" charset="-122"/>
+              <a:ea typeface="微软雅黑" panose="020B0503020204020204" pitchFamily="34" charset="-122"/>
+            </a:endParaRPr>
           </a:p>
           <a:p>
             <a:pPr marL="0" indent="0">
@@ -13460,35 +13821,59 @@
               </a:buClr>
             </a:pPr>
             <a:r>
-              <a:rPr lang="zh-CHS" altLang="en-US" sz="3600" dirty="0"/>
+              <a:rPr lang="zh-Hans" altLang="en-US" sz="3600" dirty="0">
+                <a:latin typeface="微软雅黑" panose="020B0503020204020204" pitchFamily="34" charset="-122"/>
+                <a:ea typeface="微软雅黑" panose="020B0503020204020204" pitchFamily="34" charset="-122"/>
+              </a:rPr>
               <a:t>图书馆管理员</a:t>
             </a:r>
             <a:r>
-              <a:rPr lang="en-US" altLang="zh-CHS" sz="3600" dirty="0"/>
+              <a:rPr lang="en-US" altLang="zh-Hans" sz="3600" dirty="0">
+                <a:latin typeface="微软雅黑" panose="020B0503020204020204" pitchFamily="34" charset="-122"/>
+                <a:ea typeface="微软雅黑" panose="020B0503020204020204" pitchFamily="34" charset="-122"/>
+              </a:rPr>
               <a:t>(Librarian)</a:t>
             </a:r>
             <a:r>
-              <a:rPr lang="zh-CHS" altLang="en-US" sz="3600" dirty="0"/>
+              <a:rPr lang="zh-Hans" altLang="en-US" sz="3600" dirty="0">
+                <a:latin typeface="微软雅黑" panose="020B0503020204020204" pitchFamily="34" charset="-122"/>
+                <a:ea typeface="微软雅黑" panose="020B0503020204020204" pitchFamily="34" charset="-122"/>
+              </a:rPr>
               <a:t>会定期向书商</a:t>
             </a:r>
             <a:r>
-              <a:rPr lang="en-US" altLang="zh-CHS" sz="3600" dirty="0"/>
+              <a:rPr lang="en-US" altLang="zh-Hans" sz="3600" dirty="0">
+                <a:latin typeface="微软雅黑" panose="020B0503020204020204" pitchFamily="34" charset="-122"/>
+                <a:ea typeface="微软雅黑" panose="020B0503020204020204" pitchFamily="34" charset="-122"/>
+              </a:rPr>
               <a:t>(</a:t>
             </a:r>
             <a:r>
-              <a:rPr lang="en-US" altLang="zh-CHS" sz="3600" dirty="0" err="1"/>
+              <a:rPr lang="en-US" altLang="zh-Hans" sz="3600" dirty="0" err="1">
+                <a:latin typeface="微软雅黑" panose="020B0503020204020204" pitchFamily="34" charset="-122"/>
+                <a:ea typeface="微软雅黑" panose="020B0503020204020204" pitchFamily="34" charset="-122"/>
+              </a:rPr>
               <a:t>BookVendor</a:t>
             </a:r>
             <a:r>
-              <a:rPr lang="en-US" altLang="zh-CHS" sz="3600" dirty="0"/>
+              <a:rPr lang="en-US" altLang="zh-Hans" sz="3600" dirty="0">
+                <a:latin typeface="微软雅黑" panose="020B0503020204020204" pitchFamily="34" charset="-122"/>
+                <a:ea typeface="微软雅黑" panose="020B0503020204020204" pitchFamily="34" charset="-122"/>
+              </a:rPr>
               <a:t>)</a:t>
             </a:r>
             <a:r>
-              <a:rPr lang="zh-CHS" altLang="en-US" sz="3600" dirty="0"/>
+              <a:rPr lang="zh-Hans" altLang="en-US" sz="3600" dirty="0">
+                <a:latin typeface="微软雅黑" panose="020B0503020204020204" pitchFamily="34" charset="-122"/>
+                <a:ea typeface="微软雅黑" panose="020B0503020204020204" pitchFamily="34" charset="-122"/>
+              </a:rPr>
               <a:t>购买一些书籍来充实图书馆</a:t>
             </a:r>
             <a:r>
-              <a:rPr lang="en-US" altLang="zh-CHS" sz="3600" dirty="0" smtClean="0"/>
+              <a:rPr lang="en-US" altLang="zh-Hans" sz="3600" dirty="0" smtClean="0">
+                <a:latin typeface="微软雅黑" panose="020B0503020204020204" pitchFamily="34" charset="-122"/>
+                <a:ea typeface="微软雅黑" panose="020B0503020204020204" pitchFamily="34" charset="-122"/>
+              </a:rPr>
               <a:t>:</a:t>
             </a:r>
           </a:p>
@@ -13504,7 +13889,10 @@
                 <a:schemeClr val="tx2"/>
               </a:buClr>
             </a:pPr>
-            <a:endParaRPr lang="en-US" altLang="zh-CHS" sz="800" dirty="0" smtClean="0"/>
+            <a:endParaRPr lang="en-US" altLang="zh-Hans" sz="800" dirty="0" smtClean="0">
+              <a:latin typeface="微软雅黑" panose="020B0503020204020204" pitchFamily="34" charset="-122"/>
+              <a:ea typeface="微软雅黑" panose="020B0503020204020204" pitchFamily="34" charset="-122"/>
+            </a:endParaRPr>
           </a:p>
           <a:p>
             <a:pPr marL="520700" indent="-520700">
@@ -13521,30 +13909,51 @@
               <a:buChar char=""/>
             </a:pPr>
             <a:r>
-              <a:rPr lang="zh-CHS" altLang="en-US" sz="3600" dirty="0"/>
+              <a:rPr lang="zh-Hans" altLang="en-US" sz="3600" dirty="0">
+                <a:latin typeface="微软雅黑" panose="020B0503020204020204" pitchFamily="34" charset="-122"/>
+                <a:ea typeface="微软雅黑" panose="020B0503020204020204" pitchFamily="34" charset="-122"/>
+              </a:rPr>
               <a:t>书商能够提供多种图书</a:t>
             </a:r>
             <a:r>
-              <a:rPr lang="en-US" altLang="zh-CHS" sz="3600" dirty="0"/>
+              <a:rPr lang="en-US" altLang="zh-Hans" sz="3600" dirty="0">
+                <a:latin typeface="微软雅黑" panose="020B0503020204020204" pitchFamily="34" charset="-122"/>
+                <a:ea typeface="微软雅黑" panose="020B0503020204020204" pitchFamily="34" charset="-122"/>
+              </a:rPr>
               <a:t>(</a:t>
             </a:r>
             <a:r>
-              <a:rPr lang="zh-CHS" altLang="en-US" sz="3600" dirty="0"/>
+              <a:rPr lang="zh-Hans" altLang="en-US" sz="3600" dirty="0">
+                <a:latin typeface="微软雅黑" panose="020B0503020204020204" pitchFamily="34" charset="-122"/>
+                <a:ea typeface="微软雅黑" panose="020B0503020204020204" pitchFamily="34" charset="-122"/>
+              </a:rPr>
               <a:t>附有价格</a:t>
             </a:r>
             <a:r>
-              <a:rPr lang="en-US" altLang="zh-CHS" sz="3600" dirty="0"/>
+              <a:rPr lang="en-US" altLang="zh-Hans" sz="3600" dirty="0">
+                <a:latin typeface="微软雅黑" panose="020B0503020204020204" pitchFamily="34" charset="-122"/>
+                <a:ea typeface="微软雅黑" panose="020B0503020204020204" pitchFamily="34" charset="-122"/>
+              </a:rPr>
               <a:t>)</a:t>
             </a:r>
             <a:r>
-              <a:rPr lang="zh-CHS" altLang="en-US" sz="3600" dirty="0"/>
+              <a:rPr lang="zh-Hans" altLang="en-US" sz="3600" dirty="0">
+                <a:latin typeface="微软雅黑" panose="020B0503020204020204" pitchFamily="34" charset="-122"/>
+                <a:ea typeface="微软雅黑" panose="020B0503020204020204" pitchFamily="34" charset="-122"/>
+              </a:rPr>
               <a:t>供管理员进行</a:t>
             </a:r>
             <a:r>
-              <a:rPr lang="zh-CHS" altLang="en-US" sz="3600" dirty="0" smtClean="0"/>
+              <a:rPr lang="zh-Hans" altLang="en-US" sz="3600" dirty="0" smtClean="0">
+                <a:latin typeface="微软雅黑" panose="020B0503020204020204" pitchFamily="34" charset="-122"/>
+                <a:ea typeface="微软雅黑" panose="020B0503020204020204" pitchFamily="34" charset="-122"/>
+              </a:rPr>
               <a:t>选择</a:t>
             </a:r>
-            <a:endParaRPr lang="en-US" altLang="zh-CHS" sz="3600" dirty="0" smtClean="0"/>
+            <a:endParaRPr lang="en-US" altLang="zh-Hans" sz="3600" dirty="0" smtClean="0">
+              <a:latin typeface="微软雅黑" panose="020B0503020204020204" pitchFamily="34" charset="-122"/>
+              <a:ea typeface="微软雅黑" panose="020B0503020204020204" pitchFamily="34" charset="-122"/>
+            </a:endParaRPr>
           </a:p>
           <a:p>
             <a:pPr marL="0" indent="0">
@@ -13558,7 +13967,10 @@
                 <a:schemeClr val="tx2"/>
               </a:buClr>
             </a:pPr>
-            <a:endParaRPr lang="zh-CHS" altLang="en-US" sz="800" dirty="0"/>
+            <a:endParaRPr lang="zh-Hans" altLang="en-US" sz="800" dirty="0">
+              <a:latin typeface="微软雅黑" panose="020B0503020204020204" pitchFamily="34" charset="-122"/>
+              <a:ea typeface="微软雅黑" panose="020B0503020204020204" pitchFamily="34" charset="-122"/>
+            </a:endParaRPr>
           </a:p>
           <a:p>
             <a:pPr marL="520700" indent="-520700">
@@ -13575,14 +13987,23 @@
               <a:buChar char=""/>
             </a:pPr>
             <a:r>
-              <a:rPr lang="zh-CHS" altLang="en-US" sz="3600" dirty="0"/>
+              <a:rPr lang="zh-Hans" altLang="en-US" sz="3600" dirty="0">
+                <a:latin typeface="微软雅黑" panose="020B0503020204020204" pitchFamily="34" charset="-122"/>
+                <a:ea typeface="微软雅黑" panose="020B0503020204020204" pitchFamily="34" charset="-122"/>
+              </a:rPr>
               <a:t>管理员仅会挑选当前图书馆中不存在的书籍进行</a:t>
             </a:r>
             <a:r>
-              <a:rPr lang="zh-CHS" altLang="en-US" sz="3600" dirty="0" smtClean="0"/>
+              <a:rPr lang="zh-Hans" altLang="en-US" sz="3600" dirty="0" smtClean="0">
+                <a:latin typeface="微软雅黑" panose="020B0503020204020204" pitchFamily="34" charset="-122"/>
+                <a:ea typeface="微软雅黑" panose="020B0503020204020204" pitchFamily="34" charset="-122"/>
+              </a:rPr>
               <a:t>购买</a:t>
             </a:r>
-            <a:endParaRPr lang="en-US" altLang="zh-CHS" sz="3600" dirty="0"/>
+            <a:endParaRPr lang="en-US" altLang="zh-Hans" sz="3600" dirty="0">
+              <a:latin typeface="微软雅黑" panose="020B0503020204020204" pitchFamily="34" charset="-122"/>
+              <a:ea typeface="微软雅黑" panose="020B0503020204020204" pitchFamily="34" charset="-122"/>
+            </a:endParaRPr>
           </a:p>
           <a:p>
             <a:pPr marL="0" indent="0">
@@ -13596,7 +14017,10 @@
                 <a:schemeClr val="tx2"/>
               </a:buClr>
             </a:pPr>
-            <a:endParaRPr lang="en-US" altLang="zh-CHS" sz="800" dirty="0" smtClean="0"/>
+            <a:endParaRPr lang="en-US" altLang="zh-Hans" sz="800" dirty="0" smtClean="0">
+              <a:latin typeface="微软雅黑" panose="020B0503020204020204" pitchFamily="34" charset="-122"/>
+              <a:ea typeface="微软雅黑" panose="020B0503020204020204" pitchFamily="34" charset="-122"/>
+            </a:endParaRPr>
           </a:p>
           <a:p>
             <a:pPr marL="520700" indent="-520700">
@@ -13613,15 +14037,24 @@
               <a:buChar char=""/>
             </a:pPr>
             <a:r>
-              <a:rPr lang="zh-CHS" altLang="en-US" sz="3600" dirty="0"/>
+              <a:rPr lang="zh-Hans" altLang="en-US" sz="3600" dirty="0">
+                <a:latin typeface="微软雅黑" panose="020B0503020204020204" pitchFamily="34" charset="-122"/>
+                <a:ea typeface="微软雅黑" panose="020B0503020204020204" pitchFamily="34" charset="-122"/>
+              </a:rPr>
               <a:t>管理员选好图书后</a:t>
             </a:r>
             <a:r>
-              <a:rPr lang="en-US" altLang="zh-CHS" sz="3600" dirty="0"/>
+              <a:rPr lang="en-US" altLang="zh-Hans" sz="3600" dirty="0">
+                <a:latin typeface="微软雅黑" panose="020B0503020204020204" pitchFamily="34" charset="-122"/>
+                <a:ea typeface="微软雅黑" panose="020B0503020204020204" pitchFamily="34" charset="-122"/>
+              </a:rPr>
               <a:t>, </a:t>
             </a:r>
             <a:r>
-              <a:rPr lang="zh-CHS" altLang="en-US" sz="3600" dirty="0"/>
+              <a:rPr lang="zh-Hans" altLang="en-US" sz="3600" dirty="0">
+                <a:latin typeface="微软雅黑" panose="020B0503020204020204" pitchFamily="34" charset="-122"/>
+                <a:ea typeface="微软雅黑" panose="020B0503020204020204" pitchFamily="34" charset="-122"/>
+              </a:rPr>
               <a:t>会向书商支付所选书籍的总金额</a:t>
             </a:r>
           </a:p>
@@ -13639,7 +14072,10 @@
               <a:buFont typeface="Wingdings" charset="2"/>
               <a:buChar char=""/>
             </a:pPr>
-            <a:endParaRPr lang="zh-CHS" altLang="en-US" sz="3600" dirty="0"/>
+            <a:endParaRPr lang="zh-Hans" altLang="en-US" sz="3600" dirty="0">
+              <a:latin typeface="微软雅黑" panose="020B0503020204020204" pitchFamily="34" charset="-122"/>
+              <a:ea typeface="微软雅黑" panose="020B0503020204020204" pitchFamily="34" charset="-122"/>
+            </a:endParaRPr>
           </a:p>
         </p:txBody>
       </p:sp>
@@ -13662,13 +14098,19 @@
               <a:defRPr/>
             </a:pPr>
             <a:fld id="{6BD71149-C6B6-DA41-AB69-4C8E97C931F0}" type="slidenum">
-              <a:rPr lang="en-US" smtClean="0"/>
+              <a:rPr lang="en-US" smtClean="0">
+                <a:latin typeface="微软雅黑" panose="020B0503020204020204" pitchFamily="34" charset="-122"/>
+                <a:ea typeface="微软雅黑" panose="020B0503020204020204" pitchFamily="34" charset="-122"/>
+              </a:rPr>
               <a:pPr>
                 <a:defRPr/>
               </a:pPr>
               <a:t>2</a:t>
             </a:fld>
-            <a:endParaRPr lang="en-US"/>
+            <a:endParaRPr lang="en-US">
+              <a:latin typeface="微软雅黑" panose="020B0503020204020204" pitchFamily="34" charset="-122"/>
+              <a:ea typeface="微软雅黑" panose="020B0503020204020204" pitchFamily="34" charset="-122"/>
+            </a:endParaRPr>
           </a:p>
         </p:txBody>
       </p:sp>
@@ -13759,10 +14201,16 @@
           <a:p>
             <a:pPr algn="ctr"/>
             <a:r>
-              <a:rPr lang="en-US" altLang="zh-CHS" sz="4800" dirty="0" smtClean="0"/>
+              <a:rPr lang="en-US" altLang="zh-Hans" sz="4800" dirty="0" smtClean="0">
+                <a:latin typeface="微软雅黑" panose="020B0503020204020204" pitchFamily="34" charset="-122"/>
+                <a:ea typeface="微软雅黑" panose="020B0503020204020204" pitchFamily="34" charset="-122"/>
+              </a:rPr>
               <a:t>EXERCISE</a:t>
             </a:r>
-            <a:endParaRPr lang="zh-CHS" altLang="en-US" sz="4800" dirty="0"/>
+            <a:endParaRPr lang="zh-Hans" altLang="en-US" sz="4800" dirty="0">
+              <a:latin typeface="微软雅黑" panose="020B0503020204020204" pitchFamily="34" charset="-122"/>
+              <a:ea typeface="微软雅黑" panose="020B0503020204020204" pitchFamily="34" charset="-122"/>
+            </a:endParaRPr>
           </a:p>
         </p:txBody>
       </p:sp>
@@ -13794,7 +14242,10 @@
               <a:buFont typeface="Wingdings" charset="2"/>
               <a:buChar char=""/>
             </a:pPr>
-            <a:endParaRPr lang="zh-CHS" altLang="en-US" sz="900" dirty="0" smtClean="0"/>
+            <a:endParaRPr lang="zh-Hans" altLang="en-US" sz="900" dirty="0" smtClean="0">
+              <a:latin typeface="微软雅黑" panose="020B0503020204020204" pitchFamily="34" charset="-122"/>
+              <a:ea typeface="微软雅黑" panose="020B0503020204020204" pitchFamily="34" charset="-122"/>
+            </a:endParaRPr>
           </a:p>
           <a:p>
             <a:pPr marL="520700" indent="-520700">
@@ -13811,18 +14262,30 @@
               <a:buChar char=""/>
             </a:pPr>
             <a:r>
-              <a:rPr lang="zh-CHS" altLang="en-US" sz="3600" dirty="0" smtClean="0"/>
+              <a:rPr lang="zh-Hans" altLang="en-US" sz="3600" dirty="0" smtClean="0">
+                <a:latin typeface="微软雅黑" panose="020B0503020204020204" pitchFamily="34" charset="-122"/>
+                <a:ea typeface="微软雅黑" panose="020B0503020204020204" pitchFamily="34" charset="-122"/>
+              </a:rPr>
               <a:t>从原始</a:t>
             </a:r>
             <a:r>
-              <a:rPr lang="en-US" altLang="zh-CHS" sz="3600" dirty="0" smtClean="0"/>
+              <a:rPr lang="en-US" altLang="zh-Hans" sz="3600" dirty="0" smtClean="0">
+                <a:latin typeface="微软雅黑" panose="020B0503020204020204" pitchFamily="34" charset="-122"/>
+                <a:ea typeface="微软雅黑" panose="020B0503020204020204" pitchFamily="34" charset="-122"/>
+              </a:rPr>
               <a:t>Repo</a:t>
             </a:r>
             <a:r>
-              <a:rPr lang="zh-CHS" altLang="en-US" sz="3600" dirty="0" smtClean="0"/>
+              <a:rPr lang="zh-Hans" altLang="en-US" sz="3600" dirty="0" smtClean="0">
+                <a:latin typeface="微软雅黑" panose="020B0503020204020204" pitchFamily="34" charset="-122"/>
+                <a:ea typeface="微软雅黑" panose="020B0503020204020204" pitchFamily="34" charset="-122"/>
+              </a:rPr>
               <a:t>上更新代码</a:t>
             </a:r>
-            <a:endParaRPr lang="en-US" altLang="zh-CHS" sz="3600" dirty="0" smtClean="0"/>
+            <a:endParaRPr lang="en-US" altLang="zh-Hans" sz="3600" dirty="0" smtClean="0">
+              <a:latin typeface="微软雅黑" panose="020B0503020204020204" pitchFamily="34" charset="-122"/>
+              <a:ea typeface="微软雅黑" panose="020B0503020204020204" pitchFamily="34" charset="-122"/>
+            </a:endParaRPr>
           </a:p>
           <a:p>
             <a:pPr marL="920750" lvl="1" indent="-520700" latinLnBrk="1">
@@ -13837,87 +14300,87 @@
             </a:pPr>
             <a:r>
               <a:rPr lang="en-US" sz="2800" dirty="0" err="1">
-                <a:latin typeface="Open Sans" charset="0"/>
-                <a:ea typeface="Open Sans" charset="0"/>
+                <a:latin typeface="微软雅黑" panose="020B0503020204020204" pitchFamily="34" charset="-122"/>
+                <a:ea typeface="微软雅黑" panose="020B0503020204020204" pitchFamily="34" charset="-122"/>
                 <a:cs typeface="Open Sans" charset="0"/>
               </a:rPr>
               <a:t>git</a:t>
             </a:r>
             <a:r>
               <a:rPr lang="en-US" sz="2800" dirty="0">
-                <a:latin typeface="Open Sans" charset="0"/>
-                <a:ea typeface="Open Sans" charset="0"/>
+                <a:latin typeface="微软雅黑" panose="020B0503020204020204" pitchFamily="34" charset="-122"/>
+                <a:ea typeface="微软雅黑" panose="020B0503020204020204" pitchFamily="34" charset="-122"/>
                 <a:cs typeface="Open Sans" charset="0"/>
               </a:rPr>
               <a:t> remote add source https://</a:t>
             </a:r>
             <a:r>
               <a:rPr lang="en-US" sz="2800" dirty="0" err="1">
-                <a:latin typeface="Open Sans" charset="0"/>
-                <a:ea typeface="Open Sans" charset="0"/>
+                <a:latin typeface="微软雅黑" panose="020B0503020204020204" pitchFamily="34" charset="-122"/>
+                <a:ea typeface="微软雅黑" panose="020B0503020204020204" pitchFamily="34" charset="-122"/>
                 <a:cs typeface="Open Sans" charset="0"/>
               </a:rPr>
               <a:t>github.com</a:t>
             </a:r>
             <a:r>
               <a:rPr lang="en-US" sz="2800" dirty="0">
-                <a:latin typeface="Open Sans" charset="0"/>
-                <a:ea typeface="Open Sans" charset="0"/>
+                <a:latin typeface="微软雅黑" panose="020B0503020204020204" pitchFamily="34" charset="-122"/>
+                <a:ea typeface="微软雅黑" panose="020B0503020204020204" pitchFamily="34" charset="-122"/>
                 <a:cs typeface="Open Sans" charset="0"/>
               </a:rPr>
               <a:t>/</a:t>
             </a:r>
             <a:r>
               <a:rPr lang="en-US" sz="2800" dirty="0" err="1">
-                <a:latin typeface="Open Sans" charset="0"/>
-                <a:ea typeface="Open Sans" charset="0"/>
+                <a:latin typeface="微软雅黑" panose="020B0503020204020204" pitchFamily="34" charset="-122"/>
+                <a:ea typeface="微软雅黑" panose="020B0503020204020204" pitchFamily="34" charset="-122"/>
                 <a:cs typeface="Open Sans" charset="0"/>
               </a:rPr>
               <a:t>coney</a:t>
             </a:r>
             <a:r>
               <a:rPr lang="en-US" sz="2800" dirty="0">
-                <a:latin typeface="Open Sans" charset="0"/>
-                <a:ea typeface="Open Sans" charset="0"/>
+                <a:latin typeface="微软雅黑" panose="020B0503020204020204" pitchFamily="34" charset="-122"/>
+                <a:ea typeface="微软雅黑" panose="020B0503020204020204" pitchFamily="34" charset="-122"/>
                 <a:cs typeface="Open Sans" charset="0"/>
               </a:rPr>
               <a:t>/</a:t>
             </a:r>
             <a:r>
               <a:rPr lang="en-US" sz="2800" dirty="0" err="1">
-                <a:latin typeface="Open Sans" charset="0"/>
-                <a:ea typeface="Open Sans" charset="0"/>
+                <a:latin typeface="微软雅黑" panose="020B0503020204020204" pitchFamily="34" charset="-122"/>
+                <a:ea typeface="微软雅黑" panose="020B0503020204020204" pitchFamily="34" charset="-122"/>
                 <a:cs typeface="Open Sans" charset="0"/>
               </a:rPr>
               <a:t>cpp</a:t>
             </a:r>
             <a:r>
               <a:rPr lang="en-US" sz="2800" dirty="0">
-                <a:latin typeface="Open Sans" charset="0"/>
-                <a:ea typeface="Open Sans" charset="0"/>
+                <a:latin typeface="微软雅黑" panose="020B0503020204020204" pitchFamily="34" charset="-122"/>
+                <a:ea typeface="微软雅黑" panose="020B0503020204020204" pitchFamily="34" charset="-122"/>
                 <a:cs typeface="Open Sans" charset="0"/>
               </a:rPr>
               <a:t>-unit-</a:t>
             </a:r>
             <a:r>
               <a:rPr lang="en-US" sz="2800" dirty="0" err="1">
-                <a:latin typeface="Open Sans" charset="0"/>
-                <a:ea typeface="Open Sans" charset="0"/>
+                <a:latin typeface="微软雅黑" panose="020B0503020204020204" pitchFamily="34" charset="-122"/>
+                <a:ea typeface="微软雅黑" panose="020B0503020204020204" pitchFamily="34" charset="-122"/>
                 <a:cs typeface="Open Sans" charset="0"/>
               </a:rPr>
               <a:t>testing.git</a:t>
             </a:r>
             <a:r>
-              <a:rPr lang="en-US" altLang="zh-CHS" sz="2800" dirty="0">
-                <a:latin typeface="Open Sans" charset="0"/>
-                <a:ea typeface="Open Sans" charset="0"/>
+              <a:rPr lang="en-US" altLang="zh-Hans" sz="2800" dirty="0">
+                <a:latin typeface="微软雅黑" panose="020B0503020204020204" pitchFamily="34" charset="-122"/>
+                <a:ea typeface="微软雅黑" panose="020B0503020204020204" pitchFamily="34" charset="-122"/>
                 <a:cs typeface="Open Sans" charset="0"/>
               </a:rPr>
               <a:t> </a:t>
             </a:r>
-            <a:endParaRPr lang="en-US" altLang="zh-CHS" sz="1000" dirty="0">
-              <a:latin typeface="Open Sans" charset="0"/>
-              <a:ea typeface="Open Sans" charset="0"/>
+            <a:endParaRPr lang="en-US" altLang="zh-Hans" sz="1000" dirty="0">
+              <a:latin typeface="微软雅黑" panose="020B0503020204020204" pitchFamily="34" charset="-122"/>
+              <a:ea typeface="微软雅黑" panose="020B0503020204020204" pitchFamily="34" charset="-122"/>
               <a:cs typeface="Open Sans" charset="0"/>
             </a:endParaRPr>
           </a:p>
@@ -13933,17 +14396,17 @@
               <a:buChar char=""/>
             </a:pPr>
             <a:r>
-              <a:rPr lang="en-US" altLang="zh-CHS" sz="2800" dirty="0" err="1" smtClean="0">
-                <a:latin typeface="Open Sans" charset="0"/>
-                <a:ea typeface="Open Sans" charset="0"/>
+              <a:rPr lang="en-US" altLang="zh-Hans" sz="2800" dirty="0" err="1" smtClean="0">
+                <a:latin typeface="微软雅黑" panose="020B0503020204020204" pitchFamily="34" charset="-122"/>
+                <a:ea typeface="微软雅黑" panose="020B0503020204020204" pitchFamily="34" charset="-122"/>
                 <a:cs typeface="Open Sans" charset="0"/>
               </a:rPr>
               <a:t>git</a:t>
             </a:r>
             <a:r>
-              <a:rPr lang="en-US" altLang="zh-CHS" sz="2800" dirty="0" smtClean="0">
-                <a:latin typeface="Open Sans" charset="0"/>
-                <a:ea typeface="Open Sans" charset="0"/>
+              <a:rPr lang="en-US" altLang="zh-Hans" sz="2800" dirty="0" smtClean="0">
+                <a:latin typeface="微软雅黑" panose="020B0503020204020204" pitchFamily="34" charset="-122"/>
+                <a:ea typeface="微软雅黑" panose="020B0503020204020204" pitchFamily="34" charset="-122"/>
                 <a:cs typeface="Open Sans" charset="0"/>
               </a:rPr>
               <a:t> pull source master</a:t>
@@ -13960,7 +14423,10 @@
               <a:buFont typeface="Wingdings" charset="2"/>
               <a:buChar char=""/>
             </a:pPr>
-            <a:endParaRPr lang="zh-CHS" altLang="en-US" sz="2200" dirty="0" smtClean="0"/>
+            <a:endParaRPr lang="zh-Hans" altLang="en-US" sz="2200" dirty="0" smtClean="0">
+              <a:latin typeface="微软雅黑" panose="020B0503020204020204" pitchFamily="34" charset="-122"/>
+              <a:ea typeface="微软雅黑" panose="020B0503020204020204" pitchFamily="34" charset="-122"/>
+            </a:endParaRPr>
           </a:p>
           <a:p>
             <a:pPr marL="520700" indent="-520700">
@@ -13977,31 +14443,52 @@
               <a:buChar char=""/>
             </a:pPr>
             <a:r>
-              <a:rPr lang="zh-CHS" altLang="en-US" sz="3600" dirty="0" smtClean="0"/>
+              <a:rPr lang="zh-Hans" altLang="en-US" sz="3600" dirty="0" smtClean="0">
+                <a:latin typeface="微软雅黑" panose="020B0503020204020204" pitchFamily="34" charset="-122"/>
+                <a:ea typeface="微软雅黑" panose="020B0503020204020204" pitchFamily="34" charset="-122"/>
+              </a:rPr>
               <a:t>重构</a:t>
             </a:r>
             <a:r>
-              <a:rPr lang="en-US" altLang="zh-CHS" sz="3600" dirty="0" smtClean="0"/>
+              <a:rPr lang="en-US" altLang="zh-Hans" sz="3600" dirty="0" smtClean="0">
+                <a:latin typeface="微软雅黑" panose="020B0503020204020204" pitchFamily="34" charset="-122"/>
+                <a:ea typeface="微软雅黑" panose="020B0503020204020204" pitchFamily="34" charset="-122"/>
+              </a:rPr>
               <a:t>Librarian, </a:t>
             </a:r>
             <a:r>
-              <a:rPr lang="zh-CHS" altLang="en-US" sz="3600" dirty="0" smtClean="0"/>
+              <a:rPr lang="zh-Hans" altLang="en-US" sz="3600" dirty="0" smtClean="0">
+                <a:latin typeface="微软雅黑" panose="020B0503020204020204" pitchFamily="34" charset="-122"/>
+                <a:ea typeface="微软雅黑" panose="020B0503020204020204" pitchFamily="34" charset="-122"/>
+              </a:rPr>
               <a:t>使管理员可以通过</a:t>
             </a:r>
             <a:r>
-              <a:rPr lang="en-US" altLang="zh-CHS" sz="3600" dirty="0" smtClean="0"/>
+              <a:rPr lang="en-US" altLang="zh-Hans" sz="3600" dirty="0" smtClean="0">
+                <a:latin typeface="微软雅黑" panose="020B0503020204020204" pitchFamily="34" charset="-122"/>
+                <a:ea typeface="微软雅黑" panose="020B0503020204020204" pitchFamily="34" charset="-122"/>
+              </a:rPr>
               <a:t>store</a:t>
             </a:r>
             <a:r>
-              <a:rPr lang="zh-CHS" altLang="en-US" sz="3600" dirty="0" smtClean="0"/>
+              <a:rPr lang="zh-Hans" altLang="en-US" sz="3600" dirty="0" smtClean="0">
+                <a:latin typeface="微软雅黑" panose="020B0503020204020204" pitchFamily="34" charset="-122"/>
+                <a:ea typeface="微软雅黑" panose="020B0503020204020204" pitchFamily="34" charset="-122"/>
+              </a:rPr>
               <a:t>方法存入一个</a:t>
             </a:r>
             <a:r>
-              <a:rPr lang="en-US" altLang="zh-CHS" sz="3600" dirty="0" smtClean="0"/>
+              <a:rPr lang="en-US" altLang="zh-Hans" sz="3600" dirty="0" smtClean="0">
+                <a:latin typeface="微软雅黑" panose="020B0503020204020204" pitchFamily="34" charset="-122"/>
+                <a:ea typeface="微软雅黑" panose="020B0503020204020204" pitchFamily="34" charset="-122"/>
+              </a:rPr>
               <a:t>Book</a:t>
             </a:r>
             <a:r>
-              <a:rPr lang="zh-CHS" altLang="en-US" sz="3600" dirty="0" smtClean="0"/>
+              <a:rPr lang="zh-Hans" altLang="en-US" sz="3600" dirty="0" smtClean="0">
+                <a:latin typeface="微软雅黑" panose="020B0503020204020204" pitchFamily="34" charset="-122"/>
+                <a:ea typeface="微软雅黑" panose="020B0503020204020204" pitchFamily="34" charset="-122"/>
+              </a:rPr>
               <a:t>对象</a:t>
             </a:r>
           </a:p>
@@ -14016,7 +14503,10 @@
               <a:buFont typeface="Wingdings" charset="2"/>
               <a:buChar char=""/>
             </a:pPr>
-            <a:endParaRPr lang="zh-CHS" altLang="en-US" sz="2200" dirty="0" smtClean="0"/>
+            <a:endParaRPr lang="zh-Hans" altLang="en-US" sz="2200" dirty="0" smtClean="0">
+              <a:latin typeface="微软雅黑" panose="020B0503020204020204" pitchFamily="34" charset="-122"/>
+              <a:ea typeface="微软雅黑" panose="020B0503020204020204" pitchFamily="34" charset="-122"/>
+            </a:endParaRPr>
           </a:p>
           <a:p>
             <a:pPr marL="520700" indent="-520700">
@@ -14033,18 +14523,30 @@
               <a:buChar char=""/>
             </a:pPr>
             <a:r>
-              <a:rPr lang="zh-CHS" altLang="en-US" sz="3600" dirty="0" smtClean="0"/>
+              <a:rPr lang="zh-Hans" altLang="en-US" sz="3600" dirty="0" smtClean="0">
+                <a:latin typeface="微软雅黑" panose="020B0503020204020204" pitchFamily="34" charset="-122"/>
+                <a:ea typeface="微软雅黑" panose="020B0503020204020204" pitchFamily="34" charset="-122"/>
+              </a:rPr>
               <a:t>思考如何编写</a:t>
             </a:r>
             <a:r>
-              <a:rPr lang="en-US" altLang="zh-CHS" sz="3600" dirty="0" smtClean="0"/>
+              <a:rPr lang="en-US" altLang="zh-Hans" sz="3600" dirty="0" smtClean="0">
+                <a:latin typeface="微软雅黑" panose="020B0503020204020204" pitchFamily="34" charset="-122"/>
+                <a:ea typeface="微软雅黑" panose="020B0503020204020204" pitchFamily="34" charset="-122"/>
+              </a:rPr>
               <a:t>Librarian::store(vendor)</a:t>
             </a:r>
             <a:r>
-              <a:rPr lang="zh-CHS" altLang="en-US" sz="3600" dirty="0" smtClean="0"/>
+              <a:rPr lang="zh-Hans" altLang="en-US" sz="3600" dirty="0" smtClean="0">
+                <a:latin typeface="微软雅黑" panose="020B0503020204020204" pitchFamily="34" charset="-122"/>
+                <a:ea typeface="微软雅黑" panose="020B0503020204020204" pitchFamily="34" charset="-122"/>
+              </a:rPr>
               <a:t>的测试</a:t>
             </a:r>
-            <a:endParaRPr lang="zh-CHS" altLang="en-US" sz="3600" dirty="0"/>
+            <a:endParaRPr lang="zh-Hans" altLang="en-US" sz="3600" dirty="0">
+              <a:latin typeface="微软雅黑" panose="020B0503020204020204" pitchFamily="34" charset="-122"/>
+              <a:ea typeface="微软雅黑" panose="020B0503020204020204" pitchFamily="34" charset="-122"/>
+            </a:endParaRPr>
           </a:p>
         </p:txBody>
       </p:sp>
@@ -14067,13 +14569,19 @@
               <a:defRPr/>
             </a:pPr>
             <a:fld id="{6BD71149-C6B6-DA41-AB69-4C8E97C931F0}" type="slidenum">
-              <a:rPr lang="en-US" smtClean="0"/>
+              <a:rPr lang="en-US" smtClean="0">
+                <a:latin typeface="微软雅黑" panose="020B0503020204020204" pitchFamily="34" charset="-122"/>
+                <a:ea typeface="微软雅黑" panose="020B0503020204020204" pitchFamily="34" charset="-122"/>
+              </a:rPr>
               <a:pPr>
                 <a:defRPr/>
               </a:pPr>
               <a:t>3</a:t>
             </a:fld>
-            <a:endParaRPr lang="en-US"/>
+            <a:endParaRPr lang="en-US">
+              <a:latin typeface="微软雅黑" panose="020B0503020204020204" pitchFamily="34" charset="-122"/>
+              <a:ea typeface="微软雅黑" panose="020B0503020204020204" pitchFamily="34" charset="-122"/>
+            </a:endParaRPr>
           </a:p>
         </p:txBody>
       </p:sp>
@@ -14224,7 +14732,10 @@
               <a:defRPr/>
             </a:pPr>
             <a:r>
-              <a:rPr lang="en-US" dirty="0" smtClean="0"/>
+              <a:rPr lang="en-US" dirty="0" smtClean="0">
+                <a:latin typeface="微软雅黑" panose="020B0503020204020204" pitchFamily="34" charset="-122"/>
+                <a:ea typeface="微软雅黑" panose="020B0503020204020204" pitchFamily="34" charset="-122"/>
+              </a:rPr>
               <a:t>Mocking</a:t>
             </a:r>
           </a:p>
@@ -14249,7 +14760,10 @@
               <a:defRPr/>
             </a:pPr>
             <a:r>
-              <a:rPr lang="en-US" dirty="0" smtClean="0"/>
+              <a:rPr lang="en-US" dirty="0" smtClean="0">
+                <a:latin typeface="微软雅黑" panose="020B0503020204020204" pitchFamily="34" charset="-122"/>
+                <a:ea typeface="微软雅黑" panose="020B0503020204020204" pitchFamily="34" charset="-122"/>
+              </a:rPr>
               <a:t>With Google Mock</a:t>
             </a:r>
           </a:p>
@@ -14274,13 +14788,19 @@
               <a:defRPr/>
             </a:pPr>
             <a:fld id="{FF174A22-F644-8D40-AF6E-ACD99327719B}" type="slidenum">
-              <a:rPr lang="en-US"/>
+              <a:rPr lang="en-US">
+                <a:latin typeface="微软雅黑" panose="020B0503020204020204" pitchFamily="34" charset="-122"/>
+                <a:ea typeface="微软雅黑" panose="020B0503020204020204" pitchFamily="34" charset="-122"/>
+              </a:rPr>
               <a:pPr>
                 <a:defRPr/>
               </a:pPr>
               <a:t>4</a:t>
             </a:fld>
-            <a:endParaRPr lang="en-US"/>
+            <a:endParaRPr lang="en-US">
+              <a:latin typeface="微软雅黑" panose="020B0503020204020204" pitchFamily="34" charset="-122"/>
+              <a:ea typeface="微软雅黑" panose="020B0503020204020204" pitchFamily="34" charset="-122"/>
+            </a:endParaRPr>
           </a:p>
         </p:txBody>
       </p:sp>
@@ -14334,10 +14854,16 @@
           <a:p>
             <a:pPr algn="ctr"/>
             <a:r>
-              <a:rPr lang="en-US" altLang="zh-CHS" dirty="0" smtClean="0"/>
+              <a:rPr lang="en-US" altLang="zh-Hans" dirty="0" smtClean="0">
+                <a:latin typeface="微软雅黑" panose="020B0503020204020204" pitchFamily="34" charset="-122"/>
+                <a:ea typeface="微软雅黑" panose="020B0503020204020204" pitchFamily="34" charset="-122"/>
+              </a:rPr>
               <a:t>WHY GOOGLE MOCK</a:t>
             </a:r>
-            <a:endParaRPr lang="zh-CHS" altLang="en-US" dirty="0"/>
+            <a:endParaRPr lang="zh-Hans" altLang="en-US" dirty="0">
+              <a:latin typeface="微软雅黑" panose="020B0503020204020204" pitchFamily="34" charset="-122"/>
+              <a:ea typeface="微软雅黑" panose="020B0503020204020204" pitchFamily="34" charset="-122"/>
+            </a:endParaRPr>
           </a:p>
         </p:txBody>
       </p:sp>
@@ -14357,42 +14883,63 @@
           <a:lstStyle/>
           <a:p>
             <a:r>
-              <a:rPr lang="en-US" altLang="zh-CHS" sz="3200" dirty="0" smtClean="0"/>
+              <a:rPr lang="en-US" altLang="zh-Hans" sz="3200" dirty="0" smtClean="0">
+                <a:latin typeface="微软雅黑" panose="020B0503020204020204" pitchFamily="34" charset="-122"/>
+                <a:ea typeface="微软雅黑" panose="020B0503020204020204" pitchFamily="34" charset="-122"/>
+              </a:rPr>
               <a:t>You want to "mock out" your dependencies.</a:t>
             </a:r>
           </a:p>
           <a:p>
             <a:r>
-              <a:rPr lang="en-US" altLang="zh-CHS" sz="3200" dirty="0" smtClean="0"/>
+              <a:rPr lang="en-US" altLang="zh-Hans" sz="3200" dirty="0" smtClean="0">
+                <a:latin typeface="微软雅黑" panose="020B0503020204020204" pitchFamily="34" charset="-122"/>
+                <a:ea typeface="微软雅黑" panose="020B0503020204020204" pitchFamily="34" charset="-122"/>
+              </a:rPr>
               <a:t>Your tests are slow as they depend on too many libraries or use expensive resources (e.g. a database).</a:t>
             </a:r>
           </a:p>
           <a:p>
             <a:r>
-              <a:rPr lang="en-US" altLang="zh-CHS" sz="3200" dirty="0" smtClean="0"/>
+              <a:rPr lang="en-US" altLang="zh-Hans" sz="3200" dirty="0" smtClean="0">
+                <a:latin typeface="微软雅黑" panose="020B0503020204020204" pitchFamily="34" charset="-122"/>
+                <a:ea typeface="微软雅黑" panose="020B0503020204020204" pitchFamily="34" charset="-122"/>
+              </a:rPr>
               <a:t>Your tests are brittle as some resources they use are unreliable (e.g. the network, current time).</a:t>
             </a:r>
           </a:p>
           <a:p>
             <a:r>
-              <a:rPr lang="en-US" altLang="zh-CHS" sz="3200" dirty="0" smtClean="0"/>
+              <a:rPr lang="en-US" altLang="zh-Hans" sz="3200" dirty="0" smtClean="0">
+                <a:latin typeface="微软雅黑" panose="020B0503020204020204" pitchFamily="34" charset="-122"/>
+                <a:ea typeface="微软雅黑" panose="020B0503020204020204" pitchFamily="34" charset="-122"/>
+              </a:rPr>
               <a:t>You want to test how your code handles a failure which is not easy to trigger.</a:t>
             </a:r>
           </a:p>
           <a:p>
             <a:r>
-              <a:rPr lang="en-US" altLang="zh-CHS" sz="3200" dirty="0" smtClean="0"/>
+              <a:rPr lang="en-US" altLang="zh-Hans" sz="3200" dirty="0" smtClean="0">
+                <a:latin typeface="微软雅黑" panose="020B0503020204020204" pitchFamily="34" charset="-122"/>
+                <a:ea typeface="微软雅黑" panose="020B0503020204020204" pitchFamily="34" charset="-122"/>
+              </a:rPr>
               <a:t>You need to make sure that your module interacts with other modules in the right way.</a:t>
             </a:r>
           </a:p>
           <a:p>
             <a:r>
-              <a:rPr lang="en-US" altLang="zh-CHS" sz="3200" dirty="0" smtClean="0"/>
+              <a:rPr lang="en-US" altLang="zh-Hans" sz="3200" dirty="0" smtClean="0">
+                <a:latin typeface="微软雅黑" panose="020B0503020204020204" pitchFamily="34" charset="-122"/>
+                <a:ea typeface="微软雅黑" panose="020B0503020204020204" pitchFamily="34" charset="-122"/>
+              </a:rPr>
               <a:t>Dependent Interface Does not yet exist or may change behavior. </a:t>
             </a:r>
           </a:p>
           <a:p>
-            <a:endParaRPr lang="zh-CHS" altLang="en-US" sz="3200" dirty="0"/>
+            <a:endParaRPr lang="zh-Hans" altLang="en-US" sz="3200" dirty="0">
+              <a:latin typeface="微软雅黑" panose="020B0503020204020204" pitchFamily="34" charset="-122"/>
+              <a:ea typeface="微软雅黑" panose="020B0503020204020204" pitchFamily="34" charset="-122"/>
+            </a:endParaRPr>
           </a:p>
         </p:txBody>
       </p:sp>
@@ -14415,13 +14962,19 @@
               <a:defRPr/>
             </a:pPr>
             <a:fld id="{28FE6BA1-A7B4-7B4F-846F-93E3CD6980EB}" type="slidenum">
-              <a:rPr lang="en-US" smtClean="0"/>
+              <a:rPr lang="en-US" smtClean="0">
+                <a:latin typeface="微软雅黑" panose="020B0503020204020204" pitchFamily="34" charset="-122"/>
+                <a:ea typeface="微软雅黑" panose="020B0503020204020204" pitchFamily="34" charset="-122"/>
+              </a:rPr>
               <a:pPr>
                 <a:defRPr/>
               </a:pPr>
               <a:t>5</a:t>
             </a:fld>
-            <a:endParaRPr lang="en-US"/>
+            <a:endParaRPr lang="en-US">
+              <a:latin typeface="微软雅黑" panose="020B0503020204020204" pitchFamily="34" charset="-122"/>
+              <a:ea typeface="微软雅黑" panose="020B0503020204020204" pitchFamily="34" charset="-122"/>
+            </a:endParaRPr>
           </a:p>
         </p:txBody>
       </p:sp>
@@ -14480,10 +15033,16 @@
           <a:p>
             <a:pPr algn="ctr"/>
             <a:r>
-              <a:rPr lang="en-US" altLang="zh-CHS" spc="-210" dirty="0" smtClean="0"/>
+              <a:rPr lang="en-US" altLang="zh-Hans" spc="-210" dirty="0" smtClean="0">
+                <a:latin typeface="微软雅黑" panose="020B0503020204020204" pitchFamily="34" charset="-122"/>
+                <a:ea typeface="微软雅黑" panose="020B0503020204020204" pitchFamily="34" charset="-122"/>
+              </a:rPr>
               <a:t>MOCK Object</a:t>
             </a:r>
-            <a:endParaRPr lang="zh-CHS" altLang="en-US" dirty="0"/>
+            <a:endParaRPr lang="zh-Hans" altLang="en-US" dirty="0">
+              <a:latin typeface="微软雅黑" panose="020B0503020204020204" pitchFamily="34" charset="-122"/>
+              <a:ea typeface="微软雅黑" panose="020B0503020204020204" pitchFamily="34" charset="-122"/>
+            </a:endParaRPr>
           </a:p>
         </p:txBody>
       </p:sp>
@@ -14504,46 +15063,58 @@
           <a:p>
             <a:pPr marL="0" lvl="0"/>
             <a:r>
-              <a:rPr lang="en-US" altLang="zh-CHS" sz="3600" dirty="0" smtClean="0">
+              <a:rPr lang="en-US" altLang="zh-Hans" sz="3600" dirty="0" smtClean="0">
+                <a:latin typeface="微软雅黑" panose="020B0503020204020204" pitchFamily="34" charset="-122"/>
+                <a:ea typeface="微软雅黑" panose="020B0503020204020204" pitchFamily="34" charset="-122"/>
                 <a:sym typeface="Calibri"/>
               </a:rPr>
               <a:t>A </a:t>
             </a:r>
             <a:r>
-              <a:rPr lang="en-US" altLang="zh-CHS" sz="3600" dirty="0" smtClean="0">
+              <a:rPr lang="en-US" altLang="zh-Hans" sz="3600" dirty="0" smtClean="0">
                 <a:solidFill>
                   <a:srgbClr val="FF2600"/>
                 </a:solidFill>
+                <a:latin typeface="微软雅黑" panose="020B0503020204020204" pitchFamily="34" charset="-122"/>
+                <a:ea typeface="微软雅黑" panose="020B0503020204020204" pitchFamily="34" charset="-122"/>
                 <a:sym typeface="Calibri"/>
               </a:rPr>
               <a:t>mock object</a:t>
             </a:r>
             <a:r>
-              <a:rPr lang="en-US" altLang="zh-CHS" sz="3600" dirty="0" smtClean="0">
+              <a:rPr lang="en-US" altLang="zh-Hans" sz="3600" dirty="0" smtClean="0">
+                <a:latin typeface="微软雅黑" panose="020B0503020204020204" pitchFamily="34" charset="-122"/>
+                <a:ea typeface="微软雅黑" panose="020B0503020204020204" pitchFamily="34" charset="-122"/>
                 <a:sym typeface="Calibri"/>
               </a:rPr>
               <a:t> implements the same interface as a real object (so it can be used as one), but lets you specify at run time </a:t>
             </a:r>
             <a:r>
-              <a:rPr lang="en-US" altLang="zh-CHS" sz="3600" dirty="0" smtClean="0">
+              <a:rPr lang="en-US" altLang="zh-Hans" sz="3600" dirty="0" smtClean="0">
                 <a:solidFill>
                   <a:srgbClr val="FF0000"/>
                 </a:solidFill>
+                <a:latin typeface="微软雅黑" panose="020B0503020204020204" pitchFamily="34" charset="-122"/>
+                <a:ea typeface="微软雅黑" panose="020B0503020204020204" pitchFamily="34" charset="-122"/>
                 <a:sym typeface="Calibri"/>
               </a:rPr>
               <a:t>how it will be used</a:t>
             </a:r>
             <a:r>
-              <a:rPr lang="en-US" altLang="zh-CHS" sz="3600" dirty="0" smtClean="0">
+              <a:rPr lang="en-US" altLang="zh-Hans" sz="3600" dirty="0" smtClean="0">
+                <a:latin typeface="微软雅黑" panose="020B0503020204020204" pitchFamily="34" charset="-122"/>
+                <a:ea typeface="微软雅黑" panose="020B0503020204020204" pitchFamily="34" charset="-122"/>
                 <a:sym typeface="Calibri"/>
               </a:rPr>
               <a:t> and </a:t>
             </a:r>
             <a:r>
-              <a:rPr lang="en-US" altLang="zh-CHS" sz="3600" dirty="0" smtClean="0">
+              <a:rPr lang="en-US" altLang="zh-Hans" sz="3600" dirty="0" smtClean="0">
                 <a:solidFill>
                   <a:srgbClr val="FF0000"/>
                 </a:solidFill>
+                <a:latin typeface="微软雅黑" panose="020B0503020204020204" pitchFamily="34" charset="-122"/>
+                <a:ea typeface="微软雅黑" panose="020B0503020204020204" pitchFamily="34" charset="-122"/>
                 <a:sym typeface="Calibri"/>
               </a:rPr>
               <a:t>what it should do</a:t>
@@ -14551,7 +15122,10 @@
           </a:p>
           <a:p>
             <a:pPr marL="0"/>
-            <a:endParaRPr lang="zh-CHS" altLang="en-US" sz="3600" dirty="0"/>
+            <a:endParaRPr lang="zh-Hans" altLang="en-US" sz="3600" dirty="0">
+              <a:latin typeface="微软雅黑" panose="020B0503020204020204" pitchFamily="34" charset="-122"/>
+              <a:ea typeface="微软雅黑" panose="020B0503020204020204" pitchFamily="34" charset="-122"/>
+            </a:endParaRPr>
           </a:p>
         </p:txBody>
       </p:sp>
@@ -14574,13 +15148,19 @@
               <a:defRPr/>
             </a:pPr>
             <a:fld id="{9FA9E053-A9C9-5E43-89F1-83E618EAF168}" type="slidenum">
-              <a:rPr lang="en-US" smtClean="0"/>
+              <a:rPr lang="en-US" smtClean="0">
+                <a:latin typeface="微软雅黑" panose="020B0503020204020204" pitchFamily="34" charset="-122"/>
+                <a:ea typeface="微软雅黑" panose="020B0503020204020204" pitchFamily="34" charset="-122"/>
+              </a:rPr>
               <a:pPr>
                 <a:defRPr/>
               </a:pPr>
               <a:t>6</a:t>
             </a:fld>
-            <a:endParaRPr lang="en-US"/>
+            <a:endParaRPr lang="en-US">
+              <a:latin typeface="微软雅黑" panose="020B0503020204020204" pitchFamily="34" charset="-122"/>
+              <a:ea typeface="微软雅黑" panose="020B0503020204020204" pitchFamily="34" charset="-122"/>
+            </a:endParaRPr>
           </a:p>
         </p:txBody>
       </p:sp>
@@ -14614,6 +15194,54 @@
             <a:headEnd/>
             <a:tailEnd/>
           </a:ln>
+        </p:spPr>
+      </p:pic>
+      <p:pic>
+        <p:nvPicPr>
+          <p:cNvPr id="5" name="图片 4"/>
+          <p:cNvPicPr>
+            <a:picLocks noChangeAspect="1"/>
+          </p:cNvPicPr>
+          <p:nvPr/>
+        </p:nvPicPr>
+        <p:blipFill>
+          <a:blip r:embed="rId3"/>
+          <a:stretch>
+            <a:fillRect/>
+          </a:stretch>
+        </p:blipFill>
+        <p:spPr>
+          <a:xfrm>
+            <a:off x="9119318" y="7567761"/>
+            <a:ext cx="723900" cy="409575"/>
+          </a:xfrm>
+          <a:prstGeom prst="rect">
+            <a:avLst/>
+          </a:prstGeom>
+        </p:spPr>
+      </p:pic>
+      <p:pic>
+        <p:nvPicPr>
+          <p:cNvPr id="6" name="图片 5"/>
+          <p:cNvPicPr>
+            <a:picLocks noChangeAspect="1"/>
+          </p:cNvPicPr>
+          <p:nvPr/>
+        </p:nvPicPr>
+        <p:blipFill>
+          <a:blip r:embed="rId4"/>
+          <a:stretch>
+            <a:fillRect/>
+          </a:stretch>
+        </p:blipFill>
+        <p:spPr>
+          <a:xfrm>
+            <a:off x="6776168" y="7641679"/>
+            <a:ext cx="2352675" cy="361950"/>
+          </a:xfrm>
+          <a:prstGeom prst="rect">
+            <a:avLst/>
+          </a:prstGeom>
         </p:spPr>
       </p:pic>
     </p:spTree>
@@ -14671,10 +15299,16 @@
           <a:p>
             <a:pPr algn="ctr"/>
             <a:r>
-              <a:rPr lang="en-US" altLang="zh-CHS" dirty="0" smtClean="0"/>
+              <a:rPr lang="en-US" altLang="zh-Hans" dirty="0" smtClean="0">
+                <a:latin typeface="微软雅黑" panose="020B0503020204020204" pitchFamily="34" charset="-122"/>
+                <a:ea typeface="微软雅黑" panose="020B0503020204020204" pitchFamily="34" charset="-122"/>
+              </a:rPr>
               <a:t>EXPECTATIONS</a:t>
             </a:r>
-            <a:endParaRPr lang="zh-CHS" altLang="en-US" dirty="0"/>
+            <a:endParaRPr lang="zh-Hans" altLang="en-US" dirty="0">
+              <a:latin typeface="微软雅黑" panose="020B0503020204020204" pitchFamily="34" charset="-122"/>
+              <a:ea typeface="微软雅黑" panose="020B0503020204020204" pitchFamily="34" charset="-122"/>
+            </a:endParaRPr>
           </a:p>
         </p:txBody>
       </p:sp>
@@ -14695,23 +15329,27 @@
           <a:p>
             <a:pPr marL="0"/>
             <a:r>
-              <a:rPr lang="en-US" altLang="zh-CHT" dirty="0" smtClean="0"/>
-              <a:t>Use </a:t>
-            </a:r>
-            <a:r>
-              <a:rPr lang="en-US" altLang="zh-CHT" dirty="0" smtClean="0"/>
-              <a:t>the </a:t>
-            </a:r>
-            <a:r>
-              <a:rPr lang="en-US" altLang="zh-CHT" dirty="0" smtClean="0">
+              <a:rPr lang="en-US" altLang="zh-Hant" dirty="0" smtClean="0">
+                <a:latin typeface="微软雅黑" panose="020B0503020204020204" pitchFamily="34" charset="-122"/>
+                <a:ea typeface="微软雅黑" panose="020B0503020204020204" pitchFamily="34" charset="-122"/>
+              </a:rPr>
+              <a:t>Use the </a:t>
+            </a:r>
+            <a:r>
+              <a:rPr lang="en-US" altLang="zh-Hant" dirty="0" smtClean="0">
                 <a:solidFill>
                   <a:srgbClr val="FF0000"/>
                 </a:solidFill>
+                <a:latin typeface="微软雅黑" panose="020B0503020204020204" pitchFamily="34" charset="-122"/>
+                <a:ea typeface="微软雅黑" panose="020B0503020204020204" pitchFamily="34" charset="-122"/>
               </a:rPr>
               <a:t>EXPECT_CALL()</a:t>
             </a:r>
             <a:r>
-              <a:rPr lang="en-US" altLang="zh-CHT" dirty="0" smtClean="0"/>
+              <a:rPr lang="en-US" altLang="zh-Hant" dirty="0" smtClean="0">
+                <a:latin typeface="微软雅黑" panose="020B0503020204020204" pitchFamily="34" charset="-122"/>
+                <a:ea typeface="微软雅黑" panose="020B0503020204020204" pitchFamily="34" charset="-122"/>
+              </a:rPr>
               <a:t> macro to set an expectation on a mock method</a:t>
             </a:r>
           </a:p>
@@ -14736,13 +15374,19 @@
               <a:defRPr/>
             </a:pPr>
             <a:fld id="{9FA9E053-A9C9-5E43-89F1-83E618EAF168}" type="slidenum">
-              <a:rPr lang="en-US" smtClean="0"/>
+              <a:rPr lang="en-US" smtClean="0">
+                <a:latin typeface="微软雅黑" panose="020B0503020204020204" pitchFamily="34" charset="-122"/>
+                <a:ea typeface="微软雅黑" panose="020B0503020204020204" pitchFamily="34" charset="-122"/>
+              </a:rPr>
               <a:pPr>
                 <a:defRPr/>
               </a:pPr>
               <a:t>7</a:t>
             </a:fld>
-            <a:endParaRPr lang="en-US"/>
+            <a:endParaRPr lang="en-US">
+              <a:latin typeface="微软雅黑" panose="020B0503020204020204" pitchFamily="34" charset="-122"/>
+              <a:ea typeface="微软雅黑" panose="020B0503020204020204" pitchFamily="34" charset="-122"/>
+            </a:endParaRPr>
           </a:p>
         </p:txBody>
       </p:sp>
@@ -14833,10 +15477,16 @@
           <a:p>
             <a:pPr algn="ctr"/>
             <a:r>
-              <a:rPr lang="en-US" altLang="zh-CHS" spc="-210" dirty="0" smtClean="0"/>
+              <a:rPr lang="en-US" altLang="zh-Hans" spc="-210" dirty="0" smtClean="0">
+                <a:latin typeface="微软雅黑" panose="020B0503020204020204" pitchFamily="34" charset="-122"/>
+                <a:ea typeface="微软雅黑" panose="020B0503020204020204" pitchFamily="34" charset="-122"/>
+              </a:rPr>
               <a:t>ACTIONS</a:t>
             </a:r>
-            <a:endParaRPr lang="zh-CHS" altLang="en-US" dirty="0"/>
+            <a:endParaRPr lang="zh-Hans" altLang="en-US" dirty="0">
+              <a:latin typeface="微软雅黑" panose="020B0503020204020204" pitchFamily="34" charset="-122"/>
+              <a:ea typeface="微软雅黑" panose="020B0503020204020204" pitchFamily="34" charset="-122"/>
+            </a:endParaRPr>
           </a:p>
         </p:txBody>
       </p:sp>
@@ -14857,31 +15507,44 @@
           <a:p>
             <a:pPr marL="0"/>
             <a:r>
-              <a:rPr lang="en-US" altLang="zh-CHT" sz="4400" dirty="0" smtClean="0"/>
+              <a:rPr lang="en-US" altLang="zh-Hant" sz="4400" dirty="0" smtClean="0">
+                <a:latin typeface="微软雅黑" panose="020B0503020204020204" pitchFamily="34" charset="-122"/>
+                <a:ea typeface="微软雅黑" panose="020B0503020204020204" pitchFamily="34" charset="-122"/>
+              </a:rPr>
               <a:t>The return value of mock functions can be specified by </a:t>
             </a:r>
             <a:r>
-              <a:rPr lang="en-US" altLang="zh-CHT" sz="4400" dirty="0" smtClean="0">
+              <a:rPr lang="en-US" altLang="zh-Hant" sz="4400" dirty="0" smtClean="0">
                 <a:solidFill>
                   <a:srgbClr val="FF0000"/>
                 </a:solidFill>
+                <a:latin typeface="微软雅黑" panose="020B0503020204020204" pitchFamily="34" charset="-122"/>
+                <a:ea typeface="微软雅黑" panose="020B0503020204020204" pitchFamily="34" charset="-122"/>
               </a:rPr>
               <a:t>Will</a:t>
             </a:r>
             <a:r>
-              <a:rPr lang="en-US" altLang="zh-CHT" sz="4400" dirty="0" smtClean="0"/>
+              <a:rPr lang="en-US" altLang="zh-Hant" sz="4400" dirty="0" smtClean="0">
+                <a:latin typeface="微软雅黑" panose="020B0503020204020204" pitchFamily="34" charset="-122"/>
+                <a:ea typeface="微软雅黑" panose="020B0503020204020204" pitchFamily="34" charset="-122"/>
+              </a:rPr>
               <a:t> and </a:t>
             </a:r>
             <a:r>
-              <a:rPr lang="en-US" altLang="zh-CHT" sz="4400" dirty="0" smtClean="0">
+              <a:rPr lang="en-US" altLang="zh-Hant" sz="4400" dirty="0" smtClean="0">
                 <a:solidFill>
                   <a:srgbClr val="FF0000"/>
                 </a:solidFill>
+                <a:latin typeface="微软雅黑" panose="020B0503020204020204" pitchFamily="34" charset="-122"/>
+                <a:ea typeface="微软雅黑" panose="020B0503020204020204" pitchFamily="34" charset="-122"/>
               </a:rPr>
               <a:t>Return</a:t>
             </a:r>
             <a:r>
-              <a:rPr lang="en-US" altLang="zh-CHT" sz="4400" dirty="0" smtClean="0"/>
+              <a:rPr lang="en-US" altLang="zh-Hant" sz="4400" dirty="0" smtClean="0">
+                <a:latin typeface="微软雅黑" panose="020B0503020204020204" pitchFamily="34" charset="-122"/>
+                <a:ea typeface="微软雅黑" panose="020B0503020204020204" pitchFamily="34" charset="-122"/>
+              </a:rPr>
               <a:t> Statement</a:t>
             </a:r>
           </a:p>
@@ -14906,13 +15569,19 @@
               <a:defRPr/>
             </a:pPr>
             <a:fld id="{9FA9E053-A9C9-5E43-89F1-83E618EAF168}" type="slidenum">
-              <a:rPr lang="en-US" smtClean="0"/>
+              <a:rPr lang="en-US" smtClean="0">
+                <a:latin typeface="微软雅黑" panose="020B0503020204020204" pitchFamily="34" charset="-122"/>
+                <a:ea typeface="微软雅黑" panose="020B0503020204020204" pitchFamily="34" charset="-122"/>
+              </a:rPr>
               <a:pPr>
                 <a:defRPr/>
               </a:pPr>
               <a:t>8</a:t>
             </a:fld>
-            <a:endParaRPr lang="en-US"/>
+            <a:endParaRPr lang="en-US">
+              <a:latin typeface="微软雅黑" panose="020B0503020204020204" pitchFamily="34" charset="-122"/>
+              <a:ea typeface="微软雅黑" panose="020B0503020204020204" pitchFamily="34" charset="-122"/>
+            </a:endParaRPr>
           </a:p>
         </p:txBody>
       </p:sp>
@@ -15002,100 +15671,138 @@
           <a:lstStyle/>
           <a:p>
             <a:r>
-              <a:rPr lang="en-US" altLang="zh-CHS" sz="3400" dirty="0" smtClean="0"/>
+              <a:rPr lang="en-US" altLang="zh-Hans" sz="3400" dirty="0" smtClean="0">
+                <a:latin typeface="微软雅黑" panose="020B0503020204020204" pitchFamily="34" charset="-122"/>
+                <a:ea typeface="微软雅黑" panose="020B0503020204020204" pitchFamily="34" charset="-122"/>
+              </a:rPr>
               <a:t>include </a:t>
             </a:r>
             <a:r>
-              <a:rPr lang="en-US" altLang="zh-CHS" sz="3400" dirty="0" smtClean="0">
+              <a:rPr lang="en-US" altLang="zh-Hans" sz="3400" dirty="0" smtClean="0">
                 <a:solidFill>
                   <a:srgbClr val="FF0000"/>
                 </a:solidFill>
+                <a:latin typeface="微软雅黑" panose="020B0503020204020204" pitchFamily="34" charset="-122"/>
+                <a:ea typeface="微软雅黑" panose="020B0503020204020204" pitchFamily="34" charset="-122"/>
               </a:rPr>
               <a:t>&lt;</a:t>
             </a:r>
             <a:r>
-              <a:rPr lang="en-US" altLang="zh-CHS" sz="3400" dirty="0" err="1" smtClean="0">
+              <a:rPr lang="en-US" altLang="zh-Hans" sz="3400" dirty="0" err="1" smtClean="0">
                 <a:solidFill>
                   <a:srgbClr val="FF0000"/>
                 </a:solidFill>
+                <a:latin typeface="微软雅黑" panose="020B0503020204020204" pitchFamily="34" charset="-122"/>
+                <a:ea typeface="微软雅黑" panose="020B0503020204020204" pitchFamily="34" charset="-122"/>
               </a:rPr>
               <a:t>gmock</a:t>
             </a:r>
             <a:r>
-              <a:rPr lang="en-US" altLang="zh-CHS" sz="3400" dirty="0" smtClean="0">
+              <a:rPr lang="en-US" altLang="zh-Hans" sz="3400" dirty="0" smtClean="0">
                 <a:solidFill>
                   <a:srgbClr val="FF0000"/>
                 </a:solidFill>
+                <a:latin typeface="微软雅黑" panose="020B0503020204020204" pitchFamily="34" charset="-122"/>
+                <a:ea typeface="微软雅黑" panose="020B0503020204020204" pitchFamily="34" charset="-122"/>
               </a:rPr>
               <a:t>/</a:t>
             </a:r>
             <a:r>
-              <a:rPr lang="en-US" altLang="zh-CHS" sz="3400" dirty="0" err="1" smtClean="0">
+              <a:rPr lang="en-US" altLang="zh-Hans" sz="3400" dirty="0" err="1" smtClean="0">
                 <a:solidFill>
                   <a:srgbClr val="FF0000"/>
                 </a:solidFill>
+                <a:latin typeface="微软雅黑" panose="020B0503020204020204" pitchFamily="34" charset="-122"/>
+                <a:ea typeface="微软雅黑" panose="020B0503020204020204" pitchFamily="34" charset="-122"/>
               </a:rPr>
               <a:t>gmock.h</a:t>
             </a:r>
             <a:r>
-              <a:rPr lang="en-US" altLang="zh-CHS" sz="3400" dirty="0" smtClean="0">
+              <a:rPr lang="en-US" altLang="zh-Hans" sz="3400" dirty="0" smtClean="0">
                 <a:solidFill>
                   <a:srgbClr val="FF0000"/>
                 </a:solidFill>
+                <a:latin typeface="微软雅黑" panose="020B0503020204020204" pitchFamily="34" charset="-122"/>
+                <a:ea typeface="微软雅黑" panose="020B0503020204020204" pitchFamily="34" charset="-122"/>
               </a:rPr>
               <a:t>&gt;</a:t>
             </a:r>
           </a:p>
           <a:p>
             <a:r>
-              <a:rPr lang="en-US" altLang="zh-CHS" sz="3400" dirty="0" smtClean="0"/>
+              <a:rPr lang="en-US" altLang="zh-Hans" sz="3400" dirty="0" smtClean="0">
+                <a:latin typeface="微软雅黑" panose="020B0503020204020204" pitchFamily="34" charset="-122"/>
+                <a:ea typeface="微软雅黑" panose="020B0503020204020204" pitchFamily="34" charset="-122"/>
+              </a:rPr>
               <a:t>write your mocks and tests</a:t>
             </a:r>
           </a:p>
           <a:p>
             <a:r>
-              <a:rPr lang="en-US" altLang="zh-CHS" sz="3400" dirty="0" smtClean="0"/>
+              <a:rPr lang="en-US" altLang="zh-Hans" sz="3400" dirty="0" smtClean="0">
+                <a:latin typeface="微软雅黑" panose="020B0503020204020204" pitchFamily="34" charset="-122"/>
+                <a:ea typeface="微软雅黑" panose="020B0503020204020204" pitchFamily="34" charset="-122"/>
+              </a:rPr>
               <a:t>initialize </a:t>
             </a:r>
             <a:r>
-              <a:rPr lang="en-US" altLang="zh-CHS" sz="3400" dirty="0" err="1" smtClean="0"/>
+              <a:rPr lang="en-US" altLang="zh-Hans" sz="3400" dirty="0" err="1" smtClean="0">
+                <a:latin typeface="微软雅黑" panose="020B0503020204020204" pitchFamily="34" charset="-122"/>
+                <a:ea typeface="微软雅黑" panose="020B0503020204020204" pitchFamily="34" charset="-122"/>
+              </a:rPr>
               <a:t>gmock</a:t>
             </a:r>
             <a:r>
-              <a:rPr lang="en-US" altLang="zh-CHS" sz="3400" dirty="0" smtClean="0"/>
+              <a:rPr lang="en-US" altLang="zh-Hans" sz="3400" dirty="0" smtClean="0">
+                <a:latin typeface="微软雅黑" panose="020B0503020204020204" pitchFamily="34" charset="-122"/>
+                <a:ea typeface="微软雅黑" panose="020B0503020204020204" pitchFamily="34" charset="-122"/>
+              </a:rPr>
               <a:t> by </a:t>
             </a:r>
             <a:r>
-              <a:rPr lang="en-US" altLang="zh-CHS" sz="3400" dirty="0" err="1" smtClean="0">
+              <a:rPr lang="en-US" altLang="zh-Hans" sz="3400" dirty="0" err="1" smtClean="0">
                 <a:solidFill>
                   <a:srgbClr val="FF0000"/>
                 </a:solidFill>
+                <a:latin typeface="微软雅黑" panose="020B0503020204020204" pitchFamily="34" charset="-122"/>
+                <a:ea typeface="微软雅黑" panose="020B0503020204020204" pitchFamily="34" charset="-122"/>
               </a:rPr>
               <a:t>InitGoogleMock</a:t>
             </a:r>
             <a:r>
-              <a:rPr lang="en-US" altLang="zh-CHS" sz="3400" dirty="0" smtClean="0">
+              <a:rPr lang="en-US" altLang="zh-Hans" sz="3400" dirty="0" smtClean="0">
                 <a:solidFill>
                   <a:srgbClr val="FF0000"/>
                 </a:solidFill>
+                <a:latin typeface="微软雅黑" panose="020B0503020204020204" pitchFamily="34" charset="-122"/>
+                <a:ea typeface="微软雅黑" panose="020B0503020204020204" pitchFamily="34" charset="-122"/>
               </a:rPr>
               <a:t>()</a:t>
             </a:r>
           </a:p>
           <a:p>
             <a:r>
-              <a:rPr lang="en-US" altLang="zh-CHS" sz="3400" dirty="0" smtClean="0"/>
+              <a:rPr lang="en-US" altLang="zh-Hans" sz="3400" dirty="0" smtClean="0">
+                <a:latin typeface="微软雅黑" panose="020B0503020204020204" pitchFamily="34" charset="-122"/>
+                <a:ea typeface="微软雅黑" panose="020B0503020204020204" pitchFamily="34" charset="-122"/>
+              </a:rPr>
               <a:t>call RUN_ALL_TESTS() in main() function</a:t>
             </a:r>
           </a:p>
           <a:p>
             <a:r>
-              <a:rPr lang="en-US" altLang="zh-CHS" sz="3400" dirty="0" smtClean="0"/>
+              <a:rPr lang="en-US" altLang="zh-Hans" sz="3400" dirty="0" smtClean="0">
+                <a:latin typeface="微软雅黑" panose="020B0503020204020204" pitchFamily="34" charset="-122"/>
+                <a:ea typeface="微软雅黑" panose="020B0503020204020204" pitchFamily="34" charset="-122"/>
+              </a:rPr>
               <a:t>compile and run</a:t>
             </a:r>
           </a:p>
           <a:p>
-            <a:endParaRPr lang="zh-CHS" altLang="en-US" sz="3400" dirty="0"/>
+            <a:endParaRPr lang="zh-Hans" altLang="en-US" sz="3400" dirty="0">
+              <a:latin typeface="微软雅黑" panose="020B0503020204020204" pitchFamily="34" charset="-122"/>
+              <a:ea typeface="微软雅黑" panose="020B0503020204020204" pitchFamily="34" charset="-122"/>
+            </a:endParaRPr>
           </a:p>
         </p:txBody>
       </p:sp>
@@ -15148,10 +15855,16 @@
           <a:p>
             <a:pPr algn="ctr"/>
             <a:r>
-              <a:rPr lang="en-US" altLang="zh-CHS" spc="-210" dirty="0" smtClean="0"/>
+              <a:rPr lang="en-US" altLang="zh-Hans" spc="-210" dirty="0" smtClean="0">
+                <a:latin typeface="微软雅黑" panose="020B0503020204020204" pitchFamily="34" charset="-122"/>
+                <a:ea typeface="微软雅黑" panose="020B0503020204020204" pitchFamily="34" charset="-122"/>
+              </a:rPr>
               <a:t>USING GMOCK</a:t>
             </a:r>
-            <a:endParaRPr lang="zh-CHS" altLang="en-US" dirty="0"/>
+            <a:endParaRPr lang="zh-Hans" altLang="en-US" dirty="0">
+              <a:latin typeface="微软雅黑" panose="020B0503020204020204" pitchFamily="34" charset="-122"/>
+              <a:ea typeface="微软雅黑" panose="020B0503020204020204" pitchFamily="34" charset="-122"/>
+            </a:endParaRPr>
           </a:p>
         </p:txBody>
       </p:sp>
@@ -15174,13 +15887,19 @@
               <a:defRPr/>
             </a:pPr>
             <a:fld id="{28FE6BA1-A7B4-7B4F-846F-93E3CD6980EB}" type="slidenum">
-              <a:rPr lang="en-US" smtClean="0"/>
+              <a:rPr lang="en-US" smtClean="0">
+                <a:latin typeface="微软雅黑" panose="020B0503020204020204" pitchFamily="34" charset="-122"/>
+                <a:ea typeface="微软雅黑" panose="020B0503020204020204" pitchFamily="34" charset="-122"/>
+              </a:rPr>
               <a:pPr>
                 <a:defRPr/>
               </a:pPr>
               <a:t>9</a:t>
             </a:fld>
-            <a:endParaRPr lang="en-US"/>
+            <a:endParaRPr lang="en-US">
+              <a:latin typeface="微软雅黑" panose="020B0503020204020204" pitchFamily="34" charset="-122"/>
+              <a:ea typeface="微软雅黑" panose="020B0503020204020204" pitchFamily="34" charset="-122"/>
+            </a:endParaRPr>
           </a:p>
         </p:txBody>
       </p:sp>
@@ -15212,26 +15931,40 @@
               </a:lnSpc>
             </a:pPr>
             <a:r>
-              <a:rPr lang="en-US" altLang="zh-CHS" sz="2800" dirty="0" err="1" smtClean="0"/>
+              <a:rPr lang="en-US" altLang="zh-Hans" sz="2800" dirty="0" err="1" smtClean="0">
+                <a:latin typeface="微软雅黑" panose="020B0503020204020204" pitchFamily="34" charset="-122"/>
+                <a:ea typeface="微软雅黑" panose="020B0503020204020204" pitchFamily="34" charset="-122"/>
+              </a:rPr>
               <a:t>InitGoogleMock</a:t>
             </a:r>
             <a:r>
-              <a:rPr lang="en-US" altLang="zh-CHS" sz="2800" dirty="0" smtClean="0"/>
+              <a:rPr lang="en-US" altLang="zh-Hans" sz="2800" dirty="0" smtClean="0">
+                <a:latin typeface="微软雅黑" panose="020B0503020204020204" pitchFamily="34" charset="-122"/>
+                <a:ea typeface="微软雅黑" panose="020B0503020204020204" pitchFamily="34" charset="-122"/>
+              </a:rPr>
               <a:t>() will </a:t>
             </a:r>
             <a:r>
-              <a:rPr lang="en-US" altLang="zh-CHS" sz="2800" dirty="0" smtClean="0">
+              <a:rPr lang="en-US" altLang="zh-Hans" sz="2800" dirty="0" smtClean="0">
                 <a:solidFill>
                   <a:srgbClr val="FF0000"/>
                 </a:solidFill>
+                <a:latin typeface="微软雅黑" panose="020B0503020204020204" pitchFamily="34" charset="-122"/>
+                <a:ea typeface="微软雅黑" panose="020B0503020204020204" pitchFamily="34" charset="-122"/>
               </a:rPr>
               <a:t>automatically</a:t>
             </a:r>
             <a:r>
-              <a:rPr lang="en-US" altLang="zh-CHS" sz="2800" dirty="0" smtClean="0"/>
+              <a:rPr lang="en-US" altLang="zh-Hans" sz="2800" dirty="0" smtClean="0">
+                <a:latin typeface="微软雅黑" panose="020B0503020204020204" pitchFamily="34" charset="-122"/>
+                <a:ea typeface="微软雅黑" panose="020B0503020204020204" pitchFamily="34" charset="-122"/>
+              </a:rPr>
               <a:t> initialize Google Test</a:t>
             </a:r>
-            <a:endParaRPr lang="zh-CHS" altLang="en-US" sz="2800" dirty="0" smtClean="0"/>
+            <a:endParaRPr lang="zh-Hans" altLang="en-US" sz="2800" dirty="0" smtClean="0">
+              <a:latin typeface="微软雅黑" panose="020B0503020204020204" pitchFamily="34" charset="-122"/>
+              <a:ea typeface="微软雅黑" panose="020B0503020204020204" pitchFamily="34" charset="-122"/>
+            </a:endParaRPr>
           </a:p>
         </p:txBody>
       </p:sp>
@@ -15520,7 +16253,7 @@
         <a:effectLst/>
         <a:extLst>
           <a:ext uri="{91240B29-F687-4f45-9708-019B960494DF}">
-            <a14:hiddenLine xmlns:a14="http://schemas.microsoft.com/office/drawing/2010/main" xmlns="" w="25400" cap="flat" cmpd="sng" algn="ctr">
+            <a14:hiddenLine xmlns="" xmlns:a14="http://schemas.microsoft.com/office/drawing/2010/main" w="25400" cap="flat" cmpd="sng" algn="ctr">
               <a:solidFill>
                 <a:srgbClr val="000000"/>
               </a:solidFill>
@@ -15531,7 +16264,7 @@
             </a14:hiddenLine>
           </a:ext>
           <a:ext uri="{AF507438-7753-43e0-B8FC-AC1667EBCBE1}">
-            <a14:hiddenEffects xmlns:a14="http://schemas.microsoft.com/office/drawing/2010/main" xmlns="">
+            <a14:hiddenEffects xmlns="" xmlns:a14="http://schemas.microsoft.com/office/drawing/2010/main">
               <a:effectLst>
                 <a:outerShdw blurRad="63500" dist="38099" dir="2700000" algn="ctr" rotWithShape="0">
                   <a:schemeClr val="bg2">
@@ -15907,7 +16640,7 @@
         <a:effectLst/>
         <a:extLst>
           <a:ext uri="{91240B29-F687-4f45-9708-019B960494DF}">
-            <a14:hiddenLine xmlns:a14="http://schemas.microsoft.com/office/drawing/2010/main" xmlns="" w="25400" cap="flat" cmpd="sng" algn="ctr">
+            <a14:hiddenLine xmlns="" xmlns:a14="http://schemas.microsoft.com/office/drawing/2010/main" w="25400" cap="flat" cmpd="sng" algn="ctr">
               <a:solidFill>
                 <a:srgbClr val="000000"/>
               </a:solidFill>
@@ -15918,7 +16651,7 @@
             </a14:hiddenLine>
           </a:ext>
           <a:ext uri="{AF507438-7753-43e0-B8FC-AC1667EBCBE1}">
-            <a14:hiddenEffects xmlns:a14="http://schemas.microsoft.com/office/drawing/2010/main" xmlns="">
+            <a14:hiddenEffects xmlns="" xmlns:a14="http://schemas.microsoft.com/office/drawing/2010/main">
               <a:effectLst>
                 <a:outerShdw blurRad="63500" dist="38099" dir="2700000" algn="ctr" rotWithShape="0">
                   <a:schemeClr val="bg2">
@@ -16294,7 +17027,7 @@
         <a:effectLst/>
         <a:extLst>
           <a:ext uri="{91240B29-F687-4f45-9708-019B960494DF}">
-            <a14:hiddenLine xmlns:a14="http://schemas.microsoft.com/office/drawing/2010/main" xmlns="" w="25400" cap="flat" cmpd="sng" algn="ctr">
+            <a14:hiddenLine xmlns="" xmlns:a14="http://schemas.microsoft.com/office/drawing/2010/main" w="25400" cap="flat" cmpd="sng" algn="ctr">
               <a:solidFill>
                 <a:srgbClr val="000000"/>
               </a:solidFill>
@@ -16305,7 +17038,7 @@
             </a14:hiddenLine>
           </a:ext>
           <a:ext uri="{AF507438-7753-43e0-B8FC-AC1667EBCBE1}">
-            <a14:hiddenEffects xmlns:a14="http://schemas.microsoft.com/office/drawing/2010/main" xmlns="">
+            <a14:hiddenEffects xmlns="" xmlns:a14="http://schemas.microsoft.com/office/drawing/2010/main">
               <a:effectLst>
                 <a:outerShdw blurRad="63500" dist="38099" dir="2700000" algn="ctr" rotWithShape="0">
                   <a:schemeClr val="bg2">

</xml_diff>